<commit_message>
Poster and Project Update
</commit_message>
<xml_diff>
--- a/UROC Poster Draft.pptx
+++ b/UROC Poster Draft.pptx
@@ -4343,6 +4343,122 @@
       </p:grpSpPr>
       <p:sp>
         <p:nvSpPr>
+          <p:cNvPr id="30" name="Arrow: Curved Right 29">
+            <a:extLst>
+              <a:ext uri="{FF2B5EF4-FFF2-40B4-BE49-F238E27FC236}">
+                <a16:creationId xmlns:a16="http://schemas.microsoft.com/office/drawing/2014/main" id="{C72709EE-42C7-4172-AC31-28D0A641EFCC}"/>
+              </a:ext>
+            </a:extLst>
+          </p:cNvPr>
+          <p:cNvSpPr/>
+          <p:nvPr/>
+        </p:nvSpPr>
+        <p:spPr>
+          <a:xfrm>
+            <a:off x="3581400" y="27467625"/>
+            <a:ext cx="1524000" cy="2057400"/>
+          </a:xfrm>
+          <a:prstGeom prst="curvedRightArrow">
+            <a:avLst>
+              <a:gd name="adj1" fmla="val 10934"/>
+              <a:gd name="adj2" fmla="val 30814"/>
+              <a:gd name="adj3" fmla="val 31056"/>
+            </a:avLst>
+          </a:prstGeom>
+          <a:solidFill>
+            <a:schemeClr val="accent5">
+              <a:lumMod val="60000"/>
+              <a:lumOff val="40000"/>
+            </a:schemeClr>
+          </a:solidFill>
+        </p:spPr>
+        <p:style>
+          <a:lnRef idx="2">
+            <a:schemeClr val="accent1">
+              <a:shade val="50000"/>
+            </a:schemeClr>
+          </a:lnRef>
+          <a:fillRef idx="1">
+            <a:schemeClr val="accent1"/>
+          </a:fillRef>
+          <a:effectRef idx="0">
+            <a:schemeClr val="accent1"/>
+          </a:effectRef>
+          <a:fontRef idx="minor">
+            <a:schemeClr val="lt1"/>
+          </a:fontRef>
+        </p:style>
+        <p:txBody>
+          <a:bodyPr rtlCol="0" anchor="ctr"/>
+          <a:lstStyle/>
+          <a:p>
+            <a:pPr algn="ctr"/>
+            <a:endParaRPr lang="en-US">
+              <a:solidFill>
+                <a:schemeClr val="tx1"/>
+              </a:solidFill>
+            </a:endParaRPr>
+          </a:p>
+        </p:txBody>
+      </p:sp>
+      <p:sp>
+        <p:nvSpPr>
+          <p:cNvPr id="2" name="Rectangle 1">
+            <a:extLst>
+              <a:ext uri="{FF2B5EF4-FFF2-40B4-BE49-F238E27FC236}">
+                <a16:creationId xmlns:a16="http://schemas.microsoft.com/office/drawing/2014/main" id="{8DB9BB3F-E1C2-40EE-BCC8-B74E1D2144E1}"/>
+              </a:ext>
+            </a:extLst>
+          </p:cNvPr>
+          <p:cNvSpPr/>
+          <p:nvPr/>
+        </p:nvSpPr>
+        <p:spPr>
+          <a:xfrm>
+            <a:off x="4800599" y="26629425"/>
+            <a:ext cx="5865147" cy="2057400"/>
+          </a:xfrm>
+          <a:prstGeom prst="rect">
+            <a:avLst/>
+          </a:prstGeom>
+          <a:solidFill>
+            <a:schemeClr val="bg1"/>
+          </a:solidFill>
+          <a:ln w="57150" cap="flat" cmpd="sng" algn="ctr">
+            <a:solidFill>
+              <a:schemeClr val="accent6"/>
+            </a:solidFill>
+            <a:prstDash val="solid"/>
+            <a:round/>
+            <a:headEnd type="none" w="med" len="med"/>
+            <a:tailEnd type="none" w="med" len="med"/>
+          </a:ln>
+        </p:spPr>
+        <p:style>
+          <a:lnRef idx="0">
+            <a:scrgbClr r="0" g="0" b="0"/>
+          </a:lnRef>
+          <a:fillRef idx="0">
+            <a:scrgbClr r="0" g="0" b="0"/>
+          </a:fillRef>
+          <a:effectRef idx="0">
+            <a:scrgbClr r="0" g="0" b="0"/>
+          </a:effectRef>
+          <a:fontRef idx="minor">
+            <a:schemeClr val="accent6"/>
+          </a:fontRef>
+        </p:style>
+        <p:txBody>
+          <a:bodyPr rtlCol="0" anchor="ctr"/>
+          <a:lstStyle/>
+          <a:p>
+            <a:pPr algn="ctr"/>
+            <a:endParaRPr lang="en-US"/>
+          </a:p>
+        </p:txBody>
+      </p:sp>
+      <p:sp>
+        <p:nvSpPr>
           <p:cNvPr id="36" name="Round Same Side Corner Rectangle 38">
             <a:extLst>
               <a:ext uri="{FF2B5EF4-FFF2-40B4-BE49-F238E27FC236}">
@@ -4357,8 +4473,8 @@
         </p:nvSpPr>
         <p:spPr bwMode="auto">
           <a:xfrm>
-            <a:off x="565410" y="320888"/>
-            <a:ext cx="42976800" cy="2468880"/>
+            <a:off x="565410" y="320887"/>
+            <a:ext cx="42976800" cy="3531641"/>
           </a:xfrm>
           <a:custGeom>
             <a:avLst/>
@@ -4570,16 +4686,6 @@
               <a:buFont typeface="Arial" panose="020B0604020202020204" pitchFamily="34" charset="0"/>
               <a:buNone/>
             </a:pPr>
-            <a:endParaRPr lang="en-US" altLang="en-US" sz="7200" b="1" cap="small" dirty="0">
-              <a:latin typeface="+mj-lt"/>
-              <a:cs typeface="Times New Roman" panose="02020603050405020304" pitchFamily="18" charset="0"/>
-            </a:endParaRPr>
-          </a:p>
-          <a:p>
-            <a:pPr algn="ctr">
-              <a:buFont typeface="Arial" panose="020B0604020202020204" pitchFamily="34" charset="0"/>
-              <a:buNone/>
-            </a:pPr>
             <a:r>
               <a:rPr lang="en-US" altLang="en-US" sz="6600" b="1" cap="small" dirty="0">
                 <a:latin typeface="+mj-lt"/>
@@ -4614,8 +4720,8 @@
         </p:nvSpPr>
         <p:spPr>
           <a:xfrm>
-            <a:off x="808038" y="2975789"/>
-            <a:ext cx="42549762" cy="2739211"/>
+            <a:off x="6684690" y="2626953"/>
+            <a:ext cx="30032824" cy="2646878"/>
           </a:xfrm>
           <a:prstGeom prst="rect">
             <a:avLst/>
@@ -4634,11 +4740,18 @@
               </a:spcAft>
             </a:pPr>
             <a:r>
+              <a:rPr lang="en-US" sz="4800" b="1" u="sng" dirty="0">
+                <a:latin typeface="+mj-lt"/>
+                <a:cs typeface="Times New Roman" panose="02020603050405020304" pitchFamily="18" charset="0"/>
+              </a:rPr>
+              <a:t>E. A. Cortes</a:t>
+            </a:r>
+            <a:r>
               <a:rPr lang="en-US" sz="4800" b="1" dirty="0">
                 <a:latin typeface="+mj-lt"/>
                 <a:cs typeface="Times New Roman" panose="02020603050405020304" pitchFamily="18" charset="0"/>
               </a:rPr>
-              <a:t>Elsie A. Cortes, Camille Carvalho, PhD, School of Natural Sciences, University of California, Merced</a:t>
+              <a:t>, C. Carvalho, School of Natural Sciences, University of California, Merced</a:t>
             </a:r>
           </a:p>
           <a:p>
@@ -4672,7 +4785,7 @@
         </p:nvSpPr>
         <p:spPr bwMode="auto">
           <a:xfrm>
-            <a:off x="949552" y="4038600"/>
+            <a:off x="1470772" y="4038600"/>
             <a:ext cx="13299848" cy="1188720"/>
           </a:xfrm>
           <a:custGeom>
@@ -4889,14 +5002,14 @@
               <a:buNone/>
             </a:pPr>
             <a:r>
-              <a:rPr lang="en-US" altLang="en-US" sz="7200" b="1" cap="all" dirty="0">
+              <a:rPr lang="en-US" altLang="en-US" sz="7200" b="1" cap="small" dirty="0">
                 <a:solidFill>
                   <a:schemeClr val="bg1"/>
                 </a:solidFill>
                 <a:latin typeface="+mj-lt"/>
                 <a:cs typeface="Times New Roman" panose="02020603050405020304" pitchFamily="18" charset="0"/>
               </a:rPr>
-              <a:t>Project Problem</a:t>
+              <a:t>Introduction</a:t>
             </a:r>
           </a:p>
         </p:txBody>
@@ -4915,8 +5028,8 @@
         </p:nvSpPr>
         <p:spPr>
           <a:xfrm>
-            <a:off x="949552" y="5339598"/>
-            <a:ext cx="13299848" cy="10756021"/>
+            <a:off x="1406752" y="5339598"/>
+            <a:ext cx="13299848" cy="11203067"/>
           </a:xfrm>
           <a:prstGeom prst="rect">
             <a:avLst/>
@@ -4933,73 +5046,81 @@
           <a:p>
             <a:pPr algn="just"/>
             <a:r>
-              <a:rPr lang="en-US" sz="4000" dirty="0">
+              <a:rPr lang="en-US" sz="3800" dirty="0">
                 <a:cs typeface="Times New Roman" panose="02020603050405020304" pitchFamily="18" charset="0"/>
               </a:rPr>
-              <a:t>Our goal is to simulate optical cloaking devices by calculating the transversal of particles through a boundary.  Optical cloaking is…. Because a cloaked object scatters particles more than an uncloaked object, we use a layered boundary to direct their incidence waves around the cloaked object.  The periodic trapezoid rule is used to approximate the propagation of these waves.</a:t>
+              <a:t>Our goal is to simulate optical cloaking devices by calculating how light travels through defined boundaries.  Optical cloaking refers to the act of making something invisible in some directions by preventing the scattering of light as it hits the boundary.  Cloaking is often seen in science fiction, but also has real-world applications for radar and military science.   </a:t>
             </a:r>
           </a:p>
           <a:p>
             <a:pPr algn="just"/>
-            <a:endParaRPr lang="en-US" sz="4000" dirty="0">
+            <a:endParaRPr lang="en-US" sz="3800" dirty="0">
               <a:cs typeface="Times New Roman" panose="02020603050405020304" pitchFamily="18" charset="0"/>
             </a:endParaRPr>
           </a:p>
           <a:p>
             <a:pPr algn="just"/>
-            <a:endParaRPr lang="en-US" sz="4000" dirty="0">
+            <a:endParaRPr lang="en-US" sz="3800" dirty="0">
               <a:cs typeface="Times New Roman" panose="02020603050405020304" pitchFamily="18" charset="0"/>
             </a:endParaRPr>
           </a:p>
           <a:p>
             <a:pPr algn="just"/>
-            <a:endParaRPr lang="en-US" sz="4000" dirty="0">
+            <a:endParaRPr lang="en-US" sz="3800" dirty="0">
               <a:cs typeface="Times New Roman" panose="02020603050405020304" pitchFamily="18" charset="0"/>
             </a:endParaRPr>
           </a:p>
           <a:p>
             <a:pPr algn="just"/>
-            <a:endParaRPr lang="en-US" sz="4000" dirty="0">
+            <a:endParaRPr lang="en-US" sz="3800" dirty="0">
               <a:cs typeface="Times New Roman" panose="02020603050405020304" pitchFamily="18" charset="0"/>
             </a:endParaRPr>
           </a:p>
           <a:p>
             <a:pPr algn="just"/>
-            <a:endParaRPr lang="en-US" sz="4000" dirty="0">
+            <a:endParaRPr lang="en-US" sz="3800" dirty="0">
               <a:cs typeface="Times New Roman" panose="02020603050405020304" pitchFamily="18" charset="0"/>
             </a:endParaRPr>
           </a:p>
           <a:p>
             <a:pPr algn="just"/>
-            <a:endParaRPr lang="en-US" sz="4000" dirty="0">
+            <a:endParaRPr lang="en-US" sz="3800" dirty="0">
               <a:cs typeface="Times New Roman" panose="02020603050405020304" pitchFamily="18" charset="0"/>
             </a:endParaRPr>
           </a:p>
           <a:p>
             <a:pPr algn="just"/>
-            <a:endParaRPr lang="en-US" sz="4000" dirty="0">
+            <a:endParaRPr lang="en-US" sz="3800" dirty="0">
               <a:cs typeface="Times New Roman" panose="02020603050405020304" pitchFamily="18" charset="0"/>
             </a:endParaRPr>
           </a:p>
           <a:p>
             <a:pPr algn="just"/>
-            <a:endParaRPr lang="en-US" sz="4000" dirty="0">
+            <a:endParaRPr lang="en-US" sz="3800" dirty="0">
               <a:cs typeface="Times New Roman" panose="02020603050405020304" pitchFamily="18" charset="0"/>
             </a:endParaRPr>
           </a:p>
           <a:p>
             <a:pPr algn="just"/>
-            <a:endParaRPr lang="en-US" sz="4000" dirty="0">
+            <a:endParaRPr lang="en-US" sz="3800" dirty="0">
               <a:cs typeface="Times New Roman" panose="02020603050405020304" pitchFamily="18" charset="0"/>
             </a:endParaRPr>
           </a:p>
           <a:p>
-            <a:pPr algn="just">
-              <a:lnSpc>
-                <a:spcPct val="150000"/>
-              </a:lnSpc>
-            </a:pPr>
-            <a:endParaRPr lang="en-US" sz="4000" dirty="0">
+            <a:pPr algn="just"/>
+            <a:r>
+              <a:rPr lang="en-US" sz="3800" dirty="0">
+                <a:cs typeface="Times New Roman" panose="02020603050405020304" pitchFamily="18" charset="0"/>
+              </a:rPr>
+              <a:t>We use boundary integral equation methods to compute the solution in layered boundaries, and we implement in Python an approximation using the periodic trapezoid rule and the Kress Quadrature.</a:t>
+            </a:r>
+            <a:r>
+              <a:rPr lang="en-US" sz="3800" baseline="30000" dirty="0">
+                <a:cs typeface="Times New Roman" panose="02020603050405020304" pitchFamily="18" charset="0"/>
+              </a:rPr>
+              <a:t>[1]</a:t>
+            </a:r>
+            <a:endParaRPr lang="en-US" sz="3800" dirty="0">
               <a:cs typeface="Times New Roman" panose="02020603050405020304" pitchFamily="18" charset="0"/>
             </a:endParaRPr>
           </a:p>
@@ -5021,7 +5142,7 @@
         </p:nvSpPr>
         <p:spPr bwMode="auto">
           <a:xfrm>
-            <a:off x="949552" y="17029984"/>
+            <a:off x="1175756" y="16964155"/>
             <a:ext cx="13299848" cy="1188720"/>
           </a:xfrm>
           <a:custGeom>
@@ -5266,8 +5387,8 @@
             </p:nvSpPr>
             <p:spPr>
               <a:xfrm>
-                <a:off x="949552" y="18618116"/>
-                <a:ext cx="13299848" cy="6452600"/>
+                <a:off x="1143000" y="24536400"/>
+                <a:ext cx="13299848" cy="8417625"/>
               </a:xfrm>
               <a:prstGeom prst="rect">
                 <a:avLst/>
@@ -5284,20 +5405,7 @@
               <a:p>
                 <a:pPr algn="ctr">
                   <a:spcAft>
-                    <a:spcPts val="600"/>
-                  </a:spcAft>
-                </a:pPr>
-                <a:r>
-                  <a:rPr lang="en-US" sz="3600" u="sng" dirty="0">
-                    <a:cs typeface="Times New Roman" panose="02020603050405020304" pitchFamily="18" charset="0"/>
-                  </a:rPr>
-                  <a:t>Transmission Conditions:</a:t>
-                </a:r>
-              </a:p>
-              <a:p>
-                <a:pPr algn="ctr">
-                  <a:spcAft>
-                    <a:spcPts val="600"/>
+                    <a:spcPts val="1200"/>
                   </a:spcAft>
                 </a:pPr>
                 <a14:m>
@@ -5445,7 +5553,7 @@
               <a:p>
                 <a:pPr algn="ctr">
                   <a:spcAft>
-                    <a:spcPts val="600"/>
+                    <a:spcPts val="1200"/>
                   </a:spcAft>
                 </a:pPr>
                 <a14:m>
@@ -5585,9 +5693,23 @@
                     </m:oMath>
                   </m:oMathPara>
                 </a14:m>
-                <a:endParaRPr lang="en-US" sz="3600" dirty="0">
+                <a:endParaRPr lang="en-US" sz="3600" b="0" dirty="0">
+                  <a:ea typeface="Cambria Math" panose="02040503050406030204" pitchFamily="18" charset="0"/>
                   <a:cs typeface="Times New Roman" panose="02020603050405020304" pitchFamily="18" charset="0"/>
                 </a:endParaRPr>
+              </a:p>
+              <a:p>
+                <a:pPr algn="ctr">
+                  <a:spcAft>
+                    <a:spcPts val="600"/>
+                  </a:spcAft>
+                </a:pPr>
+                <a:r>
+                  <a:rPr lang="en-US" sz="3600" dirty="0">
+                    <a:cs typeface="Times New Roman" panose="02020603050405020304" pitchFamily="18" charset="0"/>
+                  </a:rPr>
+                  <a:t>Transmission Conditions</a:t>
+                </a:r>
               </a:p>
               <a:p>
                 <a:pPr algn="ctr">
@@ -5995,17 +6117,21 @@
                     <a:spcPts val="600"/>
                   </a:spcAft>
                 </a:pPr>
+                <a:endParaRPr lang="en-US" sz="3600" dirty="0">
+                  <a:cs typeface="Times New Roman" panose="02020603050405020304" pitchFamily="18" charset="0"/>
+                </a:endParaRPr>
+              </a:p>
+              <a:p>
+                <a:pPr algn="ctr">
+                  <a:spcAft>
+                    <a:spcPts val="600"/>
+                  </a:spcAft>
+                </a:pPr>
                 <a:r>
-                  <a:rPr lang="en-US" sz="3200" dirty="0">
+                  <a:rPr lang="en-US" sz="3600" dirty="0">
                     <a:cs typeface="Times New Roman" panose="02020603050405020304" pitchFamily="18" charset="0"/>
                   </a:rPr>
-                  <a:t>Boundary Integral Method</a:t>
-                </a:r>
-                <a:r>
-                  <a:rPr lang="en-US" sz="3600" u="sng" dirty="0">
-                    <a:cs typeface="Times New Roman" panose="02020603050405020304" pitchFamily="18" charset="0"/>
-                  </a:rPr>
-                  <a:t>:</a:t>
+                  <a:t>Boundary Integral Equations</a:t>
                 </a:r>
               </a:p>
               <a:p>
@@ -6015,695 +6141,1148 @@
                   </a:spcAft>
                 </a:pPr>
                 <a14:m>
-                  <m:oMath xmlns:m="http://schemas.openxmlformats.org/officeDocument/2006/math">
-                    <m:sSub>
-                      <m:sSubPr>
-                        <m:ctrlPr>
-                          <a:rPr lang="en-US" sz="3200" b="0" i="1" smtClean="0">
-                            <a:latin typeface="Cambria Math" panose="02040503050406030204" pitchFamily="18" charset="0"/>
-                            <a:cs typeface="Times New Roman" panose="02020603050405020304" pitchFamily="18" charset="0"/>
-                          </a:rPr>
-                        </m:ctrlPr>
-                      </m:sSubPr>
-                      <m:e>
-                        <m:r>
-                          <a:rPr lang="en-US" sz="3200" b="0" i="1" smtClean="0">
-                            <a:latin typeface="Cambria Math" panose="02040503050406030204" pitchFamily="18" charset="0"/>
-                            <a:cs typeface="Times New Roman" panose="02020603050405020304" pitchFamily="18" charset="0"/>
-                          </a:rPr>
-                          <m:t>𝑢</m:t>
-                        </m:r>
-                      </m:e>
-                      <m:sub>
-                        <m:r>
-                          <a:rPr lang="en-US" sz="3200" b="0" i="1" smtClean="0">
-                            <a:latin typeface="Cambria Math" panose="02040503050406030204" pitchFamily="18" charset="0"/>
-                            <a:cs typeface="Times New Roman" panose="02020603050405020304" pitchFamily="18" charset="0"/>
-                          </a:rPr>
-                          <m:t>𝑒</m:t>
-                        </m:r>
-                      </m:sub>
-                    </m:sSub>
-                    <m:d>
-                      <m:dPr>
-                        <m:ctrlPr>
-                          <a:rPr lang="en-US" sz="3200" b="0" i="1" smtClean="0">
-                            <a:latin typeface="Cambria Math" panose="02040503050406030204" pitchFamily="18" charset="0"/>
-                            <a:cs typeface="Times New Roman" panose="02020603050405020304" pitchFamily="18" charset="0"/>
-                          </a:rPr>
-                        </m:ctrlPr>
-                      </m:dPr>
-                      <m:e>
-                        <m:acc>
-                          <m:accPr>
-                            <m:chr m:val="⃑"/>
-                            <m:ctrlPr>
-                              <a:rPr lang="en-US" sz="3200" b="0" i="1" smtClean="0">
-                                <a:latin typeface="Cambria Math" panose="02040503050406030204" pitchFamily="18" charset="0"/>
-                                <a:cs typeface="Times New Roman" panose="02020603050405020304" pitchFamily="18" charset="0"/>
-                              </a:rPr>
-                            </m:ctrlPr>
-                          </m:accPr>
-                          <m:e>
-                            <m:r>
-                              <a:rPr lang="en-US" sz="3200" b="0" i="1" smtClean="0">
-                                <a:latin typeface="Cambria Math" panose="02040503050406030204" pitchFamily="18" charset="0"/>
-                                <a:cs typeface="Times New Roman" panose="02020603050405020304" pitchFamily="18" charset="0"/>
-                              </a:rPr>
-                              <m:t>𝑥</m:t>
-                            </m:r>
-                          </m:e>
-                        </m:acc>
-                      </m:e>
-                    </m:d>
-                    <m:r>
-                      <a:rPr lang="en-US" sz="3200" b="0" i="1" smtClean="0">
-                        <a:latin typeface="Cambria Math" panose="02040503050406030204" pitchFamily="18" charset="0"/>
-                        <a:cs typeface="Times New Roman" panose="02020603050405020304" pitchFamily="18" charset="0"/>
-                      </a:rPr>
-                      <m:t>=</m:t>
-                    </m:r>
-                    <m:r>
-                      <a:rPr lang="en-US" sz="3200" b="0" i="1" smtClean="0">
-                        <a:latin typeface="Cambria Math" panose="02040503050406030204" pitchFamily="18" charset="0"/>
-                        <a:cs typeface="Times New Roman" panose="02020603050405020304" pitchFamily="18" charset="0"/>
-                      </a:rPr>
-                      <m:t>𝑓</m:t>
-                    </m:r>
-                    <m:d>
-                      <m:dPr>
-                        <m:ctrlPr>
-                          <a:rPr lang="en-US" sz="3200" b="0" i="1" smtClean="0">
-                            <a:latin typeface="Cambria Math" panose="02040503050406030204" pitchFamily="18" charset="0"/>
-                            <a:cs typeface="Times New Roman" panose="02020603050405020304" pitchFamily="18" charset="0"/>
-                          </a:rPr>
-                        </m:ctrlPr>
-                      </m:dPr>
-                      <m:e>
-                        <m:acc>
-                          <m:accPr>
-                            <m:chr m:val="⃑"/>
-                            <m:ctrlPr>
-                              <a:rPr lang="en-US" sz="3200" b="0" i="1" smtClean="0">
-                                <a:latin typeface="Cambria Math" panose="02040503050406030204" pitchFamily="18" charset="0"/>
-                                <a:cs typeface="Times New Roman" panose="02020603050405020304" pitchFamily="18" charset="0"/>
-                              </a:rPr>
-                            </m:ctrlPr>
-                          </m:accPr>
-                          <m:e>
-                            <m:r>
-                              <a:rPr lang="en-US" sz="3200" b="0" i="1" smtClean="0">
-                                <a:latin typeface="Cambria Math" panose="02040503050406030204" pitchFamily="18" charset="0"/>
-                                <a:cs typeface="Times New Roman" panose="02020603050405020304" pitchFamily="18" charset="0"/>
-                              </a:rPr>
-                              <m:t>𝑥</m:t>
-                            </m:r>
-                          </m:e>
-                        </m:acc>
-                      </m:e>
-                    </m:d>
-                    <m:r>
-                      <a:rPr lang="en-US" sz="3200" b="0" i="1" smtClean="0">
-                        <a:latin typeface="Cambria Math" panose="02040503050406030204" pitchFamily="18" charset="0"/>
-                        <a:cs typeface="Times New Roman" panose="02020603050405020304" pitchFamily="18" charset="0"/>
-                      </a:rPr>
-                      <m:t>+</m:t>
-                    </m:r>
-                    <m:nary>
-                      <m:naryPr>
-                        <m:ctrlPr>
-                          <a:rPr lang="en-US" sz="3200" b="0" i="1" smtClean="0">
-                            <a:latin typeface="Cambria Math" panose="02040503050406030204" pitchFamily="18" charset="0"/>
-                            <a:cs typeface="Times New Roman" panose="02020603050405020304" pitchFamily="18" charset="0"/>
-                          </a:rPr>
-                        </m:ctrlPr>
-                      </m:naryPr>
-                      <m:sub>
-                        <m:r>
-                          <m:rPr>
-                            <m:brk m:alnAt="23"/>
-                          </m:rPr>
-                          <a:rPr lang="en-US" sz="3200" b="0" i="1" smtClean="0">
-                            <a:latin typeface="Cambria Math" panose="02040503050406030204" pitchFamily="18" charset="0"/>
-                            <a:cs typeface="Times New Roman" panose="02020603050405020304" pitchFamily="18" charset="0"/>
-                          </a:rPr>
-                          <m:t>𝐵</m:t>
-                        </m:r>
-                      </m:sub>
-                      <m:sup/>
-                      <m:e>
-                        <m:f>
-                          <m:fPr>
-                            <m:ctrlPr>
-                              <a:rPr lang="en-US" sz="3200" b="0" i="1" smtClean="0">
-                                <a:latin typeface="Cambria Math" panose="02040503050406030204" pitchFamily="18" charset="0"/>
-                                <a:cs typeface="Times New Roman" panose="02020603050405020304" pitchFamily="18" charset="0"/>
-                              </a:rPr>
-                            </m:ctrlPr>
-                          </m:fPr>
-                          <m:num>
-                            <m:r>
-                              <a:rPr lang="en-US" sz="3200" b="0" i="1" smtClean="0">
-                                <a:latin typeface="Cambria Math" panose="02040503050406030204" pitchFamily="18" charset="0"/>
-                                <a:ea typeface="Cambria Math" panose="02040503050406030204" pitchFamily="18" charset="0"/>
-                                <a:cs typeface="Times New Roman" panose="02020603050405020304" pitchFamily="18" charset="0"/>
-                              </a:rPr>
-                              <m:t>𝜕</m:t>
-                            </m:r>
-                            <m:sSup>
-                              <m:sSupPr>
-                                <m:ctrlPr>
-                                  <a:rPr lang="en-US" sz="3200" b="0" i="1" smtClean="0">
-                                    <a:latin typeface="Cambria Math" panose="02040503050406030204" pitchFamily="18" charset="0"/>
-                                    <a:ea typeface="Cambria Math" panose="02040503050406030204" pitchFamily="18" charset="0"/>
-                                    <a:cs typeface="Times New Roman" panose="02020603050405020304" pitchFamily="18" charset="0"/>
-                                  </a:rPr>
-                                </m:ctrlPr>
-                              </m:sSupPr>
-                              <m:e>
-                                <m:r>
-                                  <m:rPr>
-                                    <m:sty m:val="p"/>
-                                  </m:rPr>
-                                  <a:rPr lang="en-US" sz="3200" b="0" i="0" smtClean="0">
-                                    <a:latin typeface="Cambria Math" panose="02040503050406030204" pitchFamily="18" charset="0"/>
-                                    <a:ea typeface="Cambria Math" panose="02040503050406030204" pitchFamily="18" charset="0"/>
-                                    <a:cs typeface="Times New Roman" panose="02020603050405020304" pitchFamily="18" charset="0"/>
-                                  </a:rPr>
-                                  <m:t>Φ</m:t>
-                                </m:r>
-                              </m:e>
-                              <m:sup>
-                                <m:r>
-                                  <a:rPr lang="en-US" sz="3200" b="0" i="1" smtClean="0">
-                                    <a:latin typeface="Cambria Math" panose="02040503050406030204" pitchFamily="18" charset="0"/>
-                                    <a:ea typeface="Cambria Math" panose="02040503050406030204" pitchFamily="18" charset="0"/>
-                                    <a:cs typeface="Times New Roman" panose="02020603050405020304" pitchFamily="18" charset="0"/>
-                                  </a:rPr>
-                                  <m:t>𝑒</m:t>
-                                </m:r>
-                              </m:sup>
-                            </m:sSup>
-                          </m:num>
-                          <m:den>
-                            <m:r>
-                              <a:rPr lang="en-US" sz="3200" b="0" i="1" smtClean="0">
-                                <a:latin typeface="Cambria Math" panose="02040503050406030204" pitchFamily="18" charset="0"/>
-                                <a:ea typeface="Cambria Math" panose="02040503050406030204" pitchFamily="18" charset="0"/>
-                                <a:cs typeface="Times New Roman" panose="02020603050405020304" pitchFamily="18" charset="0"/>
-                              </a:rPr>
-                              <m:t>𝜕𝜈</m:t>
-                            </m:r>
-                            <m:r>
-                              <a:rPr lang="en-US" sz="3200" b="0" i="1" smtClean="0">
-                                <a:latin typeface="Cambria Math" panose="02040503050406030204" pitchFamily="18" charset="0"/>
-                                <a:ea typeface="Cambria Math" panose="02040503050406030204" pitchFamily="18" charset="0"/>
-                                <a:cs typeface="Times New Roman" panose="02020603050405020304" pitchFamily="18" charset="0"/>
-                              </a:rPr>
-                              <m:t>(</m:t>
-                            </m:r>
-                            <m:acc>
-                              <m:accPr>
-                                <m:chr m:val="⃑"/>
-                                <m:ctrlPr>
-                                  <a:rPr lang="en-US" sz="3200" b="0" i="1" smtClean="0">
-                                    <a:latin typeface="Cambria Math" panose="02040503050406030204" pitchFamily="18" charset="0"/>
-                                    <a:ea typeface="Cambria Math" panose="02040503050406030204" pitchFamily="18" charset="0"/>
-                                    <a:cs typeface="Times New Roman" panose="02020603050405020304" pitchFamily="18" charset="0"/>
-                                  </a:rPr>
-                                </m:ctrlPr>
-                              </m:accPr>
-                              <m:e>
-                                <m:r>
-                                  <a:rPr lang="en-US" sz="3200" b="0" i="1" smtClean="0">
-                                    <a:latin typeface="Cambria Math" panose="02040503050406030204" pitchFamily="18" charset="0"/>
-                                    <a:ea typeface="Cambria Math" panose="02040503050406030204" pitchFamily="18" charset="0"/>
-                                    <a:cs typeface="Times New Roman" panose="02020603050405020304" pitchFamily="18" charset="0"/>
-                                  </a:rPr>
-                                  <m:t>𝑦</m:t>
-                                </m:r>
-                              </m:e>
-                            </m:acc>
-                            <m:r>
-                              <a:rPr lang="en-US" sz="3200" b="0" i="1" smtClean="0">
-                                <a:latin typeface="Cambria Math" panose="02040503050406030204" pitchFamily="18" charset="0"/>
-                                <a:cs typeface="Times New Roman" panose="02020603050405020304" pitchFamily="18" charset="0"/>
-                              </a:rPr>
-                              <m:t>)</m:t>
-                            </m:r>
-                          </m:den>
-                        </m:f>
-                      </m:e>
-                    </m:nary>
-                    <m:r>
-                      <a:rPr lang="en-US" sz="3200" b="0" i="1" smtClean="0">
-                        <a:latin typeface="Cambria Math" panose="02040503050406030204" pitchFamily="18" charset="0"/>
-                        <a:cs typeface="Times New Roman" panose="02020603050405020304" pitchFamily="18" charset="0"/>
-                      </a:rPr>
-                      <m:t> </m:t>
-                    </m:r>
-                    <m:d>
-                      <m:dPr>
-                        <m:ctrlPr>
-                          <a:rPr lang="en-US" sz="3200" b="0" i="1" smtClean="0">
-                            <a:latin typeface="Cambria Math" panose="02040503050406030204" pitchFamily="18" charset="0"/>
-                            <a:cs typeface="Times New Roman" panose="02020603050405020304" pitchFamily="18" charset="0"/>
-                          </a:rPr>
-                        </m:ctrlPr>
-                      </m:dPr>
-                      <m:e>
-                        <m:acc>
-                          <m:accPr>
-                            <m:chr m:val="⃑"/>
-                            <m:ctrlPr>
-                              <a:rPr lang="en-US" sz="3200" b="0" i="1" smtClean="0">
-                                <a:latin typeface="Cambria Math" panose="02040503050406030204" pitchFamily="18" charset="0"/>
-                                <a:cs typeface="Times New Roman" panose="02020603050405020304" pitchFamily="18" charset="0"/>
-                              </a:rPr>
-                            </m:ctrlPr>
-                          </m:accPr>
-                          <m:e>
-                            <m:r>
-                              <a:rPr lang="en-US" sz="3200" b="0" i="1" smtClean="0">
-                                <a:latin typeface="Cambria Math" panose="02040503050406030204" pitchFamily="18" charset="0"/>
-                                <a:cs typeface="Times New Roman" panose="02020603050405020304" pitchFamily="18" charset="0"/>
-                              </a:rPr>
-                              <m:t>𝑥</m:t>
-                            </m:r>
-                          </m:e>
-                        </m:acc>
-                        <m:r>
-                          <a:rPr lang="en-US" sz="3200" b="0" i="1" smtClean="0">
-                            <a:latin typeface="Cambria Math" panose="02040503050406030204" pitchFamily="18" charset="0"/>
-                            <a:cs typeface="Times New Roman" panose="02020603050405020304" pitchFamily="18" charset="0"/>
-                          </a:rPr>
-                          <m:t>, </m:t>
-                        </m:r>
-                        <m:acc>
-                          <m:accPr>
-                            <m:chr m:val="⃑"/>
-                            <m:ctrlPr>
-                              <a:rPr lang="en-US" sz="3200" b="0" i="1" smtClean="0">
-                                <a:latin typeface="Cambria Math" panose="02040503050406030204" pitchFamily="18" charset="0"/>
-                                <a:cs typeface="Times New Roman" panose="02020603050405020304" pitchFamily="18" charset="0"/>
-                              </a:rPr>
-                            </m:ctrlPr>
-                          </m:accPr>
-                          <m:e>
-                            <m:r>
-                              <a:rPr lang="en-US" sz="3200" b="0" i="1" smtClean="0">
-                                <a:latin typeface="Cambria Math" panose="02040503050406030204" pitchFamily="18" charset="0"/>
-                                <a:cs typeface="Times New Roman" panose="02020603050405020304" pitchFamily="18" charset="0"/>
-                              </a:rPr>
-                              <m:t>𝑦</m:t>
-                            </m:r>
-                          </m:e>
-                        </m:acc>
-                      </m:e>
-                    </m:d>
-                    <m:sSub>
-                      <m:sSubPr>
-                        <m:ctrlPr>
-                          <a:rPr lang="en-US" sz="3200" b="0" i="1" smtClean="0">
-                            <a:latin typeface="Cambria Math" panose="02040503050406030204" pitchFamily="18" charset="0"/>
-                            <a:cs typeface="Times New Roman" panose="02020603050405020304" pitchFamily="18" charset="0"/>
-                          </a:rPr>
-                        </m:ctrlPr>
-                      </m:sSubPr>
-                      <m:e>
-                        <m:r>
-                          <a:rPr lang="en-US" sz="3200" b="0" i="1" smtClean="0">
-                            <a:latin typeface="Cambria Math" panose="02040503050406030204" pitchFamily="18" charset="0"/>
-                            <a:cs typeface="Times New Roman" panose="02020603050405020304" pitchFamily="18" charset="0"/>
-                          </a:rPr>
-                          <m:t>𝑢</m:t>
-                        </m:r>
-                      </m:e>
-                      <m:sub>
-                        <m:r>
-                          <a:rPr lang="en-US" sz="3200" b="0" i="1" smtClean="0">
-                            <a:latin typeface="Cambria Math" panose="02040503050406030204" pitchFamily="18" charset="0"/>
-                            <a:cs typeface="Times New Roman" panose="02020603050405020304" pitchFamily="18" charset="0"/>
-                          </a:rPr>
-                          <m:t>𝑒</m:t>
-                        </m:r>
-                      </m:sub>
-                    </m:sSub>
-                    <m:d>
-                      <m:dPr>
-                        <m:ctrlPr>
-                          <a:rPr lang="en-US" sz="3200" b="0" i="1" smtClean="0">
-                            <a:latin typeface="Cambria Math" panose="02040503050406030204" pitchFamily="18" charset="0"/>
-                            <a:cs typeface="Times New Roman" panose="02020603050405020304" pitchFamily="18" charset="0"/>
-                          </a:rPr>
-                        </m:ctrlPr>
-                      </m:dPr>
-                      <m:e>
-                        <m:acc>
-                          <m:accPr>
-                            <m:chr m:val="⃑"/>
-                            <m:ctrlPr>
-                              <a:rPr lang="en-US" sz="3200" b="0" i="1" smtClean="0">
-                                <a:latin typeface="Cambria Math" panose="02040503050406030204" pitchFamily="18" charset="0"/>
-                                <a:cs typeface="Times New Roman" panose="02020603050405020304" pitchFamily="18" charset="0"/>
-                              </a:rPr>
-                            </m:ctrlPr>
-                          </m:accPr>
-                          <m:e>
-                            <m:r>
-                              <a:rPr lang="en-US" sz="3200" b="0" i="1" smtClean="0">
-                                <a:latin typeface="Cambria Math" panose="02040503050406030204" pitchFamily="18" charset="0"/>
-                                <a:cs typeface="Times New Roman" panose="02020603050405020304" pitchFamily="18" charset="0"/>
-                              </a:rPr>
-                              <m:t>𝑦</m:t>
-                            </m:r>
-                          </m:e>
-                        </m:acc>
-                      </m:e>
-                    </m:d>
-                    <m:r>
-                      <a:rPr lang="en-US" sz="3200" b="0" i="1" smtClean="0">
-                        <a:latin typeface="Cambria Math" panose="02040503050406030204" pitchFamily="18" charset="0"/>
-                        <a:cs typeface="Times New Roman" panose="02020603050405020304" pitchFamily="18" charset="0"/>
-                      </a:rPr>
-                      <m:t>− </m:t>
-                    </m:r>
-                    <m:nary>
-                      <m:naryPr>
-                        <m:ctrlPr>
-                          <a:rPr lang="en-US" sz="3200" b="0" i="1" smtClean="0">
-                            <a:latin typeface="Cambria Math" panose="02040503050406030204" pitchFamily="18" charset="0"/>
-                            <a:cs typeface="Times New Roman" panose="02020603050405020304" pitchFamily="18" charset="0"/>
-                          </a:rPr>
-                        </m:ctrlPr>
-                      </m:naryPr>
-                      <m:sub>
-                        <m:r>
-                          <m:rPr>
-                            <m:brk m:alnAt="23"/>
-                          </m:rPr>
-                          <a:rPr lang="en-US" sz="3200" b="0" i="1" smtClean="0">
-                            <a:latin typeface="Cambria Math" panose="02040503050406030204" pitchFamily="18" charset="0"/>
-                            <a:cs typeface="Times New Roman" panose="02020603050405020304" pitchFamily="18" charset="0"/>
-                          </a:rPr>
-                          <m:t>𝐵</m:t>
-                        </m:r>
-                      </m:sub>
-                      <m:sup/>
-                      <m:e>
-                        <m:sSup>
-                          <m:sSupPr>
-                            <m:ctrlPr>
-                              <a:rPr lang="en-US" sz="3200" b="0" i="1" smtClean="0">
-                                <a:latin typeface="Cambria Math" panose="02040503050406030204" pitchFamily="18" charset="0"/>
-                                <a:cs typeface="Times New Roman" panose="02020603050405020304" pitchFamily="18" charset="0"/>
-                              </a:rPr>
-                            </m:ctrlPr>
-                          </m:sSupPr>
-                          <m:e>
-                            <m:r>
-                              <m:rPr>
-                                <m:sty m:val="p"/>
-                              </m:rPr>
-                              <a:rPr lang="en-US" sz="3200" b="0" i="0" smtClean="0">
-                                <a:latin typeface="Cambria Math" panose="02040503050406030204" pitchFamily="18" charset="0"/>
-                                <a:cs typeface="Times New Roman" panose="02020603050405020304" pitchFamily="18" charset="0"/>
-                              </a:rPr>
-                              <m:t>Φ</m:t>
-                            </m:r>
-                          </m:e>
-                          <m:sup>
-                            <m:r>
-                              <a:rPr lang="en-US" sz="3200" b="0" i="1" smtClean="0">
-                                <a:latin typeface="Cambria Math" panose="02040503050406030204" pitchFamily="18" charset="0"/>
-                                <a:cs typeface="Times New Roman" panose="02020603050405020304" pitchFamily="18" charset="0"/>
-                              </a:rPr>
-                              <m:t>𝑒</m:t>
-                            </m:r>
-                          </m:sup>
-                        </m:sSup>
-                        <m:d>
-                          <m:dPr>
-                            <m:ctrlPr>
-                              <a:rPr lang="en-US" sz="3200" b="0" i="1" smtClean="0">
-                                <a:latin typeface="Cambria Math" panose="02040503050406030204" pitchFamily="18" charset="0"/>
-                                <a:cs typeface="Times New Roman" panose="02020603050405020304" pitchFamily="18" charset="0"/>
-                              </a:rPr>
-                            </m:ctrlPr>
-                          </m:dPr>
-                          <m:e>
-                            <m:acc>
-                              <m:accPr>
-                                <m:chr m:val="⃑"/>
-                                <m:ctrlPr>
-                                  <a:rPr lang="en-US" sz="3200" b="0" i="1" smtClean="0">
-                                    <a:latin typeface="Cambria Math" panose="02040503050406030204" pitchFamily="18" charset="0"/>
-                                    <a:cs typeface="Times New Roman" panose="02020603050405020304" pitchFamily="18" charset="0"/>
-                                  </a:rPr>
-                                </m:ctrlPr>
-                              </m:accPr>
-                              <m:e>
-                                <m:r>
-                                  <a:rPr lang="en-US" sz="3200" b="0" i="1" smtClean="0">
-                                    <a:latin typeface="Cambria Math" panose="02040503050406030204" pitchFamily="18" charset="0"/>
-                                    <a:cs typeface="Times New Roman" panose="02020603050405020304" pitchFamily="18" charset="0"/>
-                                  </a:rPr>
-                                  <m:t>𝑥</m:t>
-                                </m:r>
-                              </m:e>
-                            </m:acc>
-                            <m:r>
-                              <a:rPr lang="en-US" sz="3200" b="0" i="1" smtClean="0">
-                                <a:latin typeface="Cambria Math" panose="02040503050406030204" pitchFamily="18" charset="0"/>
-                                <a:cs typeface="Times New Roman" panose="02020603050405020304" pitchFamily="18" charset="0"/>
-                              </a:rPr>
-                              <m:t>, </m:t>
-                            </m:r>
-                            <m:acc>
-                              <m:accPr>
-                                <m:chr m:val="⃑"/>
-                                <m:ctrlPr>
-                                  <a:rPr lang="en-US" sz="3200" b="0" i="1" smtClean="0">
-                                    <a:latin typeface="Cambria Math" panose="02040503050406030204" pitchFamily="18" charset="0"/>
-                                    <a:cs typeface="Times New Roman" panose="02020603050405020304" pitchFamily="18" charset="0"/>
-                                  </a:rPr>
-                                </m:ctrlPr>
-                              </m:accPr>
-                              <m:e>
-                                <m:r>
-                                  <a:rPr lang="en-US" sz="3200" b="0" i="1" smtClean="0">
-                                    <a:latin typeface="Cambria Math" panose="02040503050406030204" pitchFamily="18" charset="0"/>
-                                    <a:cs typeface="Times New Roman" panose="02020603050405020304" pitchFamily="18" charset="0"/>
-                                  </a:rPr>
-                                  <m:t>𝑦</m:t>
-                                </m:r>
-                              </m:e>
-                            </m:acc>
-                          </m:e>
-                        </m:d>
-                        <m:f>
-                          <m:fPr>
-                            <m:ctrlPr>
-                              <a:rPr lang="en-US" sz="3200" b="0" i="1" smtClean="0">
-                                <a:latin typeface="Cambria Math" panose="02040503050406030204" pitchFamily="18" charset="0"/>
-                                <a:cs typeface="Times New Roman" panose="02020603050405020304" pitchFamily="18" charset="0"/>
-                              </a:rPr>
-                            </m:ctrlPr>
-                          </m:fPr>
-                          <m:num>
-                            <m:r>
-                              <a:rPr lang="en-US" sz="3200" b="0" i="1" smtClean="0">
-                                <a:latin typeface="Cambria Math" panose="02040503050406030204" pitchFamily="18" charset="0"/>
-                                <a:ea typeface="Cambria Math" panose="02040503050406030204" pitchFamily="18" charset="0"/>
-                                <a:cs typeface="Times New Roman" panose="02020603050405020304" pitchFamily="18" charset="0"/>
-                              </a:rPr>
-                              <m:t>𝜕</m:t>
-                            </m:r>
-                            <m:sSub>
-                              <m:sSubPr>
-                                <m:ctrlPr>
-                                  <a:rPr lang="en-US" sz="3200" b="0" i="1" smtClean="0">
-                                    <a:latin typeface="Cambria Math" panose="02040503050406030204" pitchFamily="18" charset="0"/>
-                                    <a:ea typeface="Cambria Math" panose="02040503050406030204" pitchFamily="18" charset="0"/>
-                                    <a:cs typeface="Times New Roman" panose="02020603050405020304" pitchFamily="18" charset="0"/>
-                                  </a:rPr>
-                                </m:ctrlPr>
-                              </m:sSubPr>
-                              <m:e>
-                                <m:r>
-                                  <a:rPr lang="en-US" sz="3200" b="0" i="1" smtClean="0">
-                                    <a:latin typeface="Cambria Math" panose="02040503050406030204" pitchFamily="18" charset="0"/>
-                                    <a:ea typeface="Cambria Math" panose="02040503050406030204" pitchFamily="18" charset="0"/>
-                                    <a:cs typeface="Times New Roman" panose="02020603050405020304" pitchFamily="18" charset="0"/>
-                                  </a:rPr>
-                                  <m:t>𝑢</m:t>
-                                </m:r>
-                              </m:e>
-                              <m:sub>
-                                <m:r>
-                                  <a:rPr lang="en-US" sz="3200" b="0" i="1" smtClean="0">
-                                    <a:latin typeface="Cambria Math" panose="02040503050406030204" pitchFamily="18" charset="0"/>
-                                    <a:ea typeface="Cambria Math" panose="02040503050406030204" pitchFamily="18" charset="0"/>
-                                    <a:cs typeface="Times New Roman" panose="02020603050405020304" pitchFamily="18" charset="0"/>
-                                  </a:rPr>
-                                  <m:t>𝑒</m:t>
-                                </m:r>
-                              </m:sub>
-                            </m:sSub>
-                          </m:num>
-                          <m:den>
-                            <m:r>
-                              <a:rPr lang="en-US" sz="3200" b="0" i="1" smtClean="0">
-                                <a:latin typeface="Cambria Math" panose="02040503050406030204" pitchFamily="18" charset="0"/>
-                                <a:ea typeface="Cambria Math" panose="02040503050406030204" pitchFamily="18" charset="0"/>
-                                <a:cs typeface="Times New Roman" panose="02020603050405020304" pitchFamily="18" charset="0"/>
-                              </a:rPr>
-                              <m:t>𝜕𝜈</m:t>
-                            </m:r>
-                            <m:d>
-                              <m:dPr>
-                                <m:ctrlPr>
-                                  <a:rPr lang="en-US" sz="3200" b="0" i="1" smtClean="0">
-                                    <a:latin typeface="Cambria Math" panose="02040503050406030204" pitchFamily="18" charset="0"/>
-                                    <a:ea typeface="Cambria Math" panose="02040503050406030204" pitchFamily="18" charset="0"/>
-                                    <a:cs typeface="Times New Roman" panose="02020603050405020304" pitchFamily="18" charset="0"/>
-                                  </a:rPr>
-                                </m:ctrlPr>
-                              </m:dPr>
-                              <m:e>
-                                <m:acc>
-                                  <m:accPr>
-                                    <m:chr m:val="⃑"/>
-                                    <m:ctrlPr>
-                                      <a:rPr lang="en-US" sz="3200" b="0" i="1" smtClean="0">
-                                        <a:latin typeface="Cambria Math" panose="02040503050406030204" pitchFamily="18" charset="0"/>
-                                        <a:ea typeface="Cambria Math" panose="02040503050406030204" pitchFamily="18" charset="0"/>
-                                        <a:cs typeface="Times New Roman" panose="02020603050405020304" pitchFamily="18" charset="0"/>
-                                      </a:rPr>
-                                    </m:ctrlPr>
-                                  </m:accPr>
-                                  <m:e>
-                                    <m:r>
-                                      <a:rPr lang="en-US" sz="3200" b="0" i="1" smtClean="0">
-                                        <a:latin typeface="Cambria Math" panose="02040503050406030204" pitchFamily="18" charset="0"/>
-                                        <a:ea typeface="Cambria Math" panose="02040503050406030204" pitchFamily="18" charset="0"/>
-                                        <a:cs typeface="Times New Roman" panose="02020603050405020304" pitchFamily="18" charset="0"/>
-                                      </a:rPr>
-                                      <m:t>𝑦</m:t>
-                                    </m:r>
-                                  </m:e>
-                                </m:acc>
-                              </m:e>
-                            </m:d>
-                          </m:den>
-                        </m:f>
-                        <m:d>
-                          <m:dPr>
-                            <m:ctrlPr>
-                              <a:rPr lang="en-US" sz="3200" b="0" i="1" smtClean="0">
-                                <a:latin typeface="Cambria Math" panose="02040503050406030204" pitchFamily="18" charset="0"/>
-                                <a:cs typeface="Times New Roman" panose="02020603050405020304" pitchFamily="18" charset="0"/>
-                              </a:rPr>
-                            </m:ctrlPr>
-                          </m:dPr>
-                          <m:e>
-                            <m:acc>
-                              <m:accPr>
-                                <m:chr m:val="⃑"/>
-                                <m:ctrlPr>
-                                  <a:rPr lang="en-US" sz="3200" b="0" i="1" smtClean="0">
-                                    <a:latin typeface="Cambria Math" panose="02040503050406030204" pitchFamily="18" charset="0"/>
-                                    <a:cs typeface="Times New Roman" panose="02020603050405020304" pitchFamily="18" charset="0"/>
-                                  </a:rPr>
-                                </m:ctrlPr>
-                              </m:accPr>
-                              <m:e>
-                                <m:r>
-                                  <a:rPr lang="en-US" sz="3200" b="0" i="1" smtClean="0">
-                                    <a:latin typeface="Cambria Math" panose="02040503050406030204" pitchFamily="18" charset="0"/>
-                                    <a:cs typeface="Times New Roman" panose="02020603050405020304" pitchFamily="18" charset="0"/>
-                                  </a:rPr>
-                                  <m:t>𝑦</m:t>
-                                </m:r>
-                              </m:e>
-                            </m:acc>
-                          </m:e>
-                        </m:d>
-                        <m:r>
-                          <a:rPr lang="en-US" sz="3200" b="0" i="1" smtClean="0">
-                            <a:latin typeface="Cambria Math" panose="02040503050406030204" pitchFamily="18" charset="0"/>
-                            <a:cs typeface="Times New Roman" panose="02020603050405020304" pitchFamily="18" charset="0"/>
-                          </a:rPr>
-                          <m:t>𝑑</m:t>
-                        </m:r>
-                        <m:sSub>
-                          <m:sSubPr>
-                            <m:ctrlPr>
-                              <a:rPr lang="en-US" sz="3200" b="0" i="1" smtClean="0">
-                                <a:latin typeface="Cambria Math" panose="02040503050406030204" pitchFamily="18" charset="0"/>
-                                <a:cs typeface="Times New Roman" panose="02020603050405020304" pitchFamily="18" charset="0"/>
-                              </a:rPr>
-                            </m:ctrlPr>
-                          </m:sSubPr>
-                          <m:e>
-                            <m:r>
-                              <a:rPr lang="en-US" sz="3200" b="0" i="1" smtClean="0">
-                                <a:latin typeface="Cambria Math" panose="02040503050406030204" pitchFamily="18" charset="0"/>
-                                <a:cs typeface="Times New Roman" panose="02020603050405020304" pitchFamily="18" charset="0"/>
-                              </a:rPr>
-                              <m:t>𝜎</m:t>
-                            </m:r>
-                          </m:e>
-                          <m:sub>
-                            <m:r>
-                              <a:rPr lang="en-US" sz="3200" b="0" i="1" smtClean="0">
-                                <a:latin typeface="Cambria Math" panose="02040503050406030204" pitchFamily="18" charset="0"/>
-                                <a:cs typeface="Times New Roman" panose="02020603050405020304" pitchFamily="18" charset="0"/>
-                              </a:rPr>
-                              <m:t>𝑦</m:t>
-                            </m:r>
-                          </m:sub>
-                        </m:sSub>
-                        <m:r>
-                          <a:rPr lang="en-US" sz="3200" b="0" i="1" smtClean="0">
-                            <a:latin typeface="Cambria Math" panose="02040503050406030204" pitchFamily="18" charset="0"/>
-                            <a:cs typeface="Times New Roman" panose="02020603050405020304" pitchFamily="18" charset="0"/>
-                          </a:rPr>
-                          <m:t>,    </m:t>
-                        </m:r>
-                        <m:r>
-                          <a:rPr lang="en-US" sz="3200" b="0" i="1" smtClean="0">
-                            <a:latin typeface="Cambria Math" panose="02040503050406030204" pitchFamily="18" charset="0"/>
-                            <a:cs typeface="Times New Roman" panose="02020603050405020304" pitchFamily="18" charset="0"/>
-                          </a:rPr>
-                          <m:t>𝑥</m:t>
-                        </m:r>
-                        <m:r>
-                          <a:rPr lang="en-US" sz="3200" b="0" i="1" smtClean="0">
-                            <a:latin typeface="Cambria Math" panose="02040503050406030204" pitchFamily="18" charset="0"/>
-                            <a:ea typeface="Cambria Math" panose="02040503050406030204" pitchFamily="18" charset="0"/>
-                            <a:cs typeface="Times New Roman" panose="02020603050405020304" pitchFamily="18" charset="0"/>
-                          </a:rPr>
-                          <m:t>∈</m:t>
-                        </m:r>
-                        <m:r>
-                          <a:rPr lang="en-US" sz="3200" b="0" i="1" smtClean="0">
-                            <a:latin typeface="Cambria Math" panose="02040503050406030204" pitchFamily="18" charset="0"/>
-                            <a:ea typeface="Cambria Math" panose="02040503050406030204" pitchFamily="18" charset="0"/>
-                            <a:cs typeface="Times New Roman" panose="02020603050405020304" pitchFamily="18" charset="0"/>
-                          </a:rPr>
-                          <m:t>𝐸</m:t>
-                        </m:r>
-                      </m:e>
-                    </m:nary>
-                  </m:oMath>
+                  <m:oMathPara xmlns:m="http://schemas.openxmlformats.org/officeDocument/2006/math">
+                    <m:oMathParaPr>
+                      <m:jc m:val="centerGroup"/>
+                    </m:oMathParaPr>
+                    <m:oMath xmlns:m="http://schemas.openxmlformats.org/officeDocument/2006/math">
+                      <m:sSub>
+                        <m:sSubPr>
+                          <m:ctrlPr>
+                            <a:rPr lang="en-US" sz="2800" b="0" i="1" smtClean="0">
+                              <a:latin typeface="Cambria Math" panose="02040503050406030204" pitchFamily="18" charset="0"/>
+                              <a:cs typeface="Times New Roman" panose="02020603050405020304" pitchFamily="18" charset="0"/>
+                            </a:rPr>
+                          </m:ctrlPr>
+                        </m:sSubPr>
+                        <m:e>
+                          <m:r>
+                            <a:rPr lang="en-US" sz="2800" b="0" i="1" smtClean="0">
+                              <a:latin typeface="Cambria Math" panose="02040503050406030204" pitchFamily="18" charset="0"/>
+                              <a:cs typeface="Times New Roman" panose="02020603050405020304" pitchFamily="18" charset="0"/>
+                            </a:rPr>
+                            <m:t>𝑢</m:t>
+                          </m:r>
+                        </m:e>
+                        <m:sub>
+                          <m:r>
+                            <a:rPr lang="en-US" sz="2800" b="0" i="1" smtClean="0">
+                              <a:latin typeface="Cambria Math" panose="02040503050406030204" pitchFamily="18" charset="0"/>
+                              <a:cs typeface="Times New Roman" panose="02020603050405020304" pitchFamily="18" charset="0"/>
+                            </a:rPr>
+                            <m:t>𝑒</m:t>
+                          </m:r>
+                        </m:sub>
+                      </m:sSub>
+                      <m:d>
+                        <m:dPr>
+                          <m:ctrlPr>
+                            <a:rPr lang="en-US" sz="2800" b="0" i="1" smtClean="0">
+                              <a:latin typeface="Cambria Math" panose="02040503050406030204" pitchFamily="18" charset="0"/>
+                              <a:cs typeface="Times New Roman" panose="02020603050405020304" pitchFamily="18" charset="0"/>
+                            </a:rPr>
+                          </m:ctrlPr>
+                        </m:dPr>
+                        <m:e>
+                          <m:r>
+                            <a:rPr lang="en-US" sz="2800" b="0" i="1" smtClean="0">
+                              <a:latin typeface="Cambria Math" panose="02040503050406030204" pitchFamily="18" charset="0"/>
+                              <a:cs typeface="Times New Roman" panose="02020603050405020304" pitchFamily="18" charset="0"/>
+                            </a:rPr>
+                            <m:t>𝑥</m:t>
+                          </m:r>
+                        </m:e>
+                      </m:d>
+                      <m:r>
+                        <a:rPr lang="en-US" sz="2800" b="0" i="1" smtClean="0">
+                          <a:latin typeface="Cambria Math" panose="02040503050406030204" pitchFamily="18" charset="0"/>
+                          <a:cs typeface="Times New Roman" panose="02020603050405020304" pitchFamily="18" charset="0"/>
+                        </a:rPr>
+                        <m:t>=</m:t>
+                      </m:r>
+                      <m:r>
+                        <a:rPr lang="en-US" sz="2800" b="0" i="1" smtClean="0">
+                          <a:latin typeface="Cambria Math" panose="02040503050406030204" pitchFamily="18" charset="0"/>
+                          <a:cs typeface="Times New Roman" panose="02020603050405020304" pitchFamily="18" charset="0"/>
+                        </a:rPr>
+                        <m:t>𝑓</m:t>
+                      </m:r>
+                      <m:d>
+                        <m:dPr>
+                          <m:ctrlPr>
+                            <a:rPr lang="en-US" sz="2800" b="0" i="1" smtClean="0">
+                              <a:latin typeface="Cambria Math" panose="02040503050406030204" pitchFamily="18" charset="0"/>
+                              <a:cs typeface="Times New Roman" panose="02020603050405020304" pitchFamily="18" charset="0"/>
+                            </a:rPr>
+                          </m:ctrlPr>
+                        </m:dPr>
+                        <m:e>
+                          <m:r>
+                            <a:rPr lang="en-US" sz="2800" b="0" i="1" smtClean="0">
+                              <a:latin typeface="Cambria Math" panose="02040503050406030204" pitchFamily="18" charset="0"/>
+                              <a:cs typeface="Times New Roman" panose="02020603050405020304" pitchFamily="18" charset="0"/>
+                            </a:rPr>
+                            <m:t>𝑥</m:t>
+                          </m:r>
+                        </m:e>
+                      </m:d>
+                      <m:r>
+                        <a:rPr lang="en-US" sz="2800" b="0" i="1" smtClean="0">
+                          <a:latin typeface="Cambria Math" panose="02040503050406030204" pitchFamily="18" charset="0"/>
+                          <a:cs typeface="Times New Roman" panose="02020603050405020304" pitchFamily="18" charset="0"/>
+                        </a:rPr>
+                        <m:t>+</m:t>
+                      </m:r>
+                      <m:nary>
+                        <m:naryPr>
+                          <m:supHide m:val="on"/>
+                          <m:ctrlPr>
+                            <a:rPr lang="en-US" sz="2800" b="0" i="1" smtClean="0">
+                              <a:latin typeface="Cambria Math" panose="02040503050406030204" pitchFamily="18" charset="0"/>
+                              <a:cs typeface="Times New Roman" panose="02020603050405020304" pitchFamily="18" charset="0"/>
+                            </a:rPr>
+                          </m:ctrlPr>
+                        </m:naryPr>
+                        <m:sub>
+                          <m:r>
+                            <a:rPr lang="en-US" sz="2800" b="0" i="1" smtClean="0">
+                              <a:latin typeface="Cambria Math" panose="02040503050406030204" pitchFamily="18" charset="0"/>
+                              <a:cs typeface="Times New Roman" panose="02020603050405020304" pitchFamily="18" charset="0"/>
+                            </a:rPr>
+                            <m:t>𝐵</m:t>
+                          </m:r>
+                        </m:sub>
+                        <m:sup/>
+                        <m:e>
+                          <m:f>
+                            <m:fPr>
+                              <m:ctrlPr>
+                                <a:rPr lang="en-US" sz="2800" b="0" i="1" smtClean="0">
+                                  <a:latin typeface="Cambria Math" panose="02040503050406030204" pitchFamily="18" charset="0"/>
+                                  <a:cs typeface="Times New Roman" panose="02020603050405020304" pitchFamily="18" charset="0"/>
+                                </a:rPr>
+                              </m:ctrlPr>
+                            </m:fPr>
+                            <m:num>
+                              <m:r>
+                                <a:rPr lang="en-US" sz="2800" b="0" i="1" smtClean="0">
+                                  <a:latin typeface="Cambria Math" panose="02040503050406030204" pitchFamily="18" charset="0"/>
+                                  <a:cs typeface="Times New Roman" panose="02020603050405020304" pitchFamily="18" charset="0"/>
+                                </a:rPr>
+                                <m:t>𝜕</m:t>
+                              </m:r>
+                              <m:sSup>
+                                <m:sSupPr>
+                                  <m:ctrlPr>
+                                    <a:rPr lang="en-US" sz="2800" b="0" i="0" smtClean="0">
+                                      <a:latin typeface="Cambria Math" panose="02040503050406030204" pitchFamily="18" charset="0"/>
+                                      <a:cs typeface="Times New Roman" panose="02020603050405020304" pitchFamily="18" charset="0"/>
+                                    </a:rPr>
+                                  </m:ctrlPr>
+                                </m:sSupPr>
+                                <m:e>
+                                  <m:r>
+                                    <m:rPr>
+                                      <m:sty m:val="p"/>
+                                    </m:rPr>
+                                    <a:rPr lang="en-US" sz="2800" b="0" i="0" smtClean="0">
+                                      <a:latin typeface="Cambria Math" panose="02040503050406030204" pitchFamily="18" charset="0"/>
+                                      <a:cs typeface="Times New Roman" panose="02020603050405020304" pitchFamily="18" charset="0"/>
+                                    </a:rPr>
+                                    <m:t>Φ</m:t>
+                                  </m:r>
+                                </m:e>
+                                <m:sup>
+                                  <m:r>
+                                    <a:rPr lang="en-US" sz="2800" b="0" i="1" smtClean="0">
+                                      <a:latin typeface="Cambria Math" panose="02040503050406030204" pitchFamily="18" charset="0"/>
+                                      <a:cs typeface="Times New Roman" panose="02020603050405020304" pitchFamily="18" charset="0"/>
+                                    </a:rPr>
+                                    <m:t>𝑒</m:t>
+                                  </m:r>
+                                </m:sup>
+                              </m:sSup>
+                            </m:num>
+                            <m:den>
+                              <m:r>
+                                <a:rPr lang="en-US" sz="2800" b="0" i="1" smtClean="0">
+                                  <a:latin typeface="Cambria Math" panose="02040503050406030204" pitchFamily="18" charset="0"/>
+                                  <a:cs typeface="Times New Roman" panose="02020603050405020304" pitchFamily="18" charset="0"/>
+                                </a:rPr>
+                                <m:t>𝜕𝜈</m:t>
+                              </m:r>
+                              <m:d>
+                                <m:dPr>
+                                  <m:ctrlPr>
+                                    <a:rPr lang="en-US" sz="2800" b="0" i="1" smtClean="0">
+                                      <a:latin typeface="Cambria Math" panose="02040503050406030204" pitchFamily="18" charset="0"/>
+                                      <a:cs typeface="Times New Roman" panose="02020603050405020304" pitchFamily="18" charset="0"/>
+                                    </a:rPr>
+                                  </m:ctrlPr>
+                                </m:dPr>
+                                <m:e>
+                                  <m:r>
+                                    <a:rPr lang="en-US" sz="2800" b="0" i="1" smtClean="0">
+                                      <a:latin typeface="Cambria Math" panose="02040503050406030204" pitchFamily="18" charset="0"/>
+                                      <a:cs typeface="Times New Roman" panose="02020603050405020304" pitchFamily="18" charset="0"/>
+                                    </a:rPr>
+                                    <m:t>𝑦</m:t>
+                                  </m:r>
+                                </m:e>
+                              </m:d>
+                            </m:den>
+                          </m:f>
+                        </m:e>
+                      </m:nary>
+                      <m:r>
+                        <a:rPr lang="en-US" sz="2800" b="0" i="1" smtClean="0">
+                          <a:latin typeface="Cambria Math" panose="02040503050406030204" pitchFamily="18" charset="0"/>
+                          <a:cs typeface="Times New Roman" panose="02020603050405020304" pitchFamily="18" charset="0"/>
+                        </a:rPr>
+                        <m:t> </m:t>
+                      </m:r>
+                      <m:d>
+                        <m:dPr>
+                          <m:ctrlPr>
+                            <a:rPr lang="en-US" sz="2800" b="0" i="1" smtClean="0">
+                              <a:latin typeface="Cambria Math" panose="02040503050406030204" pitchFamily="18" charset="0"/>
+                              <a:cs typeface="Times New Roman" panose="02020603050405020304" pitchFamily="18" charset="0"/>
+                            </a:rPr>
+                          </m:ctrlPr>
+                        </m:dPr>
+                        <m:e>
+                          <m:r>
+                            <a:rPr lang="en-US" sz="2800" b="0" i="1" smtClean="0">
+                              <a:latin typeface="Cambria Math" panose="02040503050406030204" pitchFamily="18" charset="0"/>
+                              <a:cs typeface="Times New Roman" panose="02020603050405020304" pitchFamily="18" charset="0"/>
+                            </a:rPr>
+                            <m:t>𝑥</m:t>
+                          </m:r>
+                          <m:r>
+                            <a:rPr lang="en-US" sz="2800" b="0" i="1" smtClean="0">
+                              <a:latin typeface="Cambria Math" panose="02040503050406030204" pitchFamily="18" charset="0"/>
+                              <a:cs typeface="Times New Roman" panose="02020603050405020304" pitchFamily="18" charset="0"/>
+                            </a:rPr>
+                            <m:t>, </m:t>
+                          </m:r>
+                          <m:r>
+                            <a:rPr lang="en-US" sz="2800" b="0" i="1" smtClean="0">
+                              <a:latin typeface="Cambria Math" panose="02040503050406030204" pitchFamily="18" charset="0"/>
+                              <a:cs typeface="Times New Roman" panose="02020603050405020304" pitchFamily="18" charset="0"/>
+                            </a:rPr>
+                            <m:t>𝑦</m:t>
+                          </m:r>
+                        </m:e>
+                      </m:d>
+                      <m:sSub>
+                        <m:sSubPr>
+                          <m:ctrlPr>
+                            <a:rPr lang="en-US" sz="2800" b="0" i="1" smtClean="0">
+                              <a:latin typeface="Cambria Math" panose="02040503050406030204" pitchFamily="18" charset="0"/>
+                              <a:cs typeface="Times New Roman" panose="02020603050405020304" pitchFamily="18" charset="0"/>
+                            </a:rPr>
+                          </m:ctrlPr>
+                        </m:sSubPr>
+                        <m:e>
+                          <m:r>
+                            <a:rPr lang="en-US" sz="2800" b="0" i="1" smtClean="0">
+                              <a:latin typeface="Cambria Math" panose="02040503050406030204" pitchFamily="18" charset="0"/>
+                              <a:cs typeface="Times New Roman" panose="02020603050405020304" pitchFamily="18" charset="0"/>
+                            </a:rPr>
+                            <m:t>𝑢</m:t>
+                          </m:r>
+                        </m:e>
+                        <m:sub>
+                          <m:r>
+                            <a:rPr lang="en-US" sz="2800" b="0" i="1" smtClean="0">
+                              <a:latin typeface="Cambria Math" panose="02040503050406030204" pitchFamily="18" charset="0"/>
+                              <a:cs typeface="Times New Roman" panose="02020603050405020304" pitchFamily="18" charset="0"/>
+                            </a:rPr>
+                            <m:t>𝑒</m:t>
+                          </m:r>
+                        </m:sub>
+                      </m:sSub>
+                      <m:d>
+                        <m:dPr>
+                          <m:ctrlPr>
+                            <a:rPr lang="en-US" sz="2800" b="0" i="1" smtClean="0">
+                              <a:latin typeface="Cambria Math" panose="02040503050406030204" pitchFamily="18" charset="0"/>
+                              <a:cs typeface="Times New Roman" panose="02020603050405020304" pitchFamily="18" charset="0"/>
+                            </a:rPr>
+                          </m:ctrlPr>
+                        </m:dPr>
+                        <m:e>
+                          <m:r>
+                            <a:rPr lang="en-US" sz="2800" b="0" i="1" smtClean="0">
+                              <a:latin typeface="Cambria Math" panose="02040503050406030204" pitchFamily="18" charset="0"/>
+                              <a:cs typeface="Times New Roman" panose="02020603050405020304" pitchFamily="18" charset="0"/>
+                            </a:rPr>
+                            <m:t>𝑦</m:t>
+                          </m:r>
+                        </m:e>
+                      </m:d>
+                      <m:r>
+                        <a:rPr lang="en-US" sz="2800" b="0" i="1" smtClean="0">
+                          <a:latin typeface="Cambria Math" panose="02040503050406030204" pitchFamily="18" charset="0"/>
+                          <a:cs typeface="Times New Roman" panose="02020603050405020304" pitchFamily="18" charset="0"/>
+                        </a:rPr>
+                        <m:t>−</m:t>
+                      </m:r>
+                      <m:nary>
+                        <m:naryPr>
+                          <m:supHide m:val="on"/>
+                          <m:ctrlPr>
+                            <a:rPr lang="en-US" sz="2800" b="0" i="1" smtClean="0">
+                              <a:latin typeface="Cambria Math" panose="02040503050406030204" pitchFamily="18" charset="0"/>
+                              <a:cs typeface="Times New Roman" panose="02020603050405020304" pitchFamily="18" charset="0"/>
+                            </a:rPr>
+                          </m:ctrlPr>
+                        </m:naryPr>
+                        <m:sub>
+                          <m:r>
+                            <m:rPr>
+                              <m:brk m:alnAt="7"/>
+                            </m:rPr>
+                            <a:rPr lang="en-US" sz="2800" b="0" i="1" smtClean="0">
+                              <a:latin typeface="Cambria Math" panose="02040503050406030204" pitchFamily="18" charset="0"/>
+                              <a:cs typeface="Times New Roman" panose="02020603050405020304" pitchFamily="18" charset="0"/>
+                            </a:rPr>
+                            <m:t>𝐵</m:t>
+                          </m:r>
+                        </m:sub>
+                        <m:sup/>
+                        <m:e>
+                          <m:sSup>
+                            <m:sSupPr>
+                              <m:ctrlPr>
+                                <a:rPr lang="en-US" sz="2800" b="0" i="1" smtClean="0">
+                                  <a:latin typeface="Cambria Math" panose="02040503050406030204" pitchFamily="18" charset="0"/>
+                                  <a:cs typeface="Times New Roman" panose="02020603050405020304" pitchFamily="18" charset="0"/>
+                                </a:rPr>
+                              </m:ctrlPr>
+                            </m:sSupPr>
+                            <m:e>
+                              <m:r>
+                                <m:rPr>
+                                  <m:sty m:val="p"/>
+                                </m:rPr>
+                                <a:rPr lang="en-US" sz="2800" b="0" i="0" smtClean="0">
+                                  <a:latin typeface="Cambria Math" panose="02040503050406030204" pitchFamily="18" charset="0"/>
+                                  <a:cs typeface="Times New Roman" panose="02020603050405020304" pitchFamily="18" charset="0"/>
+                                </a:rPr>
+                                <m:t>Φ</m:t>
+                              </m:r>
+                            </m:e>
+                            <m:sup>
+                              <m:r>
+                                <a:rPr lang="en-US" sz="2800" b="0" i="1" smtClean="0">
+                                  <a:latin typeface="Cambria Math" panose="02040503050406030204" pitchFamily="18" charset="0"/>
+                                  <a:cs typeface="Times New Roman" panose="02020603050405020304" pitchFamily="18" charset="0"/>
+                                </a:rPr>
+                                <m:t>𝑒</m:t>
+                              </m:r>
+                            </m:sup>
+                          </m:sSup>
+                          <m:d>
+                            <m:dPr>
+                              <m:ctrlPr>
+                                <a:rPr lang="en-US" sz="2800" b="0" i="1" smtClean="0">
+                                  <a:latin typeface="Cambria Math" panose="02040503050406030204" pitchFamily="18" charset="0"/>
+                                  <a:cs typeface="Times New Roman" panose="02020603050405020304" pitchFamily="18" charset="0"/>
+                                </a:rPr>
+                              </m:ctrlPr>
+                            </m:dPr>
+                            <m:e>
+                              <m:r>
+                                <a:rPr lang="en-US" sz="2800" b="0" i="1" smtClean="0">
+                                  <a:latin typeface="Cambria Math" panose="02040503050406030204" pitchFamily="18" charset="0"/>
+                                  <a:cs typeface="Times New Roman" panose="02020603050405020304" pitchFamily="18" charset="0"/>
+                                </a:rPr>
+                                <m:t>𝑥</m:t>
+                              </m:r>
+                              <m:r>
+                                <a:rPr lang="en-US" sz="2800" b="0" i="1" smtClean="0">
+                                  <a:latin typeface="Cambria Math" panose="02040503050406030204" pitchFamily="18" charset="0"/>
+                                  <a:cs typeface="Times New Roman" panose="02020603050405020304" pitchFamily="18" charset="0"/>
+                                </a:rPr>
+                                <m:t>,</m:t>
+                              </m:r>
+                              <m:r>
+                                <a:rPr lang="en-US" sz="2800" b="0" i="1" smtClean="0">
+                                  <a:latin typeface="Cambria Math" panose="02040503050406030204" pitchFamily="18" charset="0"/>
+                                  <a:cs typeface="Times New Roman" panose="02020603050405020304" pitchFamily="18" charset="0"/>
+                                </a:rPr>
+                                <m:t>𝑦</m:t>
+                              </m:r>
+                            </m:e>
+                          </m:d>
+                          <m:f>
+                            <m:fPr>
+                              <m:ctrlPr>
+                                <a:rPr lang="en-US" sz="2800" b="0" i="1" smtClean="0">
+                                  <a:latin typeface="Cambria Math" panose="02040503050406030204" pitchFamily="18" charset="0"/>
+                                  <a:cs typeface="Times New Roman" panose="02020603050405020304" pitchFamily="18" charset="0"/>
+                                </a:rPr>
+                              </m:ctrlPr>
+                            </m:fPr>
+                            <m:num>
+                              <m:r>
+                                <a:rPr lang="en-US" sz="2800" b="0" i="1" smtClean="0">
+                                  <a:latin typeface="Cambria Math" panose="02040503050406030204" pitchFamily="18" charset="0"/>
+                                  <a:cs typeface="Times New Roman" panose="02020603050405020304" pitchFamily="18" charset="0"/>
+                                </a:rPr>
+                                <m:t>𝜕</m:t>
+                              </m:r>
+                              <m:sSub>
+                                <m:sSubPr>
+                                  <m:ctrlPr>
+                                    <a:rPr lang="en-US" sz="2800" b="0" i="1" smtClean="0">
+                                      <a:latin typeface="Cambria Math" panose="02040503050406030204" pitchFamily="18" charset="0"/>
+                                      <a:cs typeface="Times New Roman" panose="02020603050405020304" pitchFamily="18" charset="0"/>
+                                    </a:rPr>
+                                  </m:ctrlPr>
+                                </m:sSubPr>
+                                <m:e>
+                                  <m:r>
+                                    <a:rPr lang="en-US" sz="2800" b="0" i="1" smtClean="0">
+                                      <a:latin typeface="Cambria Math" panose="02040503050406030204" pitchFamily="18" charset="0"/>
+                                      <a:cs typeface="Times New Roman" panose="02020603050405020304" pitchFamily="18" charset="0"/>
+                                    </a:rPr>
+                                    <m:t>𝑢</m:t>
+                                  </m:r>
+                                </m:e>
+                                <m:sub>
+                                  <m:r>
+                                    <a:rPr lang="en-US" sz="2800" b="0" i="1" smtClean="0">
+                                      <a:latin typeface="Cambria Math" panose="02040503050406030204" pitchFamily="18" charset="0"/>
+                                      <a:cs typeface="Times New Roman" panose="02020603050405020304" pitchFamily="18" charset="0"/>
+                                    </a:rPr>
+                                    <m:t>𝑒</m:t>
+                                  </m:r>
+                                </m:sub>
+                              </m:sSub>
+                            </m:num>
+                            <m:den>
+                              <m:r>
+                                <a:rPr lang="en-US" sz="2800" b="0" i="1" smtClean="0">
+                                  <a:latin typeface="Cambria Math" panose="02040503050406030204" pitchFamily="18" charset="0"/>
+                                  <a:cs typeface="Times New Roman" panose="02020603050405020304" pitchFamily="18" charset="0"/>
+                                </a:rPr>
+                                <m:t>𝑑</m:t>
+                              </m:r>
+                              <m:r>
+                                <a:rPr lang="en-US" sz="2800" b="0" i="1" smtClean="0">
+                                  <a:latin typeface="Cambria Math" panose="02040503050406030204" pitchFamily="18" charset="0"/>
+                                  <a:cs typeface="Times New Roman" panose="02020603050405020304" pitchFamily="18" charset="0"/>
+                                </a:rPr>
+                                <m:t>𝜈</m:t>
+                              </m:r>
+                              <m:d>
+                                <m:dPr>
+                                  <m:ctrlPr>
+                                    <a:rPr lang="en-US" sz="2800" b="0" i="1" smtClean="0">
+                                      <a:latin typeface="Cambria Math" panose="02040503050406030204" pitchFamily="18" charset="0"/>
+                                      <a:cs typeface="Times New Roman" panose="02020603050405020304" pitchFamily="18" charset="0"/>
+                                    </a:rPr>
+                                  </m:ctrlPr>
+                                </m:dPr>
+                                <m:e>
+                                  <m:r>
+                                    <a:rPr lang="en-US" sz="2800" b="0" i="1" smtClean="0">
+                                      <a:latin typeface="Cambria Math" panose="02040503050406030204" pitchFamily="18" charset="0"/>
+                                      <a:cs typeface="Times New Roman" panose="02020603050405020304" pitchFamily="18" charset="0"/>
+                                    </a:rPr>
+                                    <m:t>𝑦</m:t>
+                                  </m:r>
+                                </m:e>
+                              </m:d>
+                            </m:den>
+                          </m:f>
+                          <m:d>
+                            <m:dPr>
+                              <m:ctrlPr>
+                                <a:rPr lang="en-US" sz="2800" b="0" i="1" smtClean="0">
+                                  <a:latin typeface="Cambria Math" panose="02040503050406030204" pitchFamily="18" charset="0"/>
+                                  <a:cs typeface="Times New Roman" panose="02020603050405020304" pitchFamily="18" charset="0"/>
+                                </a:rPr>
+                              </m:ctrlPr>
+                            </m:dPr>
+                            <m:e>
+                              <m:r>
+                                <a:rPr lang="en-US" sz="2800" b="0" i="1" smtClean="0">
+                                  <a:latin typeface="Cambria Math" panose="02040503050406030204" pitchFamily="18" charset="0"/>
+                                  <a:cs typeface="Times New Roman" panose="02020603050405020304" pitchFamily="18" charset="0"/>
+                                </a:rPr>
+                                <m:t>𝑦</m:t>
+                              </m:r>
+                            </m:e>
+                          </m:d>
+                          <m:r>
+                            <a:rPr lang="en-US" sz="2800" b="0" i="1" smtClean="0">
+                              <a:latin typeface="Cambria Math" panose="02040503050406030204" pitchFamily="18" charset="0"/>
+                              <a:cs typeface="Times New Roman" panose="02020603050405020304" pitchFamily="18" charset="0"/>
+                            </a:rPr>
+                            <m:t>𝑑</m:t>
+                          </m:r>
+                          <m:sSub>
+                            <m:sSubPr>
+                              <m:ctrlPr>
+                                <a:rPr lang="en-US" sz="2800" b="0" i="1" smtClean="0">
+                                  <a:latin typeface="Cambria Math" panose="02040503050406030204" pitchFamily="18" charset="0"/>
+                                  <a:cs typeface="Times New Roman" panose="02020603050405020304" pitchFamily="18" charset="0"/>
+                                </a:rPr>
+                              </m:ctrlPr>
+                            </m:sSubPr>
+                            <m:e>
+                              <m:r>
+                                <a:rPr lang="en-US" sz="2800" b="0" i="1" smtClean="0">
+                                  <a:latin typeface="Cambria Math" panose="02040503050406030204" pitchFamily="18" charset="0"/>
+                                  <a:cs typeface="Times New Roman" panose="02020603050405020304" pitchFamily="18" charset="0"/>
+                                </a:rPr>
+                                <m:t>𝜎</m:t>
+                              </m:r>
+                            </m:e>
+                            <m:sub>
+                              <m:r>
+                                <a:rPr lang="en-US" sz="2800" b="0" i="1" smtClean="0">
+                                  <a:latin typeface="Cambria Math" panose="02040503050406030204" pitchFamily="18" charset="0"/>
+                                  <a:cs typeface="Times New Roman" panose="02020603050405020304" pitchFamily="18" charset="0"/>
+                                </a:rPr>
+                                <m:t>𝑦</m:t>
+                              </m:r>
+                            </m:sub>
+                          </m:sSub>
+                          <m:r>
+                            <a:rPr lang="en-US" sz="2800" b="0" i="1" smtClean="0">
+                              <a:latin typeface="Cambria Math" panose="02040503050406030204" pitchFamily="18" charset="0"/>
+                              <a:cs typeface="Times New Roman" panose="02020603050405020304" pitchFamily="18" charset="0"/>
+                            </a:rPr>
+                            <m:t>,  </m:t>
+                          </m:r>
+                          <m:r>
+                            <a:rPr lang="en-US" sz="2800" b="0" i="1" smtClean="0">
+                              <a:latin typeface="Cambria Math" panose="02040503050406030204" pitchFamily="18" charset="0"/>
+                              <a:cs typeface="Times New Roman" panose="02020603050405020304" pitchFamily="18" charset="0"/>
+                            </a:rPr>
+                            <m:t>𝑥</m:t>
+                          </m:r>
+                          <m:r>
+                            <a:rPr lang="en-US" sz="2800" b="0" i="1" smtClean="0">
+                              <a:latin typeface="Cambria Math" panose="02040503050406030204" pitchFamily="18" charset="0"/>
+                              <a:cs typeface="Times New Roman" panose="02020603050405020304" pitchFamily="18" charset="0"/>
+                            </a:rPr>
+                            <m:t> ∈</m:t>
+                          </m:r>
+                          <m:r>
+                            <a:rPr lang="en-US" sz="2800" b="0" i="1" smtClean="0">
+                              <a:latin typeface="Cambria Math" panose="02040503050406030204" pitchFamily="18" charset="0"/>
+                              <a:ea typeface="Cambria Math" panose="02040503050406030204" pitchFamily="18" charset="0"/>
+                              <a:cs typeface="Times New Roman" panose="02020603050405020304" pitchFamily="18" charset="0"/>
+                            </a:rPr>
+                            <m:t>𝐸</m:t>
+                          </m:r>
+                        </m:e>
+                      </m:nary>
+                    </m:oMath>
+                  </m:oMathPara>
                 </a14:m>
-                <a:r>
-                  <a:rPr lang="en-US" sz="3200" u="sng" dirty="0">
-                    <a:cs typeface="Times New Roman" panose="02020603050405020304" pitchFamily="18" charset="0"/>
-                  </a:rPr>
-                  <a:t> </a:t>
-                </a:r>
+                <a:endParaRPr lang="en-US" sz="3200" u="sng" dirty="0">
+                  <a:cs typeface="Times New Roman" panose="02020603050405020304" pitchFamily="18" charset="0"/>
+                </a:endParaRPr>
+              </a:p>
+              <a:p>
+                <a:pPr algn="ctr">
+                  <a:spcAft>
+                    <a:spcPts val="600"/>
+                  </a:spcAft>
+                </a:pPr>
+                <a14:m>
+                  <m:oMathPara xmlns:m="http://schemas.openxmlformats.org/officeDocument/2006/math">
+                    <m:oMathParaPr>
+                      <m:jc m:val="centerGroup"/>
+                    </m:oMathParaPr>
+                    <m:oMath xmlns:m="http://schemas.openxmlformats.org/officeDocument/2006/math">
+                      <m:sSub>
+                        <m:sSubPr>
+                          <m:ctrlPr>
+                            <a:rPr lang="en-US" sz="2800" b="0" i="1" smtClean="0">
+                              <a:latin typeface="Cambria Math" panose="02040503050406030204" pitchFamily="18" charset="0"/>
+                              <a:cs typeface="Times New Roman" panose="02020603050405020304" pitchFamily="18" charset="0"/>
+                            </a:rPr>
+                          </m:ctrlPr>
+                        </m:sSubPr>
+                        <m:e>
+                          <m:r>
+                            <a:rPr lang="en-US" sz="2800" b="0" i="1" smtClean="0">
+                              <a:latin typeface="Cambria Math" panose="02040503050406030204" pitchFamily="18" charset="0"/>
+                              <a:cs typeface="Times New Roman" panose="02020603050405020304" pitchFamily="18" charset="0"/>
+                            </a:rPr>
+                            <m:t>𝑢</m:t>
+                          </m:r>
+                        </m:e>
+                        <m:sub>
+                          <m:r>
+                            <a:rPr lang="en-US" sz="2800" b="0" i="1" smtClean="0">
+                              <a:latin typeface="Cambria Math" panose="02040503050406030204" pitchFamily="18" charset="0"/>
+                              <a:cs typeface="Times New Roman" panose="02020603050405020304" pitchFamily="18" charset="0"/>
+                            </a:rPr>
+                            <m:t>𝑖</m:t>
+                          </m:r>
+                        </m:sub>
+                      </m:sSub>
+                      <m:d>
+                        <m:dPr>
+                          <m:ctrlPr>
+                            <a:rPr lang="en-US" sz="2800" b="0" i="1" smtClean="0">
+                              <a:latin typeface="Cambria Math" panose="02040503050406030204" pitchFamily="18" charset="0"/>
+                              <a:cs typeface="Times New Roman" panose="02020603050405020304" pitchFamily="18" charset="0"/>
+                            </a:rPr>
+                          </m:ctrlPr>
+                        </m:dPr>
+                        <m:e>
+                          <m:r>
+                            <a:rPr lang="en-US" sz="2800" b="0" i="1" smtClean="0">
+                              <a:latin typeface="Cambria Math" panose="02040503050406030204" pitchFamily="18" charset="0"/>
+                              <a:cs typeface="Times New Roman" panose="02020603050405020304" pitchFamily="18" charset="0"/>
+                            </a:rPr>
+                            <m:t>𝑥</m:t>
+                          </m:r>
+                        </m:e>
+                      </m:d>
+                      <m:r>
+                        <a:rPr lang="en-US" sz="2800" b="0" i="1" smtClean="0">
+                          <a:latin typeface="Cambria Math" panose="02040503050406030204" pitchFamily="18" charset="0"/>
+                          <a:cs typeface="Times New Roman" panose="02020603050405020304" pitchFamily="18" charset="0"/>
+                        </a:rPr>
+                        <m:t>=−</m:t>
+                      </m:r>
+                      <m:nary>
+                        <m:naryPr>
+                          <m:supHide m:val="on"/>
+                          <m:ctrlPr>
+                            <a:rPr lang="en-US" sz="2800" b="0" i="1" smtClean="0">
+                              <a:latin typeface="Cambria Math" panose="02040503050406030204" pitchFamily="18" charset="0"/>
+                              <a:cs typeface="Times New Roman" panose="02020603050405020304" pitchFamily="18" charset="0"/>
+                            </a:rPr>
+                          </m:ctrlPr>
+                        </m:naryPr>
+                        <m:sub>
+                          <m:r>
+                            <a:rPr lang="en-US" sz="2800" b="0" i="1" smtClean="0">
+                              <a:latin typeface="Cambria Math" panose="02040503050406030204" pitchFamily="18" charset="0"/>
+                              <a:cs typeface="Times New Roman" panose="02020603050405020304" pitchFamily="18" charset="0"/>
+                            </a:rPr>
+                            <m:t>𝐵</m:t>
+                          </m:r>
+                        </m:sub>
+                        <m:sup/>
+                        <m:e>
+                          <m:f>
+                            <m:fPr>
+                              <m:ctrlPr>
+                                <a:rPr lang="en-US" sz="2800" b="0" i="1" smtClean="0">
+                                  <a:latin typeface="Cambria Math" panose="02040503050406030204" pitchFamily="18" charset="0"/>
+                                  <a:cs typeface="Times New Roman" panose="02020603050405020304" pitchFamily="18" charset="0"/>
+                                </a:rPr>
+                              </m:ctrlPr>
+                            </m:fPr>
+                            <m:num>
+                              <m:r>
+                                <a:rPr lang="en-US" sz="2800" b="0" i="1" smtClean="0">
+                                  <a:latin typeface="Cambria Math" panose="02040503050406030204" pitchFamily="18" charset="0"/>
+                                  <a:ea typeface="Cambria Math" panose="02040503050406030204" pitchFamily="18" charset="0"/>
+                                  <a:cs typeface="Times New Roman" panose="02020603050405020304" pitchFamily="18" charset="0"/>
+                                </a:rPr>
+                                <m:t>𝜕</m:t>
+                              </m:r>
+                              <m:sSup>
+                                <m:sSupPr>
+                                  <m:ctrlPr>
+                                    <a:rPr lang="en-US" sz="2800" b="0" i="1" smtClean="0">
+                                      <a:latin typeface="Cambria Math" panose="02040503050406030204" pitchFamily="18" charset="0"/>
+                                      <a:ea typeface="Cambria Math" panose="02040503050406030204" pitchFamily="18" charset="0"/>
+                                      <a:cs typeface="Times New Roman" panose="02020603050405020304" pitchFamily="18" charset="0"/>
+                                    </a:rPr>
+                                  </m:ctrlPr>
+                                </m:sSupPr>
+                                <m:e>
+                                  <m:r>
+                                    <m:rPr>
+                                      <m:sty m:val="p"/>
+                                    </m:rPr>
+                                    <a:rPr lang="en-US" sz="2800" b="0" i="0" smtClean="0">
+                                      <a:latin typeface="Cambria Math" panose="02040503050406030204" pitchFamily="18" charset="0"/>
+                                      <a:ea typeface="Cambria Math" panose="02040503050406030204" pitchFamily="18" charset="0"/>
+                                      <a:cs typeface="Times New Roman" panose="02020603050405020304" pitchFamily="18" charset="0"/>
+                                    </a:rPr>
+                                    <m:t>Φ</m:t>
+                                  </m:r>
+                                </m:e>
+                                <m:sup>
+                                  <m:r>
+                                    <a:rPr lang="en-US" sz="2800" b="0" i="1" smtClean="0">
+                                      <a:latin typeface="Cambria Math" panose="02040503050406030204" pitchFamily="18" charset="0"/>
+                                      <a:ea typeface="Cambria Math" panose="02040503050406030204" pitchFamily="18" charset="0"/>
+                                      <a:cs typeface="Times New Roman" panose="02020603050405020304" pitchFamily="18" charset="0"/>
+                                    </a:rPr>
+                                    <m:t>𝑖</m:t>
+                                  </m:r>
+                                </m:sup>
+                              </m:sSup>
+                            </m:num>
+                            <m:den>
+                              <m:r>
+                                <a:rPr lang="en-US" sz="2800" b="0" i="1" smtClean="0">
+                                  <a:latin typeface="Cambria Math" panose="02040503050406030204" pitchFamily="18" charset="0"/>
+                                  <a:ea typeface="Cambria Math" panose="02040503050406030204" pitchFamily="18" charset="0"/>
+                                  <a:cs typeface="Times New Roman" panose="02020603050405020304" pitchFamily="18" charset="0"/>
+                                </a:rPr>
+                                <m:t>𝜕𝜈</m:t>
+                              </m:r>
+                              <m:d>
+                                <m:dPr>
+                                  <m:ctrlPr>
+                                    <a:rPr lang="en-US" sz="2800" b="0" i="1" smtClean="0">
+                                      <a:latin typeface="Cambria Math" panose="02040503050406030204" pitchFamily="18" charset="0"/>
+                                      <a:ea typeface="Cambria Math" panose="02040503050406030204" pitchFamily="18" charset="0"/>
+                                      <a:cs typeface="Times New Roman" panose="02020603050405020304" pitchFamily="18" charset="0"/>
+                                    </a:rPr>
+                                  </m:ctrlPr>
+                                </m:dPr>
+                                <m:e>
+                                  <m:r>
+                                    <a:rPr lang="en-US" sz="2800" b="0" i="1" smtClean="0">
+                                      <a:latin typeface="Cambria Math" panose="02040503050406030204" pitchFamily="18" charset="0"/>
+                                      <a:ea typeface="Cambria Math" panose="02040503050406030204" pitchFamily="18" charset="0"/>
+                                      <a:cs typeface="Times New Roman" panose="02020603050405020304" pitchFamily="18" charset="0"/>
+                                    </a:rPr>
+                                    <m:t>𝑦</m:t>
+                                  </m:r>
+                                </m:e>
+                              </m:d>
+                            </m:den>
+                          </m:f>
+                          <m:d>
+                            <m:dPr>
+                              <m:ctrlPr>
+                                <a:rPr lang="en-US" sz="2800" b="0" i="1" smtClean="0">
+                                  <a:latin typeface="Cambria Math" panose="02040503050406030204" pitchFamily="18" charset="0"/>
+                                  <a:cs typeface="Times New Roman" panose="02020603050405020304" pitchFamily="18" charset="0"/>
+                                </a:rPr>
+                              </m:ctrlPr>
+                            </m:dPr>
+                            <m:e>
+                              <m:r>
+                                <a:rPr lang="en-US" sz="2800" b="0" i="1" smtClean="0">
+                                  <a:latin typeface="Cambria Math" panose="02040503050406030204" pitchFamily="18" charset="0"/>
+                                  <a:cs typeface="Times New Roman" panose="02020603050405020304" pitchFamily="18" charset="0"/>
+                                </a:rPr>
+                                <m:t>𝑥</m:t>
+                              </m:r>
+                              <m:r>
+                                <a:rPr lang="en-US" sz="2800" b="0" i="1" smtClean="0">
+                                  <a:latin typeface="Cambria Math" panose="02040503050406030204" pitchFamily="18" charset="0"/>
+                                  <a:cs typeface="Times New Roman" panose="02020603050405020304" pitchFamily="18" charset="0"/>
+                                </a:rPr>
+                                <m:t>, </m:t>
+                              </m:r>
+                              <m:r>
+                                <a:rPr lang="en-US" sz="2800" b="0" i="1" smtClean="0">
+                                  <a:latin typeface="Cambria Math" panose="02040503050406030204" pitchFamily="18" charset="0"/>
+                                  <a:cs typeface="Times New Roman" panose="02020603050405020304" pitchFamily="18" charset="0"/>
+                                </a:rPr>
+                                <m:t>𝑦</m:t>
+                              </m:r>
+                            </m:e>
+                          </m:d>
+                          <m:sSub>
+                            <m:sSubPr>
+                              <m:ctrlPr>
+                                <a:rPr lang="en-US" sz="2800" b="0" i="1" smtClean="0">
+                                  <a:latin typeface="Cambria Math" panose="02040503050406030204" pitchFamily="18" charset="0"/>
+                                  <a:cs typeface="Times New Roman" panose="02020603050405020304" pitchFamily="18" charset="0"/>
+                                </a:rPr>
+                              </m:ctrlPr>
+                            </m:sSubPr>
+                            <m:e>
+                              <m:r>
+                                <a:rPr lang="en-US" sz="2800" b="0" i="1" smtClean="0">
+                                  <a:latin typeface="Cambria Math" panose="02040503050406030204" pitchFamily="18" charset="0"/>
+                                  <a:cs typeface="Times New Roman" panose="02020603050405020304" pitchFamily="18" charset="0"/>
+                                </a:rPr>
+                                <m:t>𝑢</m:t>
+                              </m:r>
+                            </m:e>
+                            <m:sub>
+                              <m:r>
+                                <a:rPr lang="en-US" sz="2800" b="0" i="1" smtClean="0">
+                                  <a:latin typeface="Cambria Math" panose="02040503050406030204" pitchFamily="18" charset="0"/>
+                                  <a:cs typeface="Times New Roman" panose="02020603050405020304" pitchFamily="18" charset="0"/>
+                                </a:rPr>
+                                <m:t>𝑒</m:t>
+                              </m:r>
+                            </m:sub>
+                          </m:sSub>
+                          <m:d>
+                            <m:dPr>
+                              <m:ctrlPr>
+                                <a:rPr lang="en-US" sz="2800" b="0" i="1" smtClean="0">
+                                  <a:latin typeface="Cambria Math" panose="02040503050406030204" pitchFamily="18" charset="0"/>
+                                  <a:cs typeface="Times New Roman" panose="02020603050405020304" pitchFamily="18" charset="0"/>
+                                </a:rPr>
+                              </m:ctrlPr>
+                            </m:dPr>
+                            <m:e>
+                              <m:r>
+                                <a:rPr lang="en-US" sz="2800" b="0" i="1" smtClean="0">
+                                  <a:latin typeface="Cambria Math" panose="02040503050406030204" pitchFamily="18" charset="0"/>
+                                  <a:cs typeface="Times New Roman" panose="02020603050405020304" pitchFamily="18" charset="0"/>
+                                </a:rPr>
+                                <m:t>𝑦</m:t>
+                              </m:r>
+                            </m:e>
+                          </m:d>
+                          <m:r>
+                            <a:rPr lang="en-US" sz="2800" b="0" i="1" smtClean="0">
+                              <a:latin typeface="Cambria Math" panose="02040503050406030204" pitchFamily="18" charset="0"/>
+                              <a:cs typeface="Times New Roman" panose="02020603050405020304" pitchFamily="18" charset="0"/>
+                            </a:rPr>
+                            <m:t>+ </m:t>
+                          </m:r>
+                          <m:f>
+                            <m:fPr>
+                              <m:ctrlPr>
+                                <a:rPr lang="en-US" sz="2800" b="0" i="1" smtClean="0">
+                                  <a:latin typeface="Cambria Math" panose="02040503050406030204" pitchFamily="18" charset="0"/>
+                                  <a:cs typeface="Times New Roman" panose="02020603050405020304" pitchFamily="18" charset="0"/>
+                                </a:rPr>
+                              </m:ctrlPr>
+                            </m:fPr>
+                            <m:num>
+                              <m:sSub>
+                                <m:sSubPr>
+                                  <m:ctrlPr>
+                                    <a:rPr lang="en-US" sz="2800" b="0" i="1" smtClean="0">
+                                      <a:latin typeface="Cambria Math" panose="02040503050406030204" pitchFamily="18" charset="0"/>
+                                      <a:cs typeface="Times New Roman" panose="02020603050405020304" pitchFamily="18" charset="0"/>
+                                    </a:rPr>
+                                  </m:ctrlPr>
+                                </m:sSubPr>
+                                <m:e>
+                                  <m:r>
+                                    <a:rPr lang="en-US" sz="2800" b="0" i="1" smtClean="0">
+                                      <a:latin typeface="Cambria Math" panose="02040503050406030204" pitchFamily="18" charset="0"/>
+                                      <a:cs typeface="Times New Roman" panose="02020603050405020304" pitchFamily="18" charset="0"/>
+                                    </a:rPr>
+                                    <m:t>𝑘</m:t>
+                                  </m:r>
+                                </m:e>
+                                <m:sub>
+                                  <m:r>
+                                    <a:rPr lang="en-US" sz="2800" b="0" i="1" smtClean="0">
+                                      <a:latin typeface="Cambria Math" panose="02040503050406030204" pitchFamily="18" charset="0"/>
+                                      <a:cs typeface="Times New Roman" panose="02020603050405020304" pitchFamily="18" charset="0"/>
+                                    </a:rPr>
+                                    <m:t>𝑒</m:t>
+                                  </m:r>
+                                </m:sub>
+                              </m:sSub>
+                            </m:num>
+                            <m:den>
+                              <m:sSub>
+                                <m:sSubPr>
+                                  <m:ctrlPr>
+                                    <a:rPr lang="en-US" sz="2800" b="0" i="1" smtClean="0">
+                                      <a:latin typeface="Cambria Math" panose="02040503050406030204" pitchFamily="18" charset="0"/>
+                                      <a:cs typeface="Times New Roman" panose="02020603050405020304" pitchFamily="18" charset="0"/>
+                                    </a:rPr>
+                                  </m:ctrlPr>
+                                </m:sSubPr>
+                                <m:e>
+                                  <m:r>
+                                    <a:rPr lang="en-US" sz="2800" b="0" i="1" smtClean="0">
+                                      <a:latin typeface="Cambria Math" panose="02040503050406030204" pitchFamily="18" charset="0"/>
+                                      <a:cs typeface="Times New Roman" panose="02020603050405020304" pitchFamily="18" charset="0"/>
+                                    </a:rPr>
+                                    <m:t>𝑘</m:t>
+                                  </m:r>
+                                </m:e>
+                                <m:sub>
+                                  <m:r>
+                                    <a:rPr lang="en-US" sz="2800" b="0" i="1" smtClean="0">
+                                      <a:latin typeface="Cambria Math" panose="02040503050406030204" pitchFamily="18" charset="0"/>
+                                      <a:cs typeface="Times New Roman" panose="02020603050405020304" pitchFamily="18" charset="0"/>
+                                    </a:rPr>
+                                    <m:t>𝑖</m:t>
+                                  </m:r>
+                                </m:sub>
+                              </m:sSub>
+                            </m:den>
+                          </m:f>
+                          <m:nary>
+                            <m:naryPr>
+                              <m:supHide m:val="on"/>
+                              <m:ctrlPr>
+                                <a:rPr lang="en-US" sz="2800" b="0" i="1" smtClean="0">
+                                  <a:latin typeface="Cambria Math" panose="02040503050406030204" pitchFamily="18" charset="0"/>
+                                  <a:cs typeface="Times New Roman" panose="02020603050405020304" pitchFamily="18" charset="0"/>
+                                </a:rPr>
+                              </m:ctrlPr>
+                            </m:naryPr>
+                            <m:sub>
+                              <m:r>
+                                <a:rPr lang="en-US" sz="2800" b="0" i="1" smtClean="0">
+                                  <a:latin typeface="Cambria Math" panose="02040503050406030204" pitchFamily="18" charset="0"/>
+                                  <a:cs typeface="Times New Roman" panose="02020603050405020304" pitchFamily="18" charset="0"/>
+                                </a:rPr>
+                                <m:t>𝐵</m:t>
+                              </m:r>
+                            </m:sub>
+                            <m:sup/>
+                            <m:e>
+                              <m:sSup>
+                                <m:sSupPr>
+                                  <m:ctrlPr>
+                                    <a:rPr lang="en-US" sz="2800" b="0" i="1" smtClean="0">
+                                      <a:latin typeface="Cambria Math" panose="02040503050406030204" pitchFamily="18" charset="0"/>
+                                      <a:cs typeface="Times New Roman" panose="02020603050405020304" pitchFamily="18" charset="0"/>
+                                    </a:rPr>
+                                  </m:ctrlPr>
+                                </m:sSupPr>
+                                <m:e>
+                                  <m:r>
+                                    <m:rPr>
+                                      <m:sty m:val="p"/>
+                                    </m:rPr>
+                                    <a:rPr lang="en-US" sz="2800" b="0" i="0" smtClean="0">
+                                      <a:latin typeface="Cambria Math" panose="02040503050406030204" pitchFamily="18" charset="0"/>
+                                      <a:cs typeface="Times New Roman" panose="02020603050405020304" pitchFamily="18" charset="0"/>
+                                    </a:rPr>
+                                    <m:t>Φ</m:t>
+                                  </m:r>
+                                </m:e>
+                                <m:sup>
+                                  <m:r>
+                                    <a:rPr lang="en-US" sz="2800" b="0" i="1" smtClean="0">
+                                      <a:latin typeface="Cambria Math" panose="02040503050406030204" pitchFamily="18" charset="0"/>
+                                      <a:cs typeface="Times New Roman" panose="02020603050405020304" pitchFamily="18" charset="0"/>
+                                    </a:rPr>
+                                    <m:t>𝑖</m:t>
+                                  </m:r>
+                                </m:sup>
+                              </m:sSup>
+                              <m:d>
+                                <m:dPr>
+                                  <m:ctrlPr>
+                                    <a:rPr lang="en-US" sz="2800" b="0" i="1" smtClean="0">
+                                      <a:latin typeface="Cambria Math" panose="02040503050406030204" pitchFamily="18" charset="0"/>
+                                      <a:cs typeface="Times New Roman" panose="02020603050405020304" pitchFamily="18" charset="0"/>
+                                    </a:rPr>
+                                  </m:ctrlPr>
+                                </m:dPr>
+                                <m:e>
+                                  <m:r>
+                                    <a:rPr lang="en-US" sz="2800" b="0" i="1" smtClean="0">
+                                      <a:latin typeface="Cambria Math" panose="02040503050406030204" pitchFamily="18" charset="0"/>
+                                      <a:cs typeface="Times New Roman" panose="02020603050405020304" pitchFamily="18" charset="0"/>
+                                    </a:rPr>
+                                    <m:t>𝑥</m:t>
+                                  </m:r>
+                                  <m:r>
+                                    <a:rPr lang="en-US" sz="2800" b="0" i="1" smtClean="0">
+                                      <a:latin typeface="Cambria Math" panose="02040503050406030204" pitchFamily="18" charset="0"/>
+                                      <a:cs typeface="Times New Roman" panose="02020603050405020304" pitchFamily="18" charset="0"/>
+                                    </a:rPr>
+                                    <m:t>,</m:t>
+                                  </m:r>
+                                  <m:r>
+                                    <a:rPr lang="en-US" sz="2800" b="0" i="1" smtClean="0">
+                                      <a:latin typeface="Cambria Math" panose="02040503050406030204" pitchFamily="18" charset="0"/>
+                                      <a:cs typeface="Times New Roman" panose="02020603050405020304" pitchFamily="18" charset="0"/>
+                                    </a:rPr>
+                                    <m:t>𝑦</m:t>
+                                  </m:r>
+                                </m:e>
+                              </m:d>
+                              <m:f>
+                                <m:fPr>
+                                  <m:ctrlPr>
+                                    <a:rPr lang="en-US" sz="2800" b="0" i="1" smtClean="0">
+                                      <a:latin typeface="Cambria Math" panose="02040503050406030204" pitchFamily="18" charset="0"/>
+                                      <a:cs typeface="Times New Roman" panose="02020603050405020304" pitchFamily="18" charset="0"/>
+                                    </a:rPr>
+                                  </m:ctrlPr>
+                                </m:fPr>
+                                <m:num>
+                                  <m:r>
+                                    <a:rPr lang="en-US" sz="2800" b="0" i="1" smtClean="0">
+                                      <a:latin typeface="Cambria Math" panose="02040503050406030204" pitchFamily="18" charset="0"/>
+                                      <a:ea typeface="Cambria Math" panose="02040503050406030204" pitchFamily="18" charset="0"/>
+                                      <a:cs typeface="Times New Roman" panose="02020603050405020304" pitchFamily="18" charset="0"/>
+                                    </a:rPr>
+                                    <m:t>𝜕</m:t>
+                                  </m:r>
+                                  <m:sSub>
+                                    <m:sSubPr>
+                                      <m:ctrlPr>
+                                        <a:rPr lang="en-US" sz="2800" b="0" i="1" smtClean="0">
+                                          <a:latin typeface="Cambria Math" panose="02040503050406030204" pitchFamily="18" charset="0"/>
+                                          <a:ea typeface="Cambria Math" panose="02040503050406030204" pitchFamily="18" charset="0"/>
+                                          <a:cs typeface="Times New Roman" panose="02020603050405020304" pitchFamily="18" charset="0"/>
+                                        </a:rPr>
+                                      </m:ctrlPr>
+                                    </m:sSubPr>
+                                    <m:e>
+                                      <m:r>
+                                        <a:rPr lang="en-US" sz="2800" b="0" i="1" smtClean="0">
+                                          <a:latin typeface="Cambria Math" panose="02040503050406030204" pitchFamily="18" charset="0"/>
+                                          <a:ea typeface="Cambria Math" panose="02040503050406030204" pitchFamily="18" charset="0"/>
+                                          <a:cs typeface="Times New Roman" panose="02020603050405020304" pitchFamily="18" charset="0"/>
+                                        </a:rPr>
+                                        <m:t>𝑢</m:t>
+                                      </m:r>
+                                    </m:e>
+                                    <m:sub>
+                                      <m:r>
+                                        <a:rPr lang="en-US" sz="2800" b="0" i="1" smtClean="0">
+                                          <a:latin typeface="Cambria Math" panose="02040503050406030204" pitchFamily="18" charset="0"/>
+                                          <a:ea typeface="Cambria Math" panose="02040503050406030204" pitchFamily="18" charset="0"/>
+                                          <a:cs typeface="Times New Roman" panose="02020603050405020304" pitchFamily="18" charset="0"/>
+                                        </a:rPr>
+                                        <m:t>𝑒</m:t>
+                                      </m:r>
+                                    </m:sub>
+                                  </m:sSub>
+                                </m:num>
+                                <m:den>
+                                  <m:r>
+                                    <a:rPr lang="en-US" sz="2800" b="0" i="1" smtClean="0">
+                                      <a:latin typeface="Cambria Math" panose="02040503050406030204" pitchFamily="18" charset="0"/>
+                                      <a:ea typeface="Cambria Math" panose="02040503050406030204" pitchFamily="18" charset="0"/>
+                                      <a:cs typeface="Times New Roman" panose="02020603050405020304" pitchFamily="18" charset="0"/>
+                                    </a:rPr>
+                                    <m:t>𝜕𝜈</m:t>
+                                  </m:r>
+                                  <m:r>
+                                    <a:rPr lang="en-US" sz="2800" b="0" i="1" smtClean="0">
+                                      <a:latin typeface="Cambria Math" panose="02040503050406030204" pitchFamily="18" charset="0"/>
+                                      <a:ea typeface="Cambria Math" panose="02040503050406030204" pitchFamily="18" charset="0"/>
+                                      <a:cs typeface="Times New Roman" panose="02020603050405020304" pitchFamily="18" charset="0"/>
+                                    </a:rPr>
+                                    <m:t>(</m:t>
+                                  </m:r>
+                                  <m:r>
+                                    <a:rPr lang="en-US" sz="2800" b="0" i="1" smtClean="0">
+                                      <a:latin typeface="Cambria Math" panose="02040503050406030204" pitchFamily="18" charset="0"/>
+                                      <a:ea typeface="Cambria Math" panose="02040503050406030204" pitchFamily="18" charset="0"/>
+                                      <a:cs typeface="Times New Roman" panose="02020603050405020304" pitchFamily="18" charset="0"/>
+                                    </a:rPr>
+                                    <m:t>𝑦</m:t>
+                                  </m:r>
+                                  <m:r>
+                                    <a:rPr lang="en-US" sz="2800" b="0" i="1" smtClean="0">
+                                      <a:latin typeface="Cambria Math" panose="02040503050406030204" pitchFamily="18" charset="0"/>
+                                      <a:ea typeface="Cambria Math" panose="02040503050406030204" pitchFamily="18" charset="0"/>
+                                      <a:cs typeface="Times New Roman" panose="02020603050405020304" pitchFamily="18" charset="0"/>
+                                    </a:rPr>
+                                    <m:t>)</m:t>
+                                  </m:r>
+                                </m:den>
+                              </m:f>
+                              <m:d>
+                                <m:dPr>
+                                  <m:ctrlPr>
+                                    <a:rPr lang="en-US" sz="2800" b="0" i="1" smtClean="0">
+                                      <a:latin typeface="Cambria Math" panose="02040503050406030204" pitchFamily="18" charset="0"/>
+                                      <a:cs typeface="Times New Roman" panose="02020603050405020304" pitchFamily="18" charset="0"/>
+                                    </a:rPr>
+                                  </m:ctrlPr>
+                                </m:dPr>
+                                <m:e>
+                                  <m:r>
+                                    <a:rPr lang="en-US" sz="2800" b="0" i="1" smtClean="0">
+                                      <a:latin typeface="Cambria Math" panose="02040503050406030204" pitchFamily="18" charset="0"/>
+                                      <a:cs typeface="Times New Roman" panose="02020603050405020304" pitchFamily="18" charset="0"/>
+                                    </a:rPr>
+                                    <m:t>𝑦</m:t>
+                                  </m:r>
+                                </m:e>
+                              </m:d>
+                              <m:r>
+                                <a:rPr lang="en-US" sz="2800" b="0" i="1" smtClean="0">
+                                  <a:latin typeface="Cambria Math" panose="02040503050406030204" pitchFamily="18" charset="0"/>
+                                  <a:cs typeface="Times New Roman" panose="02020603050405020304" pitchFamily="18" charset="0"/>
+                                </a:rPr>
+                                <m:t>𝑑</m:t>
+                              </m:r>
+                              <m:sSub>
+                                <m:sSubPr>
+                                  <m:ctrlPr>
+                                    <a:rPr lang="en-US" sz="2800" b="0" i="1" smtClean="0">
+                                      <a:latin typeface="Cambria Math" panose="02040503050406030204" pitchFamily="18" charset="0"/>
+                                      <a:cs typeface="Times New Roman" panose="02020603050405020304" pitchFamily="18" charset="0"/>
+                                    </a:rPr>
+                                  </m:ctrlPr>
+                                </m:sSubPr>
+                                <m:e>
+                                  <m:r>
+                                    <a:rPr lang="en-US" sz="2800" b="0" i="1" smtClean="0">
+                                      <a:latin typeface="Cambria Math" panose="02040503050406030204" pitchFamily="18" charset="0"/>
+                                      <a:cs typeface="Times New Roman" panose="02020603050405020304" pitchFamily="18" charset="0"/>
+                                    </a:rPr>
+                                    <m:t>𝜎</m:t>
+                                  </m:r>
+                                </m:e>
+                                <m:sub>
+                                  <m:r>
+                                    <a:rPr lang="en-US" sz="2800" b="0" i="1" smtClean="0">
+                                      <a:latin typeface="Cambria Math" panose="02040503050406030204" pitchFamily="18" charset="0"/>
+                                      <a:cs typeface="Times New Roman" panose="02020603050405020304" pitchFamily="18" charset="0"/>
+                                    </a:rPr>
+                                    <m:t>𝑦</m:t>
+                                  </m:r>
+                                </m:sub>
+                              </m:sSub>
+                              <m:r>
+                                <a:rPr lang="en-US" sz="2800" b="0" i="1" smtClean="0">
+                                  <a:latin typeface="Cambria Math" panose="02040503050406030204" pitchFamily="18" charset="0"/>
+                                  <a:cs typeface="Times New Roman" panose="02020603050405020304" pitchFamily="18" charset="0"/>
+                                </a:rPr>
+                                <m:t>,  </m:t>
+                              </m:r>
+                              <m:r>
+                                <a:rPr lang="en-US" sz="2800" b="0" i="1" smtClean="0">
+                                  <a:latin typeface="Cambria Math" panose="02040503050406030204" pitchFamily="18" charset="0"/>
+                                  <a:cs typeface="Times New Roman" panose="02020603050405020304" pitchFamily="18" charset="0"/>
+                                </a:rPr>
+                                <m:t>𝑥</m:t>
+                              </m:r>
+                              <m:r>
+                                <a:rPr lang="en-US" sz="2800" b="0" i="1" smtClean="0">
+                                  <a:latin typeface="Cambria Math" panose="02040503050406030204" pitchFamily="18" charset="0"/>
+                                  <a:ea typeface="Cambria Math" panose="02040503050406030204" pitchFamily="18" charset="0"/>
+                                  <a:cs typeface="Times New Roman" panose="02020603050405020304" pitchFamily="18" charset="0"/>
+                                </a:rPr>
+                                <m:t>∈</m:t>
+                              </m:r>
+                              <m:r>
+                                <a:rPr lang="en-US" sz="2800" b="0" i="1" smtClean="0">
+                                  <a:latin typeface="Cambria Math" panose="02040503050406030204" pitchFamily="18" charset="0"/>
+                                  <a:ea typeface="Cambria Math" panose="02040503050406030204" pitchFamily="18" charset="0"/>
+                                  <a:cs typeface="Times New Roman" panose="02020603050405020304" pitchFamily="18" charset="0"/>
+                                </a:rPr>
+                                <m:t>𝐼</m:t>
+                              </m:r>
+                            </m:e>
+                          </m:nary>
+                        </m:e>
+                      </m:nary>
+                    </m:oMath>
+                  </m:oMathPara>
+                </a14:m>
+                <a:endParaRPr lang="en-US" sz="3200" dirty="0">
+                  <a:cs typeface="Times New Roman" panose="02020603050405020304" pitchFamily="18" charset="0"/>
+                </a:endParaRPr>
               </a:p>
               <a:p>
                 <a:pPr algn="ctr">
@@ -6745,8 +7324,8 @@
             </p:nvSpPr>
             <p:spPr>
               <a:xfrm>
-                <a:off x="949552" y="18618116"/>
-                <a:ext cx="13299848" cy="6452600"/>
+                <a:off x="1143000" y="24536400"/>
+                <a:ext cx="13299848" cy="8417625"/>
               </a:xfrm>
               <a:prstGeom prst="rect">
                 <a:avLst/>
@@ -6754,7 +7333,7 @@
               <a:blipFill>
                 <a:blip r:embed="rId3"/>
                 <a:stretch>
-                  <a:fillRect t="-944"/>
+                  <a:fillRect/>
                 </a:stretch>
               </a:blipFill>
               <a:ln w="12700">
@@ -6778,66 +7357,6 @@
       </mc:AlternateContent>
       <p:sp>
         <p:nvSpPr>
-          <p:cNvPr id="30" name="Arrow: Curved Right 29">
-            <a:extLst>
-              <a:ext uri="{FF2B5EF4-FFF2-40B4-BE49-F238E27FC236}">
-                <a16:creationId xmlns:a16="http://schemas.microsoft.com/office/drawing/2014/main" id="{C72709EE-42C7-4172-AC31-28D0A641EFCC}"/>
-              </a:ext>
-            </a:extLst>
-          </p:cNvPr>
-          <p:cNvSpPr/>
-          <p:nvPr/>
-        </p:nvSpPr>
-        <p:spPr>
-          <a:xfrm>
-            <a:off x="3581400" y="18669000"/>
-            <a:ext cx="1447800" cy="4495800"/>
-          </a:xfrm>
-          <a:prstGeom prst="curvedRightArrow">
-            <a:avLst>
-              <a:gd name="adj1" fmla="val 10934"/>
-              <a:gd name="adj2" fmla="val 30814"/>
-              <a:gd name="adj3" fmla="val 31056"/>
-            </a:avLst>
-          </a:prstGeom>
-          <a:solidFill>
-            <a:schemeClr val="accent5">
-              <a:lumMod val="60000"/>
-              <a:lumOff val="40000"/>
-            </a:schemeClr>
-          </a:solidFill>
-        </p:spPr>
-        <p:style>
-          <a:lnRef idx="2">
-            <a:schemeClr val="accent1">
-              <a:shade val="50000"/>
-            </a:schemeClr>
-          </a:lnRef>
-          <a:fillRef idx="1">
-            <a:schemeClr val="accent1"/>
-          </a:fillRef>
-          <a:effectRef idx="0">
-            <a:schemeClr val="accent1"/>
-          </a:effectRef>
-          <a:fontRef idx="minor">
-            <a:schemeClr val="lt1"/>
-          </a:fontRef>
-        </p:style>
-        <p:txBody>
-          <a:bodyPr rtlCol="0" anchor="ctr"/>
-          <a:lstStyle/>
-          <a:p>
-            <a:pPr algn="ctr"/>
-            <a:endParaRPr lang="en-US">
-              <a:solidFill>
-                <a:schemeClr val="tx1"/>
-              </a:solidFill>
-            </a:endParaRPr>
-          </a:p>
-        </p:txBody>
-      </p:sp>
-      <p:sp>
-        <p:nvSpPr>
           <p:cNvPr id="62" name="Round Same Side Corner Rectangle 38">
             <a:extLst>
               <a:ext uri="{FF2B5EF4-FFF2-40B4-BE49-F238E27FC236}">
@@ -6852,7 +7371,7 @@
         </p:nvSpPr>
         <p:spPr bwMode="auto">
           <a:xfrm>
-            <a:off x="15316200" y="4038600"/>
+            <a:off x="15576810" y="4038600"/>
             <a:ext cx="12954000" cy="1188720"/>
           </a:xfrm>
           <a:custGeom>
@@ -7097,7 +7616,7 @@
         </p:nvSpPr>
         <p:spPr bwMode="auto">
           <a:xfrm>
-            <a:off x="29337000" y="4016829"/>
+            <a:off x="29337000" y="4045132"/>
             <a:ext cx="13299848" cy="1188720"/>
           </a:xfrm>
           <a:custGeom>
@@ -7314,7 +7833,7 @@
               <a:buNone/>
             </a:pPr>
             <a:r>
-              <a:rPr lang="en-US" altLang="en-US" sz="7200" b="1" cap="all" dirty="0">
+              <a:rPr lang="en-US" altLang="en-US" sz="7200" b="1" cap="small" dirty="0">
                 <a:solidFill>
                   <a:schemeClr val="bg1"/>
                 </a:solidFill>
@@ -7342,7 +7861,7 @@
         </p:nvSpPr>
         <p:spPr bwMode="auto">
           <a:xfrm>
-            <a:off x="29337000" y="17029984"/>
+            <a:off x="29337000" y="16975041"/>
             <a:ext cx="13299848" cy="1188720"/>
           </a:xfrm>
           <a:custGeom>
@@ -7559,7 +8078,7 @@
               <a:buNone/>
             </a:pPr>
             <a:r>
-              <a:rPr lang="en-US" altLang="en-US" sz="7200" b="1" cap="all" dirty="0">
+              <a:rPr lang="en-US" altLang="en-US" sz="7200" b="1" cap="small" dirty="0">
                 <a:solidFill>
                   <a:schemeClr val="bg1"/>
                 </a:solidFill>
@@ -7587,7 +8106,7 @@
         </p:nvSpPr>
         <p:spPr bwMode="auto">
           <a:xfrm>
-            <a:off x="15295675" y="13335000"/>
+            <a:off x="15263019" y="16964155"/>
             <a:ext cx="12974524" cy="1188720"/>
           </a:xfrm>
           <a:custGeom>
@@ -7804,54 +8323,190 @@
               <a:buNone/>
             </a:pPr>
             <a:r>
-              <a:rPr lang="en-US" altLang="en-US" sz="6000" b="1" cap="small" dirty="0">
+              <a:rPr lang="en-US" altLang="en-US" sz="7200" b="1" cap="small" dirty="0">
                 <a:solidFill>
                   <a:schemeClr val="bg1"/>
                 </a:solidFill>
                 <a:latin typeface="+mj-lt"/>
                 <a:cs typeface="Times New Roman" panose="02020603050405020304" pitchFamily="18" charset="0"/>
               </a:rPr>
-              <a:t>Acoustic Scattering</a:t>
+              <a:t>Validation</a:t>
             </a:r>
+          </a:p>
+        </p:txBody>
+      </p:sp>
+      <p:sp>
+        <p:nvSpPr>
+          <p:cNvPr id="3" name="Rectangle 2">
+            <a:extLst>
+              <a:ext uri="{FF2B5EF4-FFF2-40B4-BE49-F238E27FC236}">
+                <a16:creationId xmlns:a16="http://schemas.microsoft.com/office/drawing/2014/main" id="{0810079E-4B24-46AA-A858-8C1DA02B8F16}"/>
+              </a:ext>
+            </a:extLst>
+          </p:cNvPr>
+          <p:cNvSpPr/>
+          <p:nvPr/>
+        </p:nvSpPr>
+        <p:spPr>
+          <a:xfrm>
+            <a:off x="1828800" y="1567713"/>
+            <a:ext cx="3581400" cy="1861287"/>
+          </a:xfrm>
+          <a:prstGeom prst="rect">
+            <a:avLst/>
+          </a:prstGeom>
+          <a:solidFill>
+            <a:srgbClr val="9FB0CE"/>
+          </a:solidFill>
+          <a:ln>
+            <a:noFill/>
+          </a:ln>
+        </p:spPr>
+        <p:style>
+          <a:lnRef idx="2">
+            <a:schemeClr val="accent1">
+              <a:shade val="50000"/>
+            </a:schemeClr>
+          </a:lnRef>
+          <a:fillRef idx="1">
+            <a:schemeClr val="accent1"/>
+          </a:fillRef>
+          <a:effectRef idx="0">
+            <a:schemeClr val="accent1"/>
+          </a:effectRef>
+          <a:fontRef idx="minor">
+            <a:schemeClr val="lt1"/>
+          </a:fontRef>
+        </p:style>
+        <p:txBody>
+          <a:bodyPr rtlCol="0" anchor="ctr"/>
+          <a:lstStyle/>
+          <a:p>
+            <a:pPr algn="ctr"/>
+            <a:endParaRPr lang="en-US"/>
           </a:p>
         </p:txBody>
       </p:sp>
       <p:pic>
         <p:nvPicPr>
-          <p:cNvPr id="34" name="Picture 33">
+          <p:cNvPr id="1026" name="Picture 2" descr="Image result for uc merced logo">
             <a:extLst>
               <a:ext uri="{FF2B5EF4-FFF2-40B4-BE49-F238E27FC236}">
-                <a16:creationId xmlns:a16="http://schemas.microsoft.com/office/drawing/2014/main" id="{BF069C10-82EE-4AF8-9A83-273A3915FC6F}"/>
+                <a16:creationId xmlns:a16="http://schemas.microsoft.com/office/drawing/2014/main" id="{1DE57159-2786-4F0D-90D1-B1646A373242}"/>
               </a:ext>
             </a:extLst>
           </p:cNvPr>
           <p:cNvPicPr>
-            <a:picLocks noChangeAspect="1"/>
+            <a:picLocks noChangeAspect="1" noChangeArrowheads="1"/>
           </p:cNvPicPr>
           <p:nvPr/>
         </p:nvPicPr>
         <p:blipFill>
-          <a:blip r:embed="rId4"/>
+          <a:blip r:embed="rId4">
+            <a:extLst>
+              <a:ext uri="{28A0092B-C50C-407E-A947-70E740481C1C}">
+                <a14:useLocalDpi xmlns:a14="http://schemas.microsoft.com/office/drawing/2010/main" val="0"/>
+              </a:ext>
+            </a:extLst>
+          </a:blip>
+          <a:srcRect/>
           <a:stretch>
             <a:fillRect/>
           </a:stretch>
         </p:blipFill>
+        <p:spPr bwMode="auto">
+          <a:xfrm>
+            <a:off x="1371600" y="677007"/>
+            <a:ext cx="2819400" cy="2819400"/>
+          </a:xfrm>
+          <a:prstGeom prst="ellipse">
+            <a:avLst/>
+          </a:prstGeom>
+          <a:ln w="190500" cap="rnd">
+            <a:noFill/>
+            <a:prstDash val="solid"/>
+          </a:ln>
+          <a:effectLst/>
+          <a:scene3d>
+            <a:camera prst="orthographicFront">
+              <a:rot lat="0" lon="0" rev="0"/>
+            </a:camera>
+            <a:lightRig rig="balanced" dir="t">
+              <a:rot lat="0" lon="0" rev="8700000"/>
+            </a:lightRig>
+          </a:scene3d>
+          <a:sp3d>
+            <a:bevelT w="190500" h="38100"/>
+          </a:sp3d>
+          <a:extLst>
+            <a:ext uri="{909E8E84-426E-40DD-AFC4-6F175D3DCCD1}">
+              <a14:hiddenFill xmlns:a14="http://schemas.microsoft.com/office/drawing/2010/main">
+                <a:solidFill>
+                  <a:srgbClr val="FFFFFF"/>
+                </a:solidFill>
+              </a14:hiddenFill>
+            </a:ext>
+          </a:extLst>
+        </p:spPr>
+      </p:pic>
+      <p:sp>
+        <p:nvSpPr>
+          <p:cNvPr id="19" name="Rectangle 18">
+            <a:extLst>
+              <a:ext uri="{FF2B5EF4-FFF2-40B4-BE49-F238E27FC236}">
+                <a16:creationId xmlns:a16="http://schemas.microsoft.com/office/drawing/2014/main" id="{DC92797F-B070-4D7C-82AA-8090E3605056}"/>
+              </a:ext>
+            </a:extLst>
+          </p:cNvPr>
+          <p:cNvSpPr/>
+          <p:nvPr/>
+        </p:nvSpPr>
         <p:spPr>
           <a:xfrm>
-            <a:off x="15295675" y="24079201"/>
-            <a:ext cx="6649925" cy="7772399"/>
+            <a:off x="38709600" y="1175405"/>
+            <a:ext cx="3124200" cy="1861287"/>
           </a:xfrm>
           <a:prstGeom prst="rect">
             <a:avLst/>
           </a:prstGeom>
+          <a:solidFill>
+            <a:srgbClr val="9FB0CE"/>
+          </a:solidFill>
+          <a:ln>
+            <a:noFill/>
+          </a:ln>
         </p:spPr>
-      </p:pic>
+        <p:style>
+          <a:lnRef idx="2">
+            <a:schemeClr val="accent1">
+              <a:shade val="50000"/>
+            </a:schemeClr>
+          </a:lnRef>
+          <a:fillRef idx="1">
+            <a:schemeClr val="accent1"/>
+          </a:fillRef>
+          <a:effectRef idx="0">
+            <a:schemeClr val="accent1"/>
+          </a:effectRef>
+          <a:fontRef idx="minor">
+            <a:schemeClr val="lt1"/>
+          </a:fontRef>
+        </p:style>
+        <p:txBody>
+          <a:bodyPr rtlCol="0" anchor="ctr"/>
+          <a:lstStyle/>
+          <a:p>
+            <a:pPr algn="ctr"/>
+            <a:endParaRPr lang="en-US"/>
+          </a:p>
+        </p:txBody>
+      </p:sp>
       <p:pic>
         <p:nvPicPr>
-          <p:cNvPr id="35" name="Picture 34">
+          <p:cNvPr id="6" name="Picture 5">
             <a:extLst>
               <a:ext uri="{FF2B5EF4-FFF2-40B4-BE49-F238E27FC236}">
-                <a16:creationId xmlns:a16="http://schemas.microsoft.com/office/drawing/2014/main" id="{900A3262-3899-4DF8-9B4F-F01D1AFDFBBF}"/>
+                <a16:creationId xmlns:a16="http://schemas.microsoft.com/office/drawing/2014/main" id="{6F1F7966-B0ED-4DC5-9649-5E04FE03202F}"/>
               </a:ext>
             </a:extLst>
           </p:cNvPr>
@@ -7868,8 +8523,89 @@
         </p:blipFill>
         <p:spPr>
           <a:xfrm>
-            <a:off x="22565462" y="24744608"/>
-            <a:ext cx="5867400" cy="7106992"/>
+            <a:off x="39412032" y="1270067"/>
+            <a:ext cx="3322922" cy="1633280"/>
+          </a:xfrm>
+          <a:prstGeom prst="rect">
+            <a:avLst/>
+          </a:prstGeom>
+        </p:spPr>
+      </p:pic>
+      <p:sp>
+        <p:nvSpPr>
+          <p:cNvPr id="7" name="Rectangle: Rounded Corners 6">
+            <a:extLst>
+              <a:ext uri="{FF2B5EF4-FFF2-40B4-BE49-F238E27FC236}">
+                <a16:creationId xmlns:a16="http://schemas.microsoft.com/office/drawing/2014/main" id="{9FB79C7C-4BE5-44DA-B35C-E1618C8B0EDA}"/>
+              </a:ext>
+            </a:extLst>
+          </p:cNvPr>
+          <p:cNvSpPr/>
+          <p:nvPr/>
+        </p:nvSpPr>
+        <p:spPr>
+          <a:xfrm>
+            <a:off x="29337000" y="26596768"/>
+            <a:ext cx="13299848" cy="5334000"/>
+          </a:xfrm>
+          <a:prstGeom prst="roundRect">
+            <a:avLst/>
+          </a:prstGeom>
+          <a:solidFill>
+            <a:schemeClr val="accent1">
+              <a:alpha val="50000"/>
+            </a:schemeClr>
+          </a:solidFill>
+          <a:ln>
+            <a:noFill/>
+          </a:ln>
+        </p:spPr>
+        <p:style>
+          <a:lnRef idx="0">
+            <a:scrgbClr r="0" g="0" b="0"/>
+          </a:lnRef>
+          <a:fillRef idx="0">
+            <a:scrgbClr r="0" g="0" b="0"/>
+          </a:fillRef>
+          <a:effectRef idx="0">
+            <a:scrgbClr r="0" g="0" b="0"/>
+          </a:effectRef>
+          <a:fontRef idx="minor">
+            <a:schemeClr val="lt1"/>
+          </a:fontRef>
+        </p:style>
+        <p:txBody>
+          <a:bodyPr rtlCol="0" anchor="ctr"/>
+          <a:lstStyle/>
+          <a:p>
+            <a:pPr algn="ctr"/>
+            <a:endParaRPr lang="en-US"/>
+          </a:p>
+        </p:txBody>
+      </p:sp>
+      <p:pic>
+        <p:nvPicPr>
+          <p:cNvPr id="9" name="Picture 8" descr="A screenshot of a cell phone&#10;&#10;Description automatically generated">
+            <a:extLst>
+              <a:ext uri="{FF2B5EF4-FFF2-40B4-BE49-F238E27FC236}">
+                <a16:creationId xmlns:a16="http://schemas.microsoft.com/office/drawing/2014/main" id="{6270485C-9A64-4526-A3DA-F8227A283660}"/>
+              </a:ext>
+            </a:extLst>
+          </p:cNvPr>
+          <p:cNvPicPr>
+            <a:picLocks noChangeAspect="1"/>
+          </p:cNvPicPr>
+          <p:nvPr/>
+        </p:nvPicPr>
+        <p:blipFill rotWithShape="1">
+          <a:blip r:embed="rId6"/>
+          <a:srcRect l="18569" t="26561" r="27204" b="24646"/>
+          <a:stretch/>
+        </p:blipFill>
+        <p:spPr>
+          <a:xfrm>
+            <a:off x="8168155" y="9296401"/>
+            <a:ext cx="6019800" cy="3558352"/>
           </a:xfrm>
           <a:prstGeom prst="rect">
             <a:avLst/>
@@ -7878,10 +8614,1069 @@
       </p:pic>
       <p:pic>
         <p:nvPicPr>
-          <p:cNvPr id="38" name="Picture 37">
+          <p:cNvPr id="11" name="Picture 10" descr="A screenshot of a cell phone&#10;&#10;Description automatically generated">
             <a:extLst>
               <a:ext uri="{FF2B5EF4-FFF2-40B4-BE49-F238E27FC236}">
-                <a16:creationId xmlns:a16="http://schemas.microsoft.com/office/drawing/2014/main" id="{363C5754-45F6-4243-A0EF-09F5F73FD875}"/>
+                <a16:creationId xmlns:a16="http://schemas.microsoft.com/office/drawing/2014/main" id="{053DD2B5-5FE5-4E58-9E62-62F28D387050}"/>
+              </a:ext>
+            </a:extLst>
+          </p:cNvPr>
+          <p:cNvPicPr>
+            <a:picLocks noChangeAspect="1"/>
+          </p:cNvPicPr>
+          <p:nvPr/>
+        </p:nvPicPr>
+        <p:blipFill rotWithShape="1">
+          <a:blip r:embed="rId7"/>
+          <a:srcRect l="23732" t="26412" r="28196" b="25068"/>
+          <a:stretch/>
+        </p:blipFill>
+        <p:spPr>
+          <a:xfrm>
+            <a:off x="1668661" y="9296402"/>
+            <a:ext cx="5959077" cy="3558352"/>
+          </a:xfrm>
+          <a:prstGeom prst="rect">
+            <a:avLst/>
+          </a:prstGeom>
+        </p:spPr>
+      </p:pic>
+      <p:sp>
+        <p:nvSpPr>
+          <p:cNvPr id="12" name="TextBox 11">
+            <a:extLst>
+              <a:ext uri="{FF2B5EF4-FFF2-40B4-BE49-F238E27FC236}">
+                <a16:creationId xmlns:a16="http://schemas.microsoft.com/office/drawing/2014/main" id="{5FAB7F99-BEB6-4A44-AB6A-A6872A3F2D33}"/>
+              </a:ext>
+            </a:extLst>
+          </p:cNvPr>
+          <p:cNvSpPr txBox="1"/>
+          <p:nvPr/>
+        </p:nvSpPr>
+        <p:spPr>
+          <a:xfrm>
+            <a:off x="1687711" y="12961203"/>
+            <a:ext cx="12275939" cy="954107"/>
+          </a:xfrm>
+          <a:prstGeom prst="rect">
+            <a:avLst/>
+          </a:prstGeom>
+          <a:noFill/>
+        </p:spPr>
+        <p:txBody>
+          <a:bodyPr wrap="square" rtlCol="0">
+            <a:spAutoFit/>
+          </a:bodyPr>
+          <a:lstStyle/>
+          <a:p>
+            <a:r>
+              <a:rPr lang="en-US" sz="2800" b="1" dirty="0"/>
+              <a:t>Figure 1.</a:t>
+            </a:r>
+            <a:r>
+              <a:rPr lang="en-US" sz="2800" dirty="0"/>
+              <a:t>  The scattering of light on an uncloaked object (left) versus that of a cloaked object (right).</a:t>
+            </a:r>
+            <a:r>
+              <a:rPr lang="en-US" sz="2800" baseline="30000" dirty="0"/>
+              <a:t>[4]</a:t>
+            </a:r>
+            <a:endParaRPr lang="en-US" sz="2800" b="1" dirty="0"/>
+          </a:p>
+        </p:txBody>
+      </p:sp>
+      <p:pic>
+        <p:nvPicPr>
+          <p:cNvPr id="15" name="Picture 14">
+            <a:extLst>
+              <a:ext uri="{FF2B5EF4-FFF2-40B4-BE49-F238E27FC236}">
+                <a16:creationId xmlns:a16="http://schemas.microsoft.com/office/drawing/2014/main" id="{E9570C31-4711-4F44-96BB-D07293E220F8}"/>
+              </a:ext>
+            </a:extLst>
+          </p:cNvPr>
+          <p:cNvPicPr>
+            <a:picLocks noChangeAspect="1"/>
+          </p:cNvPicPr>
+          <p:nvPr/>
+        </p:nvPicPr>
+        <p:blipFill rotWithShape="1">
+          <a:blip r:embed="rId8"/>
+          <a:srcRect l="13383" t="10883" r="17647" b="16482"/>
+          <a:stretch/>
+        </p:blipFill>
+        <p:spPr>
+          <a:xfrm>
+            <a:off x="4167655" y="18856642"/>
+            <a:ext cx="5395020" cy="5298758"/>
+          </a:xfrm>
+          <a:prstGeom prst="rect">
+            <a:avLst/>
+          </a:prstGeom>
+        </p:spPr>
+      </p:pic>
+      <p:sp>
+        <p:nvSpPr>
+          <p:cNvPr id="16" name="TextBox 15">
+            <a:extLst>
+              <a:ext uri="{FF2B5EF4-FFF2-40B4-BE49-F238E27FC236}">
+                <a16:creationId xmlns:a16="http://schemas.microsoft.com/office/drawing/2014/main" id="{1FA98726-EB7D-4AAE-B52D-4D8BC5754308}"/>
+              </a:ext>
+            </a:extLst>
+          </p:cNvPr>
+          <p:cNvSpPr txBox="1"/>
+          <p:nvPr/>
+        </p:nvSpPr>
+        <p:spPr>
+          <a:xfrm>
+            <a:off x="9468486" y="19805130"/>
+            <a:ext cx="542136" cy="707886"/>
+          </a:xfrm>
+          <a:prstGeom prst="rect">
+            <a:avLst/>
+          </a:prstGeom>
+          <a:noFill/>
+        </p:spPr>
+        <p:txBody>
+          <a:bodyPr wrap="none" rtlCol="0">
+            <a:spAutoFit/>
+          </a:bodyPr>
+          <a:lstStyle/>
+          <a:p>
+            <a:r>
+              <a:rPr lang="en-US" sz="4000" b="1" dirty="0"/>
+              <a:t>B</a:t>
+            </a:r>
+          </a:p>
+        </p:txBody>
+      </p:sp>
+      <mc:AlternateContent xmlns:mc="http://schemas.openxmlformats.org/markup-compatibility/2006">
+        <mc:Choice xmlns:a14="http://schemas.microsoft.com/office/drawing/2010/main" Requires="a14">
+          <p:sp>
+            <p:nvSpPr>
+              <p:cNvPr id="17" name="TextBox 16">
+                <a:extLst>
+                  <a:ext uri="{FF2B5EF4-FFF2-40B4-BE49-F238E27FC236}">
+                    <a16:creationId xmlns:a16="http://schemas.microsoft.com/office/drawing/2014/main" id="{9A40B2AC-E446-4112-B7A5-6EA4C5278469}"/>
+                  </a:ext>
+                </a:extLst>
+              </p:cNvPr>
+              <p:cNvSpPr txBox="1"/>
+              <p:nvPr/>
+            </p:nvSpPr>
+            <p:spPr>
+              <a:xfrm>
+                <a:off x="8028689" y="22262278"/>
+                <a:ext cx="2590132" cy="523220"/>
+              </a:xfrm>
+              <a:prstGeom prst="rect">
+                <a:avLst/>
+              </a:prstGeom>
+              <a:noFill/>
+            </p:spPr>
+            <p:txBody>
+              <a:bodyPr wrap="none" rtlCol="0">
+                <a:spAutoFit/>
+              </a:bodyPr>
+              <a:lstStyle/>
+              <a:p>
+                <a14:m>
+                  <m:oMathPara xmlns:m="http://schemas.openxmlformats.org/officeDocument/2006/math">
+                    <m:oMathParaPr>
+                      <m:jc m:val="centerGroup"/>
+                    </m:oMathParaPr>
+                    <m:oMath xmlns:m="http://schemas.openxmlformats.org/officeDocument/2006/math">
+                      <m:r>
+                        <a:rPr lang="en-US" sz="2800" b="1" i="1" smtClean="0">
+                          <a:latin typeface="Cambria Math" panose="02040503050406030204" pitchFamily="18" charset="0"/>
+                        </a:rPr>
+                        <m:t>𝒚</m:t>
+                      </m:r>
+                      <m:r>
+                        <a:rPr lang="en-US" sz="2800" b="1" i="1" smtClean="0">
+                          <a:latin typeface="Cambria Math" panose="02040503050406030204" pitchFamily="18" charset="0"/>
+                        </a:rPr>
+                        <m:t>= &lt;</m:t>
+                      </m:r>
+                      <m:sSub>
+                        <m:sSubPr>
+                          <m:ctrlPr>
+                            <a:rPr lang="en-US" sz="2800" b="1" i="1" smtClean="0">
+                              <a:latin typeface="Cambria Math" panose="02040503050406030204" pitchFamily="18" charset="0"/>
+                              <a:ea typeface="Cambria Math" panose="02040503050406030204" pitchFamily="18" charset="0"/>
+                            </a:rPr>
+                          </m:ctrlPr>
+                        </m:sSubPr>
+                        <m:e>
+                          <m:r>
+                            <a:rPr lang="en-US" sz="2800" b="1" i="1" smtClean="0">
+                              <a:latin typeface="Cambria Math" panose="02040503050406030204" pitchFamily="18" charset="0"/>
+                              <a:ea typeface="Cambria Math" panose="02040503050406030204" pitchFamily="18" charset="0"/>
+                            </a:rPr>
+                            <m:t>𝒚</m:t>
+                          </m:r>
+                        </m:e>
+                        <m:sub>
+                          <m:r>
+                            <a:rPr lang="en-US" sz="2800" b="1" i="1" smtClean="0">
+                              <a:latin typeface="Cambria Math" panose="02040503050406030204" pitchFamily="18" charset="0"/>
+                              <a:ea typeface="Cambria Math" panose="02040503050406030204" pitchFamily="18" charset="0"/>
+                            </a:rPr>
+                            <m:t>𝟏</m:t>
+                          </m:r>
+                        </m:sub>
+                      </m:sSub>
+                      <m:r>
+                        <a:rPr lang="en-US" sz="2800" b="1" i="1" smtClean="0">
+                          <a:latin typeface="Cambria Math" panose="02040503050406030204" pitchFamily="18" charset="0"/>
+                          <a:ea typeface="Cambria Math" panose="02040503050406030204" pitchFamily="18" charset="0"/>
+                        </a:rPr>
+                        <m:t>,</m:t>
+                      </m:r>
+                      <m:sSub>
+                        <m:sSubPr>
+                          <m:ctrlPr>
+                            <a:rPr lang="en-US" sz="2800" b="1" i="1" smtClean="0">
+                              <a:latin typeface="Cambria Math" panose="02040503050406030204" pitchFamily="18" charset="0"/>
+                              <a:ea typeface="Cambria Math" panose="02040503050406030204" pitchFamily="18" charset="0"/>
+                            </a:rPr>
+                          </m:ctrlPr>
+                        </m:sSubPr>
+                        <m:e>
+                          <m:r>
+                            <a:rPr lang="en-US" sz="2800" b="1" i="1" smtClean="0">
+                              <a:latin typeface="Cambria Math" panose="02040503050406030204" pitchFamily="18" charset="0"/>
+                              <a:ea typeface="Cambria Math" panose="02040503050406030204" pitchFamily="18" charset="0"/>
+                            </a:rPr>
+                            <m:t>𝒚</m:t>
+                          </m:r>
+                        </m:e>
+                        <m:sub>
+                          <m:r>
+                            <a:rPr lang="en-US" sz="2800" b="1" i="1" smtClean="0">
+                              <a:latin typeface="Cambria Math" panose="02040503050406030204" pitchFamily="18" charset="0"/>
+                              <a:ea typeface="Cambria Math" panose="02040503050406030204" pitchFamily="18" charset="0"/>
+                            </a:rPr>
+                            <m:t>𝟐</m:t>
+                          </m:r>
+                        </m:sub>
+                      </m:sSub>
+                      <m:r>
+                        <a:rPr lang="en-US" sz="2800" b="1" i="1" smtClean="0">
+                          <a:latin typeface="Cambria Math" panose="02040503050406030204" pitchFamily="18" charset="0"/>
+                          <a:ea typeface="Cambria Math" panose="02040503050406030204" pitchFamily="18" charset="0"/>
+                        </a:rPr>
+                        <m:t>&gt;</m:t>
+                      </m:r>
+                    </m:oMath>
+                  </m:oMathPara>
+                </a14:m>
+                <a:endParaRPr lang="en-US" sz="2800" b="1" dirty="0"/>
+              </a:p>
+            </p:txBody>
+          </p:sp>
+        </mc:Choice>
+        <mc:Fallback>
+          <p:sp>
+            <p:nvSpPr>
+              <p:cNvPr id="17" name="TextBox 16">
+                <a:extLst>
+                  <a:ext uri="{FF2B5EF4-FFF2-40B4-BE49-F238E27FC236}">
+                    <a16:creationId xmlns:a16="http://schemas.microsoft.com/office/drawing/2014/main" id="{9A40B2AC-E446-4112-B7A5-6EA4C5278469}"/>
+                  </a:ext>
+                </a:extLst>
+              </p:cNvPr>
+              <p:cNvSpPr txBox="1">
+                <a:spLocks noRot="1" noChangeAspect="1" noMove="1" noResize="1" noEditPoints="1" noAdjustHandles="1" noChangeArrowheads="1" noChangeShapeType="1" noTextEdit="1"/>
+              </p:cNvSpPr>
+              <p:nvPr/>
+            </p:nvSpPr>
+            <p:spPr>
+              <a:xfrm>
+                <a:off x="8028689" y="22262278"/>
+                <a:ext cx="2590132" cy="523220"/>
+              </a:xfrm>
+              <a:prstGeom prst="rect">
+                <a:avLst/>
+              </a:prstGeom>
+              <a:blipFill>
+                <a:blip r:embed="rId9"/>
+                <a:stretch>
+                  <a:fillRect/>
+                </a:stretch>
+              </a:blipFill>
+            </p:spPr>
+            <p:txBody>
+              <a:bodyPr/>
+              <a:lstStyle/>
+              <a:p>
+                <a:r>
+                  <a:rPr lang="en-US">
+                    <a:noFill/>
+                  </a:rPr>
+                  <a:t> </a:t>
+                </a:r>
+              </a:p>
+            </p:txBody>
+          </p:sp>
+        </mc:Fallback>
+      </mc:AlternateContent>
+      <mc:AlternateContent xmlns:mc="http://schemas.openxmlformats.org/markup-compatibility/2006">
+        <mc:Choice xmlns:a14="http://schemas.microsoft.com/office/drawing/2010/main" Requires="a14">
+          <p:sp>
+            <p:nvSpPr>
+              <p:cNvPr id="39" name="TextBox 38">
+                <a:extLst>
+                  <a:ext uri="{FF2B5EF4-FFF2-40B4-BE49-F238E27FC236}">
+                    <a16:creationId xmlns:a16="http://schemas.microsoft.com/office/drawing/2014/main" id="{2552E3D9-C8DE-409B-A002-7492D6DDDC6D}"/>
+                  </a:ext>
+                </a:extLst>
+              </p:cNvPr>
+              <p:cNvSpPr txBox="1"/>
+              <p:nvPr/>
+            </p:nvSpPr>
+            <p:spPr>
+              <a:xfrm>
+                <a:off x="7334964" y="18497008"/>
+                <a:ext cx="2566087" cy="523220"/>
+              </a:xfrm>
+              <a:prstGeom prst="rect">
+                <a:avLst/>
+              </a:prstGeom>
+              <a:noFill/>
+            </p:spPr>
+            <p:txBody>
+              <a:bodyPr wrap="none" rtlCol="0">
+                <a:spAutoFit/>
+              </a:bodyPr>
+              <a:lstStyle/>
+              <a:p>
+                <a14:m>
+                  <m:oMathPara xmlns:m="http://schemas.openxmlformats.org/officeDocument/2006/math">
+                    <m:oMathParaPr>
+                      <m:jc m:val="centerGroup"/>
+                    </m:oMathParaPr>
+                    <m:oMath xmlns:m="http://schemas.openxmlformats.org/officeDocument/2006/math">
+                      <m:r>
+                        <a:rPr lang="en-US" sz="2800" b="1" i="1" smtClean="0">
+                          <a:latin typeface="Cambria Math" panose="02040503050406030204" pitchFamily="18" charset="0"/>
+                        </a:rPr>
+                        <m:t>𝒙</m:t>
+                      </m:r>
+                      <m:r>
+                        <a:rPr lang="en-US" sz="2800" b="1" i="1" smtClean="0">
+                          <a:latin typeface="Cambria Math" panose="02040503050406030204" pitchFamily="18" charset="0"/>
+                        </a:rPr>
+                        <m:t>= &lt;</m:t>
+                      </m:r>
+                      <m:sSub>
+                        <m:sSubPr>
+                          <m:ctrlPr>
+                            <a:rPr lang="en-US" sz="2800" b="1" i="1" smtClean="0">
+                              <a:latin typeface="Cambria Math" panose="02040503050406030204" pitchFamily="18" charset="0"/>
+                              <a:ea typeface="Cambria Math" panose="02040503050406030204" pitchFamily="18" charset="0"/>
+                            </a:rPr>
+                          </m:ctrlPr>
+                        </m:sSubPr>
+                        <m:e>
+                          <m:r>
+                            <a:rPr lang="en-US" sz="2800" b="1" i="1" smtClean="0">
+                              <a:latin typeface="Cambria Math" panose="02040503050406030204" pitchFamily="18" charset="0"/>
+                              <a:ea typeface="Cambria Math" panose="02040503050406030204" pitchFamily="18" charset="0"/>
+                            </a:rPr>
+                            <m:t>𝒙</m:t>
+                          </m:r>
+                        </m:e>
+                        <m:sub>
+                          <m:r>
+                            <a:rPr lang="en-US" sz="2800" b="1" i="1" smtClean="0">
+                              <a:latin typeface="Cambria Math" panose="02040503050406030204" pitchFamily="18" charset="0"/>
+                              <a:ea typeface="Cambria Math" panose="02040503050406030204" pitchFamily="18" charset="0"/>
+                            </a:rPr>
+                            <m:t>𝟏</m:t>
+                          </m:r>
+                        </m:sub>
+                      </m:sSub>
+                      <m:r>
+                        <a:rPr lang="en-US" sz="2800" b="1" i="1" smtClean="0">
+                          <a:latin typeface="Cambria Math" panose="02040503050406030204" pitchFamily="18" charset="0"/>
+                          <a:ea typeface="Cambria Math" panose="02040503050406030204" pitchFamily="18" charset="0"/>
+                        </a:rPr>
+                        <m:t>,</m:t>
+                      </m:r>
+                      <m:sSub>
+                        <m:sSubPr>
+                          <m:ctrlPr>
+                            <a:rPr lang="en-US" sz="2800" b="1" i="1" smtClean="0">
+                              <a:latin typeface="Cambria Math" panose="02040503050406030204" pitchFamily="18" charset="0"/>
+                              <a:ea typeface="Cambria Math" panose="02040503050406030204" pitchFamily="18" charset="0"/>
+                            </a:rPr>
+                          </m:ctrlPr>
+                        </m:sSubPr>
+                        <m:e>
+                          <m:r>
+                            <a:rPr lang="en-US" sz="2800" b="1" i="1" smtClean="0">
+                              <a:latin typeface="Cambria Math" panose="02040503050406030204" pitchFamily="18" charset="0"/>
+                              <a:ea typeface="Cambria Math" panose="02040503050406030204" pitchFamily="18" charset="0"/>
+                            </a:rPr>
+                            <m:t>𝒙</m:t>
+                          </m:r>
+                        </m:e>
+                        <m:sub>
+                          <m:r>
+                            <a:rPr lang="en-US" sz="2800" b="1" i="1" smtClean="0">
+                              <a:latin typeface="Cambria Math" panose="02040503050406030204" pitchFamily="18" charset="0"/>
+                              <a:ea typeface="Cambria Math" panose="02040503050406030204" pitchFamily="18" charset="0"/>
+                            </a:rPr>
+                            <m:t>𝟐</m:t>
+                          </m:r>
+                        </m:sub>
+                      </m:sSub>
+                      <m:r>
+                        <a:rPr lang="en-US" sz="2800" b="1" i="1" smtClean="0">
+                          <a:latin typeface="Cambria Math" panose="02040503050406030204" pitchFamily="18" charset="0"/>
+                          <a:ea typeface="Cambria Math" panose="02040503050406030204" pitchFamily="18" charset="0"/>
+                        </a:rPr>
+                        <m:t>&gt;</m:t>
+                      </m:r>
+                    </m:oMath>
+                  </m:oMathPara>
+                </a14:m>
+                <a:endParaRPr lang="en-US" sz="2800" b="1" dirty="0"/>
+              </a:p>
+            </p:txBody>
+          </p:sp>
+        </mc:Choice>
+        <mc:Fallback>
+          <p:sp>
+            <p:nvSpPr>
+              <p:cNvPr id="39" name="TextBox 38">
+                <a:extLst>
+                  <a:ext uri="{FF2B5EF4-FFF2-40B4-BE49-F238E27FC236}">
+                    <a16:creationId xmlns:a16="http://schemas.microsoft.com/office/drawing/2014/main" id="{2552E3D9-C8DE-409B-A002-7492D6DDDC6D}"/>
+                  </a:ext>
+                </a:extLst>
+              </p:cNvPr>
+              <p:cNvSpPr txBox="1">
+                <a:spLocks noRot="1" noChangeAspect="1" noMove="1" noResize="1" noEditPoints="1" noAdjustHandles="1" noChangeArrowheads="1" noChangeShapeType="1" noTextEdit="1"/>
+              </p:cNvSpPr>
+              <p:nvPr/>
+            </p:nvSpPr>
+            <p:spPr>
+              <a:xfrm>
+                <a:off x="7334964" y="18497008"/>
+                <a:ext cx="2566087" cy="523220"/>
+              </a:xfrm>
+              <a:prstGeom prst="rect">
+                <a:avLst/>
+              </a:prstGeom>
+              <a:blipFill>
+                <a:blip r:embed="rId10"/>
+                <a:stretch>
+                  <a:fillRect/>
+                </a:stretch>
+              </a:blipFill>
+            </p:spPr>
+            <p:txBody>
+              <a:bodyPr/>
+              <a:lstStyle/>
+              <a:p>
+                <a:r>
+                  <a:rPr lang="en-US">
+                    <a:noFill/>
+                  </a:rPr>
+                  <a:t> </a:t>
+                </a:r>
+              </a:p>
+            </p:txBody>
+          </p:sp>
+        </mc:Fallback>
+      </mc:AlternateContent>
+      <p:sp>
+        <p:nvSpPr>
+          <p:cNvPr id="40" name="TextBox 39">
+            <a:extLst>
+              <a:ext uri="{FF2B5EF4-FFF2-40B4-BE49-F238E27FC236}">
+                <a16:creationId xmlns:a16="http://schemas.microsoft.com/office/drawing/2014/main" id="{3E733480-CE94-44B0-AED1-E944C4FBDF3D}"/>
+              </a:ext>
+            </a:extLst>
+          </p:cNvPr>
+          <p:cNvSpPr txBox="1"/>
+          <p:nvPr/>
+        </p:nvSpPr>
+        <p:spPr>
+          <a:xfrm>
+            <a:off x="6196487" y="20633294"/>
+            <a:ext cx="356188" cy="707886"/>
+          </a:xfrm>
+          <a:prstGeom prst="rect">
+            <a:avLst/>
+          </a:prstGeom>
+          <a:noFill/>
+        </p:spPr>
+        <p:txBody>
+          <a:bodyPr wrap="none" rtlCol="0">
+            <a:spAutoFit/>
+          </a:bodyPr>
+          <a:lstStyle/>
+          <a:p>
+            <a:r>
+              <a:rPr lang="en-US" sz="4000" b="1" dirty="0">
+                <a:solidFill>
+                  <a:schemeClr val="accent5">
+                    <a:lumMod val="50000"/>
+                  </a:schemeClr>
+                </a:solidFill>
+              </a:rPr>
+              <a:t>I</a:t>
+            </a:r>
+          </a:p>
+        </p:txBody>
+      </p:sp>
+      <p:sp>
+        <p:nvSpPr>
+          <p:cNvPr id="41" name="TextBox 40">
+            <a:extLst>
+              <a:ext uri="{FF2B5EF4-FFF2-40B4-BE49-F238E27FC236}">
+                <a16:creationId xmlns:a16="http://schemas.microsoft.com/office/drawing/2014/main" id="{A604D2F6-BA01-4953-B94B-7BBC9B064B65}"/>
+              </a:ext>
+            </a:extLst>
+          </p:cNvPr>
+          <p:cNvSpPr txBox="1"/>
+          <p:nvPr/>
+        </p:nvSpPr>
+        <p:spPr>
+          <a:xfrm>
+            <a:off x="4165813" y="19873131"/>
+            <a:ext cx="510076" cy="707886"/>
+          </a:xfrm>
+          <a:prstGeom prst="rect">
+            <a:avLst/>
+          </a:prstGeom>
+          <a:noFill/>
+        </p:spPr>
+        <p:txBody>
+          <a:bodyPr wrap="none" rtlCol="0">
+            <a:spAutoFit/>
+          </a:bodyPr>
+          <a:lstStyle/>
+          <a:p>
+            <a:pPr algn="ctr"/>
+            <a:r>
+              <a:rPr lang="en-US" sz="4000" b="1" dirty="0">
+                <a:solidFill>
+                  <a:schemeClr val="accent5">
+                    <a:lumMod val="50000"/>
+                  </a:schemeClr>
+                </a:solidFill>
+              </a:rPr>
+              <a:t>E</a:t>
+            </a:r>
+          </a:p>
+        </p:txBody>
+      </p:sp>
+      <mc:AlternateContent xmlns:mc="http://schemas.openxmlformats.org/markup-compatibility/2006">
+        <mc:Choice xmlns:a14="http://schemas.microsoft.com/office/drawing/2010/main" Requires="a14">
+          <p:sp>
+            <p:nvSpPr>
+              <p:cNvPr id="21" name="TextBox 20">
+                <a:extLst>
+                  <a:ext uri="{FF2B5EF4-FFF2-40B4-BE49-F238E27FC236}">
+                    <a16:creationId xmlns:a16="http://schemas.microsoft.com/office/drawing/2014/main" id="{42D20163-05F3-4F87-B70C-EAC618F7280A}"/>
+                  </a:ext>
+                </a:extLst>
+              </p:cNvPr>
+              <p:cNvSpPr txBox="1"/>
+              <p:nvPr/>
+            </p:nvSpPr>
+            <p:spPr>
+              <a:xfrm>
+                <a:off x="5544567" y="21219064"/>
+                <a:ext cx="2032992" cy="584775"/>
+              </a:xfrm>
+              <a:prstGeom prst="rect">
+                <a:avLst/>
+              </a:prstGeom>
+              <a:noFill/>
+            </p:spPr>
+            <p:txBody>
+              <a:bodyPr wrap="none" rtlCol="0">
+                <a:spAutoFit/>
+              </a:bodyPr>
+              <a:lstStyle/>
+              <a:p>
+                <a:r>
+                  <a:rPr lang="en-US" sz="3200" dirty="0">
+                    <a:solidFill>
+                      <a:schemeClr val="accent5">
+                        <a:lumMod val="50000"/>
+                      </a:schemeClr>
+                    </a:solidFill>
+                  </a:rPr>
+                  <a:t>Solution </a:t>
+                </a:r>
+                <a14:m>
+                  <m:oMath xmlns:m="http://schemas.openxmlformats.org/officeDocument/2006/math">
+                    <m:sSub>
+                      <m:sSubPr>
+                        <m:ctrlPr>
+                          <a:rPr lang="en-US" sz="3200" b="0" i="1" smtClean="0">
+                            <a:solidFill>
+                              <a:schemeClr val="accent5">
+                                <a:lumMod val="50000"/>
+                              </a:schemeClr>
+                            </a:solidFill>
+                            <a:latin typeface="Cambria Math" panose="02040503050406030204" pitchFamily="18" charset="0"/>
+                          </a:rPr>
+                        </m:ctrlPr>
+                      </m:sSubPr>
+                      <m:e>
+                        <m:r>
+                          <a:rPr lang="en-US" sz="3200" b="0" i="1" smtClean="0">
+                            <a:solidFill>
+                              <a:schemeClr val="accent5">
+                                <a:lumMod val="50000"/>
+                              </a:schemeClr>
+                            </a:solidFill>
+                            <a:latin typeface="Cambria Math" panose="02040503050406030204" pitchFamily="18" charset="0"/>
+                          </a:rPr>
+                          <m:t>𝑢</m:t>
+                        </m:r>
+                      </m:e>
+                      <m:sub>
+                        <m:r>
+                          <a:rPr lang="en-US" sz="3200" b="0" i="1" smtClean="0">
+                            <a:solidFill>
+                              <a:schemeClr val="accent5">
+                                <a:lumMod val="50000"/>
+                              </a:schemeClr>
+                            </a:solidFill>
+                            <a:latin typeface="Cambria Math" panose="02040503050406030204" pitchFamily="18" charset="0"/>
+                          </a:rPr>
+                          <m:t>𝑖</m:t>
+                        </m:r>
+                      </m:sub>
+                    </m:sSub>
+                  </m:oMath>
+                </a14:m>
+                <a:endParaRPr lang="en-US" sz="3200" dirty="0">
+                  <a:solidFill>
+                    <a:schemeClr val="accent5">
+                      <a:lumMod val="50000"/>
+                    </a:schemeClr>
+                  </a:solidFill>
+                </a:endParaRPr>
+              </a:p>
+            </p:txBody>
+          </p:sp>
+        </mc:Choice>
+        <mc:Fallback>
+          <p:sp>
+            <p:nvSpPr>
+              <p:cNvPr id="21" name="TextBox 20">
+                <a:extLst>
+                  <a:ext uri="{FF2B5EF4-FFF2-40B4-BE49-F238E27FC236}">
+                    <a16:creationId xmlns:a16="http://schemas.microsoft.com/office/drawing/2014/main" id="{42D20163-05F3-4F87-B70C-EAC618F7280A}"/>
+                  </a:ext>
+                </a:extLst>
+              </p:cNvPr>
+              <p:cNvSpPr txBox="1">
+                <a:spLocks noRot="1" noChangeAspect="1" noMove="1" noResize="1" noEditPoints="1" noAdjustHandles="1" noChangeArrowheads="1" noChangeShapeType="1" noTextEdit="1"/>
+              </p:cNvSpPr>
+              <p:nvPr/>
+            </p:nvSpPr>
+            <p:spPr>
+              <a:xfrm>
+                <a:off x="5544567" y="21219064"/>
+                <a:ext cx="2032992" cy="584775"/>
+              </a:xfrm>
+              <a:prstGeom prst="rect">
+                <a:avLst/>
+              </a:prstGeom>
+              <a:blipFill>
+                <a:blip r:embed="rId11"/>
+                <a:stretch>
+                  <a:fillRect l="-7808" t="-13542" b="-33333"/>
+                </a:stretch>
+              </a:blipFill>
+            </p:spPr>
+            <p:txBody>
+              <a:bodyPr/>
+              <a:lstStyle/>
+              <a:p>
+                <a:r>
+                  <a:rPr lang="en-US">
+                    <a:noFill/>
+                  </a:rPr>
+                  <a:t> </a:t>
+                </a:r>
+              </a:p>
+            </p:txBody>
+          </p:sp>
+        </mc:Fallback>
+      </mc:AlternateContent>
+      <mc:AlternateContent xmlns:mc="http://schemas.openxmlformats.org/markup-compatibility/2006">
+        <mc:Choice xmlns:a14="http://schemas.microsoft.com/office/drawing/2010/main" Requires="a14">
+          <p:sp>
+            <p:nvSpPr>
+              <p:cNvPr id="45" name="TextBox 44">
+                <a:extLst>
+                  <a:ext uri="{FF2B5EF4-FFF2-40B4-BE49-F238E27FC236}">
+                    <a16:creationId xmlns:a16="http://schemas.microsoft.com/office/drawing/2014/main" id="{F82C8F7A-2AA3-4BB9-8F8B-01D0B2302166}"/>
+                  </a:ext>
+                </a:extLst>
+              </p:cNvPr>
+              <p:cNvSpPr txBox="1"/>
+              <p:nvPr/>
+            </p:nvSpPr>
+            <p:spPr>
+              <a:xfrm>
+                <a:off x="3456688" y="19378350"/>
+                <a:ext cx="2087879" cy="584775"/>
+              </a:xfrm>
+              <a:prstGeom prst="rect">
+                <a:avLst/>
+              </a:prstGeom>
+              <a:noFill/>
+            </p:spPr>
+            <p:txBody>
+              <a:bodyPr wrap="none" rtlCol="0">
+                <a:spAutoFit/>
+              </a:bodyPr>
+              <a:lstStyle/>
+              <a:p>
+                <a:r>
+                  <a:rPr lang="en-US" sz="3200" dirty="0">
+                    <a:solidFill>
+                      <a:schemeClr val="accent5">
+                        <a:lumMod val="50000"/>
+                      </a:schemeClr>
+                    </a:solidFill>
+                  </a:rPr>
+                  <a:t>Solution </a:t>
+                </a:r>
+                <a14:m>
+                  <m:oMath xmlns:m="http://schemas.openxmlformats.org/officeDocument/2006/math">
+                    <m:sSub>
+                      <m:sSubPr>
+                        <m:ctrlPr>
+                          <a:rPr lang="en-US" sz="3200" b="0" i="1" smtClean="0">
+                            <a:solidFill>
+                              <a:schemeClr val="accent5">
+                                <a:lumMod val="50000"/>
+                              </a:schemeClr>
+                            </a:solidFill>
+                            <a:latin typeface="Cambria Math" panose="02040503050406030204" pitchFamily="18" charset="0"/>
+                          </a:rPr>
+                        </m:ctrlPr>
+                      </m:sSubPr>
+                      <m:e>
+                        <m:r>
+                          <a:rPr lang="en-US" sz="3200" b="0" i="1" smtClean="0">
+                            <a:solidFill>
+                              <a:schemeClr val="accent5">
+                                <a:lumMod val="50000"/>
+                              </a:schemeClr>
+                            </a:solidFill>
+                            <a:latin typeface="Cambria Math" panose="02040503050406030204" pitchFamily="18" charset="0"/>
+                          </a:rPr>
+                          <m:t>𝑢</m:t>
+                        </m:r>
+                      </m:e>
+                      <m:sub>
+                        <m:r>
+                          <a:rPr lang="en-US" sz="3200" b="0" i="1" smtClean="0">
+                            <a:solidFill>
+                              <a:schemeClr val="accent5">
+                                <a:lumMod val="50000"/>
+                              </a:schemeClr>
+                            </a:solidFill>
+                            <a:latin typeface="Cambria Math" panose="02040503050406030204" pitchFamily="18" charset="0"/>
+                          </a:rPr>
+                          <m:t>𝑒</m:t>
+                        </m:r>
+                      </m:sub>
+                    </m:sSub>
+                  </m:oMath>
+                </a14:m>
+                <a:endParaRPr lang="en-US" sz="3200" dirty="0">
+                  <a:solidFill>
+                    <a:schemeClr val="accent5">
+                      <a:lumMod val="50000"/>
+                    </a:schemeClr>
+                  </a:solidFill>
+                </a:endParaRPr>
+              </a:p>
+            </p:txBody>
+          </p:sp>
+        </mc:Choice>
+        <mc:Fallback>
+          <p:sp>
+            <p:nvSpPr>
+              <p:cNvPr id="45" name="TextBox 44">
+                <a:extLst>
+                  <a:ext uri="{FF2B5EF4-FFF2-40B4-BE49-F238E27FC236}">
+                    <a16:creationId xmlns:a16="http://schemas.microsoft.com/office/drawing/2014/main" id="{F82C8F7A-2AA3-4BB9-8F8B-01D0B2302166}"/>
+                  </a:ext>
+                </a:extLst>
+              </p:cNvPr>
+              <p:cNvSpPr txBox="1">
+                <a:spLocks noRot="1" noChangeAspect="1" noMove="1" noResize="1" noEditPoints="1" noAdjustHandles="1" noChangeArrowheads="1" noChangeShapeType="1" noTextEdit="1"/>
+              </p:cNvSpPr>
+              <p:nvPr/>
+            </p:nvSpPr>
+            <p:spPr>
+              <a:xfrm>
+                <a:off x="3456688" y="19378350"/>
+                <a:ext cx="2087879" cy="584775"/>
+              </a:xfrm>
+              <a:prstGeom prst="rect">
+                <a:avLst/>
+              </a:prstGeom>
+              <a:blipFill>
+                <a:blip r:embed="rId12"/>
+                <a:stretch>
+                  <a:fillRect l="-7289" t="-13542" b="-33333"/>
+                </a:stretch>
+              </a:blipFill>
+            </p:spPr>
+            <p:txBody>
+              <a:bodyPr/>
+              <a:lstStyle/>
+              <a:p>
+                <a:r>
+                  <a:rPr lang="en-US">
+                    <a:noFill/>
+                  </a:rPr>
+                  <a:t> </a:t>
+                </a:r>
+              </a:p>
+            </p:txBody>
+          </p:sp>
+        </mc:Fallback>
+      </mc:AlternateContent>
+      <mc:AlternateContent xmlns:mc="http://schemas.openxmlformats.org/markup-compatibility/2006">
+        <mc:Choice xmlns:a14="http://schemas.microsoft.com/office/drawing/2010/main" Requires="a14">
+          <p:sp>
+            <p:nvSpPr>
+              <p:cNvPr id="22" name="TextBox 21">
+                <a:extLst>
+                  <a:ext uri="{FF2B5EF4-FFF2-40B4-BE49-F238E27FC236}">
+                    <a16:creationId xmlns:a16="http://schemas.microsoft.com/office/drawing/2014/main" id="{57B3B4A9-56E4-4D33-9FB4-D26F684F2F4B}"/>
+                  </a:ext>
+                </a:extLst>
+              </p:cNvPr>
+              <p:cNvSpPr txBox="1"/>
+              <p:nvPr/>
+            </p:nvSpPr>
+            <p:spPr>
+              <a:xfrm>
+                <a:off x="10665747" y="18678519"/>
+                <a:ext cx="1330044" cy="584775"/>
+              </a:xfrm>
+              <a:prstGeom prst="rect">
+                <a:avLst/>
+              </a:prstGeom>
+              <a:noFill/>
+            </p:spPr>
+            <p:txBody>
+              <a:bodyPr wrap="none" rtlCol="0">
+                <a:spAutoFit/>
+              </a:bodyPr>
+              <a:lstStyle/>
+              <a:p>
+                <a:r>
+                  <a:rPr lang="en-US" sz="3200" dirty="0">
+                    <a:solidFill>
+                      <a:schemeClr val="accent6">
+                        <a:lumMod val="75000"/>
+                      </a:schemeClr>
+                    </a:solidFill>
+                  </a:rPr>
+                  <a:t>Data </a:t>
+                </a:r>
+                <a14:m>
+                  <m:oMath xmlns:m="http://schemas.openxmlformats.org/officeDocument/2006/math">
+                    <m:r>
+                      <a:rPr lang="en-US" sz="3200" b="0" i="1" smtClean="0">
+                        <a:solidFill>
+                          <a:schemeClr val="accent6">
+                            <a:lumMod val="75000"/>
+                          </a:schemeClr>
+                        </a:solidFill>
+                        <a:latin typeface="Cambria Math" panose="02040503050406030204" pitchFamily="18" charset="0"/>
+                      </a:rPr>
+                      <m:t>𝑓</m:t>
+                    </m:r>
+                  </m:oMath>
+                </a14:m>
+                <a:endParaRPr lang="en-US" sz="3200" dirty="0">
+                  <a:solidFill>
+                    <a:schemeClr val="accent6">
+                      <a:lumMod val="75000"/>
+                    </a:schemeClr>
+                  </a:solidFill>
+                </a:endParaRPr>
+              </a:p>
+            </p:txBody>
+          </p:sp>
+        </mc:Choice>
+        <mc:Fallback>
+          <p:sp>
+            <p:nvSpPr>
+              <p:cNvPr id="22" name="TextBox 21">
+                <a:extLst>
+                  <a:ext uri="{FF2B5EF4-FFF2-40B4-BE49-F238E27FC236}">
+                    <a16:creationId xmlns:a16="http://schemas.microsoft.com/office/drawing/2014/main" id="{57B3B4A9-56E4-4D33-9FB4-D26F684F2F4B}"/>
+                  </a:ext>
+                </a:extLst>
+              </p:cNvPr>
+              <p:cNvSpPr txBox="1">
+                <a:spLocks noRot="1" noChangeAspect="1" noMove="1" noResize="1" noEditPoints="1" noAdjustHandles="1" noChangeArrowheads="1" noChangeShapeType="1" noTextEdit="1"/>
+              </p:cNvSpPr>
+              <p:nvPr/>
+            </p:nvSpPr>
+            <p:spPr>
+              <a:xfrm>
+                <a:off x="10665747" y="18678519"/>
+                <a:ext cx="1330044" cy="584775"/>
+              </a:xfrm>
+              <a:prstGeom prst="rect">
+                <a:avLst/>
+              </a:prstGeom>
+              <a:blipFill>
+                <a:blip r:embed="rId13"/>
+                <a:stretch>
+                  <a:fillRect l="-11927" t="-13542" b="-33333"/>
+                </a:stretch>
+              </a:blipFill>
+            </p:spPr>
+            <p:txBody>
+              <a:bodyPr/>
+              <a:lstStyle/>
+              <a:p>
+                <a:r>
+                  <a:rPr lang="en-US">
+                    <a:noFill/>
+                  </a:rPr>
+                  <a:t> </a:t>
+                </a:r>
+              </a:p>
+            </p:txBody>
+          </p:sp>
+        </mc:Fallback>
+      </mc:AlternateContent>
+      <mc:AlternateContent xmlns:mc="http://schemas.openxmlformats.org/markup-compatibility/2006">
+        <mc:Choice xmlns:a14="http://schemas.microsoft.com/office/drawing/2010/main" Requires="a14">
+          <p:sp>
+            <p:nvSpPr>
+              <p:cNvPr id="46" name="TextBox 45">
+                <a:extLst>
+                  <a:ext uri="{FF2B5EF4-FFF2-40B4-BE49-F238E27FC236}">
+                    <a16:creationId xmlns:a16="http://schemas.microsoft.com/office/drawing/2014/main" id="{4F467822-D68C-4CAB-B7BD-62753965C810}"/>
+                  </a:ext>
+                </a:extLst>
+              </p:cNvPr>
+              <p:cNvSpPr txBox="1"/>
+              <p:nvPr/>
+            </p:nvSpPr>
+            <p:spPr>
+              <a:xfrm>
+                <a:off x="4240337" y="22897050"/>
+                <a:ext cx="530915" cy="584775"/>
+              </a:xfrm>
+              <a:prstGeom prst="rect">
+                <a:avLst/>
+              </a:prstGeom>
+              <a:noFill/>
+            </p:spPr>
+            <p:txBody>
+              <a:bodyPr wrap="none" rtlCol="0">
+                <a:spAutoFit/>
+              </a:bodyPr>
+              <a:lstStyle/>
+              <a:p>
+                <a14:m>
+                  <m:oMathPara xmlns:m="http://schemas.openxmlformats.org/officeDocument/2006/math">
+                    <m:oMathParaPr>
+                      <m:jc m:val="centerGroup"/>
+                    </m:oMathParaPr>
+                    <m:oMath xmlns:m="http://schemas.openxmlformats.org/officeDocument/2006/math">
+                      <m:r>
+                        <a:rPr lang="en-US" sz="3200" b="1" i="1" smtClean="0">
+                          <a:solidFill>
+                            <a:schemeClr val="accent3">
+                              <a:lumMod val="75000"/>
+                            </a:schemeClr>
+                          </a:solidFill>
+                          <a:latin typeface="Cambria Math" panose="02040503050406030204" pitchFamily="18" charset="0"/>
+                        </a:rPr>
+                        <m:t>𝝂</m:t>
+                      </m:r>
+                    </m:oMath>
+                  </m:oMathPara>
+                </a14:m>
+                <a:endParaRPr lang="en-US" sz="3200" b="1" dirty="0">
+                  <a:solidFill>
+                    <a:schemeClr val="accent3">
+                      <a:lumMod val="75000"/>
+                    </a:schemeClr>
+                  </a:solidFill>
+                </a:endParaRPr>
+              </a:p>
+            </p:txBody>
+          </p:sp>
+        </mc:Choice>
+        <mc:Fallback>
+          <p:sp>
+            <p:nvSpPr>
+              <p:cNvPr id="46" name="TextBox 45">
+                <a:extLst>
+                  <a:ext uri="{FF2B5EF4-FFF2-40B4-BE49-F238E27FC236}">
+                    <a16:creationId xmlns:a16="http://schemas.microsoft.com/office/drawing/2014/main" id="{4F467822-D68C-4CAB-B7BD-62753965C810}"/>
+                  </a:ext>
+                </a:extLst>
+              </p:cNvPr>
+              <p:cNvSpPr txBox="1">
+                <a:spLocks noRot="1" noChangeAspect="1" noMove="1" noResize="1" noEditPoints="1" noAdjustHandles="1" noChangeArrowheads="1" noChangeShapeType="1" noTextEdit="1"/>
+              </p:cNvSpPr>
+              <p:nvPr/>
+            </p:nvSpPr>
+            <p:spPr>
+              <a:xfrm>
+                <a:off x="4240337" y="22897050"/>
+                <a:ext cx="530915" cy="584775"/>
+              </a:xfrm>
+              <a:prstGeom prst="rect">
+                <a:avLst/>
+              </a:prstGeom>
+              <a:blipFill>
+                <a:blip r:embed="rId14"/>
+                <a:stretch>
+                  <a:fillRect/>
+                </a:stretch>
+              </a:blipFill>
+            </p:spPr>
+            <p:txBody>
+              <a:bodyPr/>
+              <a:lstStyle/>
+              <a:p>
+                <a:r>
+                  <a:rPr lang="en-US">
+                    <a:noFill/>
+                  </a:rPr>
+                  <a:t> </a:t>
+                </a:r>
+              </a:p>
+            </p:txBody>
+          </p:sp>
+        </mc:Fallback>
+      </mc:AlternateContent>
+      <p:pic>
+        <p:nvPicPr>
+          <p:cNvPr id="23" name="Picture 22">
+            <a:extLst>
+              <a:ext uri="{FF2B5EF4-FFF2-40B4-BE49-F238E27FC236}">
+                <a16:creationId xmlns:a16="http://schemas.microsoft.com/office/drawing/2014/main" id="{C51B0D89-E9B9-4A92-B581-6033ABCCFECE}"/>
               </a:ext>
             </a:extLst>
           </p:cNvPr>
@@ -7891,21 +9686,403 @@
           <p:nvPr/>
         </p:nvPicPr>
         <p:blipFill>
-          <a:blip r:embed="rId6"/>
+          <a:blip r:embed="rId15"/>
           <a:stretch>
             <a:fillRect/>
           </a:stretch>
         </p:blipFill>
         <p:spPr>
           <a:xfrm>
-            <a:off x="16029837" y="14523721"/>
-            <a:ext cx="11526726" cy="9555480"/>
+            <a:off x="15706046" y="11396120"/>
+            <a:ext cx="6491230" cy="5038741"/>
           </a:xfrm>
           <a:prstGeom prst="rect">
             <a:avLst/>
           </a:prstGeom>
+          <a:ln w="57150">
+            <a:solidFill>
+              <a:schemeClr val="accent3">
+                <a:lumMod val="75000"/>
+              </a:schemeClr>
+            </a:solidFill>
+          </a:ln>
         </p:spPr>
       </p:pic>
+      <mc:AlternateContent xmlns:mc="http://schemas.openxmlformats.org/markup-compatibility/2006">
+        <mc:Choice xmlns:a14="http://schemas.microsoft.com/office/drawing/2010/main" Requires="a14">
+          <p:sp>
+            <p:nvSpPr>
+              <p:cNvPr id="50" name="Rectangle 49">
+                <a:extLst>
+                  <a:ext uri="{FF2B5EF4-FFF2-40B4-BE49-F238E27FC236}">
+                    <a16:creationId xmlns:a16="http://schemas.microsoft.com/office/drawing/2014/main" id="{78F01E89-C3E2-405C-BA18-8D758CDE7550}"/>
+                  </a:ext>
+                </a:extLst>
+              </p:cNvPr>
+              <p:cNvSpPr/>
+              <p:nvPr/>
+            </p:nvSpPr>
+            <p:spPr>
+              <a:xfrm>
+                <a:off x="15575061" y="5347533"/>
+                <a:ext cx="12974524" cy="5851410"/>
+              </a:xfrm>
+              <a:prstGeom prst="rect">
+                <a:avLst/>
+              </a:prstGeom>
+              <a:ln w="12700">
+                <a:noFill/>
+              </a:ln>
+            </p:spPr>
+            <p:txBody>
+              <a:bodyPr wrap="square">
+                <a:spAutoFit/>
+              </a:bodyPr>
+              <a:lstStyle/>
+              <a:p>
+                <a:pPr algn="just">
+                  <a:spcAft>
+                    <a:spcPts val="1200"/>
+                  </a:spcAft>
+                </a:pPr>
+                <a:r>
+                  <a:rPr lang="en-US" sz="3800" dirty="0">
+                    <a:cs typeface="Times New Roman" panose="02020603050405020304" pitchFamily="18" charset="0"/>
+                  </a:rPr>
+                  <a:t>By parameterizing the BIE, we can apply the PTR and approximate our results outside and inside the boundary.  </a:t>
+                </a:r>
+                <a:r>
+                  <a:rPr lang="en-US" sz="3800" b="0" dirty="0">
+                    <a:cs typeface="Times New Roman" panose="02020603050405020304" pitchFamily="18" charset="0"/>
+                  </a:rPr>
+                  <a:t>The PTR allows us to simply use a summation to ge</a:t>
+                </a:r>
+                <a:r>
+                  <a:rPr lang="en-US" sz="3800" dirty="0">
+                    <a:cs typeface="Times New Roman" panose="02020603050405020304" pitchFamily="18" charset="0"/>
+                  </a:rPr>
+                  <a:t>t our solution.</a:t>
+                </a:r>
+                <a:endParaRPr lang="en-US" sz="3800" b="0" dirty="0">
+                  <a:cs typeface="Times New Roman" panose="02020603050405020304" pitchFamily="18" charset="0"/>
+                </a:endParaRPr>
+              </a:p>
+              <a:p>
+                <a:pPr algn="ctr"/>
+                <a:r>
+                  <a:rPr lang="en-US" sz="3800" u="sng" dirty="0">
+                    <a:cs typeface="Times New Roman" panose="02020603050405020304" pitchFamily="18" charset="0"/>
+                  </a:rPr>
+                  <a:t>PTR Formula  </a:t>
+                </a:r>
+              </a:p>
+              <a:p>
+                <a:pPr algn="ctr"/>
+                <a14:m>
+                  <m:oMathPara xmlns:m="http://schemas.openxmlformats.org/officeDocument/2006/math">
+                    <m:oMathParaPr>
+                      <m:jc m:val="centerGroup"/>
+                    </m:oMathParaPr>
+                    <m:oMath xmlns:m="http://schemas.openxmlformats.org/officeDocument/2006/math">
+                      <m:nary>
+                        <m:naryPr>
+                          <m:ctrlPr>
+                            <a:rPr lang="en-US" sz="3800" i="1" smtClean="0">
+                              <a:latin typeface="Cambria Math" panose="02040503050406030204" pitchFamily="18" charset="0"/>
+                              <a:cs typeface="Times New Roman" panose="02020603050405020304" pitchFamily="18" charset="0"/>
+                            </a:rPr>
+                          </m:ctrlPr>
+                        </m:naryPr>
+                        <m:sub>
+                          <m:r>
+                            <m:rPr>
+                              <m:brk m:alnAt="23"/>
+                            </m:rPr>
+                            <a:rPr lang="en-US" sz="3800" b="0" i="1" smtClean="0">
+                              <a:latin typeface="Cambria Math" panose="02040503050406030204" pitchFamily="18" charset="0"/>
+                              <a:cs typeface="Times New Roman" panose="02020603050405020304" pitchFamily="18" charset="0"/>
+                            </a:rPr>
+                            <m:t>0</m:t>
+                          </m:r>
+                        </m:sub>
+                        <m:sup>
+                          <m:r>
+                            <a:rPr lang="en-US" sz="3800" b="0" i="1" smtClean="0">
+                              <a:latin typeface="Cambria Math" panose="02040503050406030204" pitchFamily="18" charset="0"/>
+                              <a:cs typeface="Times New Roman" panose="02020603050405020304" pitchFamily="18" charset="0"/>
+                            </a:rPr>
+                            <m:t>2</m:t>
+                          </m:r>
+                          <m:r>
+                            <a:rPr lang="en-US" sz="3800" b="0" i="1" smtClean="0">
+                              <a:latin typeface="Cambria Math" panose="02040503050406030204" pitchFamily="18" charset="0"/>
+                              <a:cs typeface="Times New Roman" panose="02020603050405020304" pitchFamily="18" charset="0"/>
+                            </a:rPr>
+                            <m:t>𝜋</m:t>
+                          </m:r>
+                        </m:sup>
+                        <m:e>
+                          <m:r>
+                            <a:rPr lang="en-US" sz="3800" b="0" i="1" smtClean="0">
+                              <a:latin typeface="Cambria Math" panose="02040503050406030204" pitchFamily="18" charset="0"/>
+                              <a:cs typeface="Times New Roman" panose="02020603050405020304" pitchFamily="18" charset="0"/>
+                            </a:rPr>
+                            <m:t>𝑓</m:t>
+                          </m:r>
+                          <m:d>
+                            <m:dPr>
+                              <m:ctrlPr>
+                                <a:rPr lang="en-US" sz="3800" b="0" i="1" smtClean="0">
+                                  <a:latin typeface="Cambria Math" panose="02040503050406030204" pitchFamily="18" charset="0"/>
+                                  <a:cs typeface="Times New Roman" panose="02020603050405020304" pitchFamily="18" charset="0"/>
+                                </a:rPr>
+                              </m:ctrlPr>
+                            </m:dPr>
+                            <m:e>
+                              <m:r>
+                                <a:rPr lang="en-US" sz="3800" b="0" i="1" smtClean="0">
+                                  <a:latin typeface="Cambria Math" panose="02040503050406030204" pitchFamily="18" charset="0"/>
+                                  <a:cs typeface="Times New Roman" panose="02020603050405020304" pitchFamily="18" charset="0"/>
+                                </a:rPr>
+                                <m:t>𝑥</m:t>
+                              </m:r>
+                            </m:e>
+                          </m:d>
+                          <m:r>
+                            <a:rPr lang="en-US" sz="3800" b="0" i="1" smtClean="0">
+                              <a:latin typeface="Cambria Math" panose="02040503050406030204" pitchFamily="18" charset="0"/>
+                              <a:cs typeface="Times New Roman" panose="02020603050405020304" pitchFamily="18" charset="0"/>
+                            </a:rPr>
+                            <m:t>= </m:t>
+                          </m:r>
+                          <m:nary>
+                            <m:naryPr>
+                              <m:chr m:val="∑"/>
+                              <m:subHide m:val="on"/>
+                              <m:supHide m:val="on"/>
+                              <m:ctrlPr>
+                                <a:rPr lang="en-US" sz="3800" b="0" i="1" smtClean="0">
+                                  <a:latin typeface="Cambria Math" panose="02040503050406030204" pitchFamily="18" charset="0"/>
+                                  <a:cs typeface="Times New Roman" panose="02020603050405020304" pitchFamily="18" charset="0"/>
+                                </a:rPr>
+                              </m:ctrlPr>
+                            </m:naryPr>
+                            <m:sub/>
+                            <m:sup/>
+                            <m:e>
+                              <m:f>
+                                <m:fPr>
+                                  <m:ctrlPr>
+                                    <a:rPr lang="en-US" sz="3800" b="0" i="1" smtClean="0">
+                                      <a:latin typeface="Cambria Math" panose="02040503050406030204" pitchFamily="18" charset="0"/>
+                                      <a:cs typeface="Times New Roman" panose="02020603050405020304" pitchFamily="18" charset="0"/>
+                                    </a:rPr>
+                                  </m:ctrlPr>
+                                </m:fPr>
+                                <m:num>
+                                  <m:r>
+                                    <a:rPr lang="en-US" sz="3800" b="0" i="1" smtClean="0">
+                                      <a:latin typeface="Cambria Math" panose="02040503050406030204" pitchFamily="18" charset="0"/>
+                                      <a:cs typeface="Times New Roman" panose="02020603050405020304" pitchFamily="18" charset="0"/>
+                                    </a:rPr>
+                                    <m:t>𝑓</m:t>
+                                  </m:r>
+                                  <m:d>
+                                    <m:dPr>
+                                      <m:ctrlPr>
+                                        <a:rPr lang="en-US" sz="3800" b="0" i="1" smtClean="0">
+                                          <a:latin typeface="Cambria Math" panose="02040503050406030204" pitchFamily="18" charset="0"/>
+                                          <a:cs typeface="Times New Roman" panose="02020603050405020304" pitchFamily="18" charset="0"/>
+                                        </a:rPr>
+                                      </m:ctrlPr>
+                                    </m:dPr>
+                                    <m:e>
+                                      <m:sSub>
+                                        <m:sSubPr>
+                                          <m:ctrlPr>
+                                            <a:rPr lang="en-US" sz="3800" b="0" i="1" smtClean="0">
+                                              <a:latin typeface="Cambria Math" panose="02040503050406030204" pitchFamily="18" charset="0"/>
+                                              <a:cs typeface="Times New Roman" panose="02020603050405020304" pitchFamily="18" charset="0"/>
+                                            </a:rPr>
+                                          </m:ctrlPr>
+                                        </m:sSubPr>
+                                        <m:e>
+                                          <m:r>
+                                            <a:rPr lang="en-US" sz="3800" b="0" i="1" smtClean="0">
+                                              <a:latin typeface="Cambria Math" panose="02040503050406030204" pitchFamily="18" charset="0"/>
+                                              <a:cs typeface="Times New Roman" panose="02020603050405020304" pitchFamily="18" charset="0"/>
+                                            </a:rPr>
+                                            <m:t>𝑥</m:t>
+                                          </m:r>
+                                        </m:e>
+                                        <m:sub>
+                                          <m:r>
+                                            <a:rPr lang="en-US" sz="3800" b="0" i="1" smtClean="0">
+                                              <a:latin typeface="Cambria Math" panose="02040503050406030204" pitchFamily="18" charset="0"/>
+                                              <a:cs typeface="Times New Roman" panose="02020603050405020304" pitchFamily="18" charset="0"/>
+                                            </a:rPr>
+                                            <m:t>𝑖</m:t>
+                                          </m:r>
+                                          <m:r>
+                                            <a:rPr lang="en-US" sz="3800" b="0" i="1" smtClean="0">
+                                              <a:latin typeface="Cambria Math" panose="02040503050406030204" pitchFamily="18" charset="0"/>
+                                              <a:cs typeface="Times New Roman" panose="02020603050405020304" pitchFamily="18" charset="0"/>
+                                            </a:rPr>
+                                            <m:t>,</m:t>
+                                          </m:r>
+                                          <m:r>
+                                            <a:rPr lang="en-US" sz="3800" b="0" i="1" smtClean="0">
+                                              <a:latin typeface="Cambria Math" panose="02040503050406030204" pitchFamily="18" charset="0"/>
+                                              <a:cs typeface="Times New Roman" panose="02020603050405020304" pitchFamily="18" charset="0"/>
+                                            </a:rPr>
+                                            <m:t>𝑗</m:t>
+                                          </m:r>
+                                        </m:sub>
+                                      </m:sSub>
+                                    </m:e>
+                                  </m:d>
+                                  <m:r>
+                                    <m:rPr>
+                                      <m:lit/>
+                                    </m:rPr>
+                                    <a:rPr lang="en-US" sz="3800" b="0" i="1" smtClean="0">
+                                      <a:latin typeface="Cambria Math" panose="02040503050406030204" pitchFamily="18" charset="0"/>
+                                      <a:cs typeface="Times New Roman" panose="02020603050405020304" pitchFamily="18" charset="0"/>
+                                    </a:rPr>
+                                    <m:t> </m:t>
+                                  </m:r>
+                                </m:num>
+                                <m:den>
+                                  <m:r>
+                                    <a:rPr lang="en-US" sz="3800" b="0" i="1" smtClean="0">
+                                      <a:latin typeface="Cambria Math" panose="02040503050406030204" pitchFamily="18" charset="0"/>
+                                      <a:cs typeface="Times New Roman" panose="02020603050405020304" pitchFamily="18" charset="0"/>
+                                    </a:rPr>
+                                    <m:t>𝑁</m:t>
+                                  </m:r>
+                                </m:den>
+                              </m:f>
+                            </m:e>
+                          </m:nary>
+                        </m:e>
+                      </m:nary>
+                    </m:oMath>
+                  </m:oMathPara>
+                </a14:m>
+                <a:endParaRPr lang="en-US" sz="3800" dirty="0">
+                  <a:cs typeface="Times New Roman" panose="02020603050405020304" pitchFamily="18" charset="0"/>
+                </a:endParaRPr>
+              </a:p>
+              <a:p>
+                <a:pPr algn="just"/>
+                <a:r>
+                  <a:rPr lang="en-US" sz="3800" dirty="0">
+                    <a:cs typeface="Times New Roman" panose="02020603050405020304" pitchFamily="18" charset="0"/>
+                  </a:rPr>
+                  <a:t>We must use the Kress Quadrature to find the solution for points on the boundary, however.  Otherwise, the solution is singular.</a:t>
+                </a:r>
+                <a:r>
+                  <a:rPr lang="en-US" sz="3800" baseline="30000" dirty="0">
+                    <a:cs typeface="Times New Roman" panose="02020603050405020304" pitchFamily="18" charset="0"/>
+                  </a:rPr>
+                  <a:t>[1]</a:t>
+                </a:r>
+                <a:endParaRPr lang="en-US" sz="3800" dirty="0">
+                  <a:cs typeface="Times New Roman" panose="02020603050405020304" pitchFamily="18" charset="0"/>
+                </a:endParaRPr>
+              </a:p>
+            </p:txBody>
+          </p:sp>
+        </mc:Choice>
+        <mc:Fallback>
+          <p:sp>
+            <p:nvSpPr>
+              <p:cNvPr id="50" name="Rectangle 49">
+                <a:extLst>
+                  <a:ext uri="{FF2B5EF4-FFF2-40B4-BE49-F238E27FC236}">
+                    <a16:creationId xmlns:a16="http://schemas.microsoft.com/office/drawing/2014/main" id="{78F01E89-C3E2-405C-BA18-8D758CDE7550}"/>
+                  </a:ext>
+                </a:extLst>
+              </p:cNvPr>
+              <p:cNvSpPr>
+                <a:spLocks noRot="1" noChangeAspect="1" noMove="1" noResize="1" noEditPoints="1" noAdjustHandles="1" noChangeArrowheads="1" noChangeShapeType="1" noTextEdit="1"/>
+              </p:cNvSpPr>
+              <p:nvPr/>
+            </p:nvSpPr>
+            <p:spPr>
+              <a:xfrm>
+                <a:off x="15575061" y="5347533"/>
+                <a:ext cx="12974524" cy="5851410"/>
+              </a:xfrm>
+              <a:prstGeom prst="rect">
+                <a:avLst/>
+              </a:prstGeom>
+              <a:blipFill>
+                <a:blip r:embed="rId16"/>
+                <a:stretch>
+                  <a:fillRect l="-1551" t="-1771" r="-1551" b="-3333"/>
+                </a:stretch>
+              </a:blipFill>
+              <a:ln w="12700">
+                <a:noFill/>
+              </a:ln>
+            </p:spPr>
+            <p:txBody>
+              <a:bodyPr/>
+              <a:lstStyle/>
+              <a:p>
+                <a:r>
+                  <a:rPr lang="en-US">
+                    <a:noFill/>
+                  </a:rPr>
+                  <a:t> </a:t>
+                </a:r>
+              </a:p>
+            </p:txBody>
+          </p:sp>
+        </mc:Fallback>
+      </mc:AlternateContent>
+      <p:sp>
+        <p:nvSpPr>
+          <p:cNvPr id="24" name="TextBox 23">
+            <a:extLst>
+              <a:ext uri="{FF2B5EF4-FFF2-40B4-BE49-F238E27FC236}">
+                <a16:creationId xmlns:a16="http://schemas.microsoft.com/office/drawing/2014/main" id="{89F79DCD-8091-4B41-8918-957F1F5B191D}"/>
+              </a:ext>
+            </a:extLst>
+          </p:cNvPr>
+          <p:cNvSpPr txBox="1"/>
+          <p:nvPr/>
+        </p:nvSpPr>
+        <p:spPr>
+          <a:xfrm>
+            <a:off x="22479000" y="11353800"/>
+            <a:ext cx="5758543" cy="3108543"/>
+          </a:xfrm>
+          <a:prstGeom prst="rect">
+            <a:avLst/>
+          </a:prstGeom>
+          <a:noFill/>
+        </p:spPr>
+        <p:txBody>
+          <a:bodyPr wrap="square" rtlCol="0">
+            <a:spAutoFit/>
+          </a:bodyPr>
+          <a:lstStyle/>
+          <a:p>
+            <a:pPr algn="just"/>
+            <a:r>
+              <a:rPr lang="en-US" sz="2800" b="1" dirty="0"/>
+              <a:t>Figure 2.</a:t>
+            </a:r>
+            <a:r>
+              <a:rPr lang="en-US" sz="2800" dirty="0"/>
+              <a:t> The PTR is used to fill in a grid originating from selected points on the boundary.  This method reduces the amount of points which must be evaluated to simulate the behavior of a source acting on the boundary.</a:t>
+            </a:r>
+            <a:endParaRPr lang="en-US" sz="2800" b="1" dirty="0"/>
+          </a:p>
+        </p:txBody>
+      </p:sp>
     </p:spTree>
     <p:extLst>
       <p:ext uri="{BB962C8B-B14F-4D97-AF65-F5344CB8AC3E}">

</xml_diff>

<commit_message>
Poster Update (Needs diagrams from notebook)
</commit_message>
<xml_diff>
--- a/UROC Poster Draft.pptx
+++ b/UROC Poster Draft.pptx
@@ -4343,6 +4343,36 @@
       </p:grpSpPr>
       <p:pic>
         <p:nvPicPr>
+          <p:cNvPr id="13" name="Picture 12">
+            <a:extLst>
+              <a:ext uri="{FF2B5EF4-FFF2-40B4-BE49-F238E27FC236}">
+                <a16:creationId xmlns:a16="http://schemas.microsoft.com/office/drawing/2014/main" id="{5CBCC8BE-115A-4D5C-91F2-DB7A9297A9AB}"/>
+              </a:ext>
+            </a:extLst>
+          </p:cNvPr>
+          <p:cNvPicPr>
+            <a:picLocks noChangeAspect="1"/>
+          </p:cNvPicPr>
+          <p:nvPr/>
+        </p:nvPicPr>
+        <p:blipFill>
+          <a:blip r:embed="rId3"/>
+          <a:stretch>
+            <a:fillRect/>
+          </a:stretch>
+        </p:blipFill>
+        <p:spPr>
+          <a:xfrm>
+            <a:off x="15642507" y="10718307"/>
+            <a:ext cx="7674693" cy="5991355"/>
+          </a:xfrm>
+          <a:prstGeom prst="rect">
+            <a:avLst/>
+          </a:prstGeom>
+        </p:spPr>
+      </p:pic>
+      <p:pic>
+        <p:nvPicPr>
           <p:cNvPr id="4" name="Picture 3">
             <a:extLst>
               <a:ext uri="{FF2B5EF4-FFF2-40B4-BE49-F238E27FC236}">
@@ -4356,7 +4386,7 @@
           <p:nvPr/>
         </p:nvPicPr>
         <p:blipFill>
-          <a:blip r:embed="rId3"/>
+          <a:blip r:embed="rId4"/>
           <a:stretch>
             <a:fillRect/>
           </a:stretch>
@@ -5401,8 +5431,8 @@
           </a:p>
         </p:txBody>
       </p:sp>
-      <mc:AlternateContent xmlns:mc="http://schemas.openxmlformats.org/markup-compatibility/2006">
-        <mc:Choice xmlns:a14="http://schemas.microsoft.com/office/drawing/2010/main" Requires="a14">
+      <mc:AlternateContent xmlns:mc="http://schemas.openxmlformats.org/markup-compatibility/2006" xmlns:a14="http://schemas.microsoft.com/office/drawing/2010/main">
+        <mc:Choice Requires="a14">
           <p:sp>
             <p:nvSpPr>
               <p:cNvPr id="79" name="Rectangle 78">
@@ -6851,7 +6881,7 @@
             </p:txBody>
           </p:sp>
         </mc:Choice>
-        <mc:Fallback>
+        <mc:Fallback xmlns="">
           <p:sp>
             <p:nvSpPr>
               <p:cNvPr id="79" name="Rectangle 78">
@@ -6875,7 +6905,7 @@
                 <a:avLst/>
               </a:prstGeom>
               <a:blipFill>
-                <a:blip r:embed="rId4"/>
+                <a:blip r:embed="rId5"/>
                 <a:stretch>
                   <a:fillRect l="-275" t="-1006" r="-183"/>
                 </a:stretch>
@@ -7650,8 +7680,8 @@
         </p:nvSpPr>
         <p:spPr bwMode="auto">
           <a:xfrm>
-            <a:off x="15263019" y="16964155"/>
-            <a:ext cx="12974524" cy="1188720"/>
+            <a:off x="15263018" y="16964155"/>
+            <a:ext cx="13267791" cy="1188720"/>
           </a:xfrm>
           <a:custGeom>
             <a:avLst/>
@@ -7946,7 +7976,7 @@
           <p:nvPr/>
         </p:nvPicPr>
         <p:blipFill>
-          <a:blip r:embed="rId5">
+          <a:blip r:embed="rId6">
             <a:extLst>
               <a:ext uri="{28A0092B-C50C-407E-A947-70E740481C1C}">
                 <a14:useLocalDpi xmlns:a14="http://schemas.microsoft.com/office/drawing/2010/main" val="0"/>
@@ -8060,7 +8090,7 @@
           <p:nvPr/>
         </p:nvPicPr>
         <p:blipFill>
-          <a:blip r:embed="rId6"/>
+          <a:blip r:embed="rId7"/>
           <a:stretch>
             <a:fillRect/>
           </a:stretch>
@@ -8089,8 +8119,8 @@
         </p:nvSpPr>
         <p:spPr>
           <a:xfrm>
-            <a:off x="29337000" y="26596768"/>
-            <a:ext cx="13299848" cy="5334000"/>
+            <a:off x="29337000" y="24768514"/>
+            <a:ext cx="13299848" cy="6606850"/>
           </a:xfrm>
           <a:prstGeom prst="roundRect">
             <a:avLst/>
@@ -8119,11 +8149,76 @@
           </a:fontRef>
         </p:style>
         <p:txBody>
-          <a:bodyPr rtlCol="0" anchor="ctr"/>
+          <a:bodyPr rtlCol="0" anchor="t"/>
           <a:lstStyle/>
           <a:p>
             <a:pPr algn="ctr"/>
-            <a:endParaRPr lang="en-US"/>
+            <a:r>
+              <a:rPr lang="en-US" sz="5400" cap="small" dirty="0"/>
+              <a:t>REFERENCES</a:t>
+            </a:r>
+          </a:p>
+          <a:p>
+            <a:r>
+              <a:rPr lang="en-US" sz="4000" dirty="0"/>
+              <a:t>[1] R. Kress, Boundary Integral Equations in Time-Harmonic Acoustic Scattering.</a:t>
+            </a:r>
+          </a:p>
+          <a:p>
+            <a:r>
+              <a:rPr lang="en-US" sz="4000" dirty="0"/>
+              <a:t>[2] C. Carvalho, S. Khatri, and A.D. Kim, Asymptotic analysis for close evaluation of layer potentials, submitted.</a:t>
+            </a:r>
+          </a:p>
+          <a:p>
+            <a:r>
+              <a:rPr lang="en-US" sz="4000" dirty="0"/>
+              <a:t>[3] Boundary Cloaking GitHub Repository, code available: </a:t>
+            </a:r>
+            <a:r>
+              <a:rPr lang="en-US" sz="4000" dirty="0">
+                <a:solidFill>
+                  <a:schemeClr val="accent6">
+                    <a:lumMod val="75000"/>
+                  </a:schemeClr>
+                </a:solidFill>
+                <a:hlinkClick r:id="rId8">
+                  <a:extLst>
+                    <a:ext uri="{A12FA001-AC4F-418D-AE19-62706E023703}">
+                      <ahyp:hlinkClr xmlns:ahyp="http://schemas.microsoft.com/office/drawing/2018/hyperlinkcolor" val="tx"/>
+                    </a:ext>
+                  </a:extLst>
+                </a:hlinkClick>
+              </a:rPr>
+              <a:t>https://github.com/eangelcortes/boundary_cloaking</a:t>
+            </a:r>
+            <a:r>
+              <a:rPr lang="en-US" sz="4000" dirty="0">
+                <a:solidFill>
+                  <a:schemeClr val="accent6">
+                    <a:lumMod val="75000"/>
+                  </a:schemeClr>
+                </a:solidFill>
+              </a:rPr>
+              <a:t>.</a:t>
+            </a:r>
+          </a:p>
+          <a:p>
+            <a:r>
+              <a:rPr lang="en-US" sz="4000" dirty="0">
+                <a:solidFill>
+                  <a:schemeClr val="bg1"/>
+                </a:solidFill>
+              </a:rPr>
+              <a:t>[4] V. Shalaev, Illustration of a theoretical cloaking device.</a:t>
+            </a:r>
+          </a:p>
+          <a:p>
+            <a:endParaRPr lang="en-US" sz="4000" dirty="0"/>
+          </a:p>
+          <a:p>
+            <a:pPr algn="ctr"/>
+            <a:endParaRPr lang="en-US" sz="6000" cap="small" dirty="0"/>
           </a:p>
         </p:txBody>
       </p:sp>
@@ -8142,7 +8237,7 @@
           <p:nvPr/>
         </p:nvPicPr>
         <p:blipFill rotWithShape="1">
-          <a:blip r:embed="rId7"/>
+          <a:blip r:embed="rId9"/>
           <a:srcRect l="18569" t="26561" r="27204" b="24646"/>
           <a:stretch/>
         </p:blipFill>
@@ -8171,7 +8266,7 @@
           <p:nvPr/>
         </p:nvPicPr>
         <p:blipFill rotWithShape="1">
-          <a:blip r:embed="rId8"/>
+          <a:blip r:embed="rId10"/>
           <a:srcRect l="23732" t="26412" r="28196" b="25068"/>
           <a:stretch/>
         </p:blipFill>
@@ -8264,8 +8359,8 @@
           </a:p>
         </p:txBody>
       </p:sp>
-      <mc:AlternateContent xmlns:mc="http://schemas.openxmlformats.org/markup-compatibility/2006">
-        <mc:Choice xmlns:a14="http://schemas.microsoft.com/office/drawing/2010/main" Requires="a14">
+      <mc:AlternateContent xmlns:mc="http://schemas.openxmlformats.org/markup-compatibility/2006" xmlns:a14="http://schemas.microsoft.com/office/drawing/2010/main">
+        <mc:Choice Requires="a14">
           <p:sp>
             <p:nvSpPr>
               <p:cNvPr id="17" name="TextBox 16">
@@ -8391,7 +8486,7 @@
             </p:txBody>
           </p:sp>
         </mc:Choice>
-        <mc:Fallback>
+        <mc:Fallback xmlns="">
           <p:sp>
             <p:nvSpPr>
               <p:cNvPr id="17" name="TextBox 16">
@@ -8415,7 +8510,7 @@
                 <a:avLst/>
               </a:prstGeom>
               <a:blipFill>
-                <a:blip r:embed="rId9"/>
+                <a:blip r:embed="rId11"/>
                 <a:stretch>
                   <a:fillRect/>
                 </a:stretch>
@@ -8436,8 +8531,8 @@
           </p:sp>
         </mc:Fallback>
       </mc:AlternateContent>
-      <mc:AlternateContent xmlns:mc="http://schemas.openxmlformats.org/markup-compatibility/2006">
-        <mc:Choice xmlns:a14="http://schemas.microsoft.com/office/drawing/2010/main" Requires="a14">
+      <mc:AlternateContent xmlns:mc="http://schemas.openxmlformats.org/markup-compatibility/2006" xmlns:a14="http://schemas.microsoft.com/office/drawing/2010/main">
+        <mc:Choice Requires="a14">
           <p:sp>
             <p:nvSpPr>
               <p:cNvPr id="39" name="TextBox 38">
@@ -8563,7 +8658,7 @@
             </p:txBody>
           </p:sp>
         </mc:Choice>
-        <mc:Fallback>
+        <mc:Fallback xmlns="">
           <p:sp>
             <p:nvSpPr>
               <p:cNvPr id="39" name="TextBox 38">
@@ -8587,7 +8682,7 @@
                 <a:avLst/>
               </a:prstGeom>
               <a:blipFill>
-                <a:blip r:embed="rId10"/>
+                <a:blip r:embed="rId12"/>
                 <a:stretch>
                   <a:fillRect/>
                 </a:stretch>
@@ -8691,8 +8786,8 @@
           </a:p>
         </p:txBody>
       </p:sp>
-      <mc:AlternateContent xmlns:mc="http://schemas.openxmlformats.org/markup-compatibility/2006">
-        <mc:Choice xmlns:a14="http://schemas.microsoft.com/office/drawing/2010/main" Requires="a14">
+      <mc:AlternateContent xmlns:mc="http://schemas.openxmlformats.org/markup-compatibility/2006" xmlns:a14="http://schemas.microsoft.com/office/drawing/2010/main">
+        <mc:Choice Requires="a14">
           <p:sp>
             <p:nvSpPr>
               <p:cNvPr id="21" name="TextBox 20">
@@ -8786,7 +8881,7 @@
             </p:txBody>
           </p:sp>
         </mc:Choice>
-        <mc:Fallback>
+        <mc:Fallback xmlns="">
           <p:sp>
             <p:nvSpPr>
               <p:cNvPr id="21" name="TextBox 20">
@@ -8810,7 +8905,7 @@
                 <a:avLst/>
               </a:prstGeom>
               <a:blipFill>
-                <a:blip r:embed="rId11"/>
+                <a:blip r:embed="rId13"/>
                 <a:stretch>
                   <a:fillRect l="-7808" t="-13684" b="-34737"/>
                 </a:stretch>
@@ -8831,8 +8926,8 @@
           </p:sp>
         </mc:Fallback>
       </mc:AlternateContent>
-      <mc:AlternateContent xmlns:mc="http://schemas.openxmlformats.org/markup-compatibility/2006">
-        <mc:Choice xmlns:a14="http://schemas.microsoft.com/office/drawing/2010/main" Requires="a14">
+      <mc:AlternateContent xmlns:mc="http://schemas.openxmlformats.org/markup-compatibility/2006" xmlns:a14="http://schemas.microsoft.com/office/drawing/2010/main">
+        <mc:Choice Requires="a14">
           <p:sp>
             <p:nvSpPr>
               <p:cNvPr id="45" name="TextBox 44">
@@ -8926,7 +9021,7 @@
             </p:txBody>
           </p:sp>
         </mc:Choice>
-        <mc:Fallback>
+        <mc:Fallback xmlns="">
           <p:sp>
             <p:nvSpPr>
               <p:cNvPr id="45" name="TextBox 44">
@@ -8950,7 +9045,7 @@
                 <a:avLst/>
               </a:prstGeom>
               <a:blipFill>
-                <a:blip r:embed="rId12"/>
+                <a:blip r:embed="rId14"/>
                 <a:stretch>
                   <a:fillRect l="-7602" t="-13542" b="-33333"/>
                 </a:stretch>
@@ -8971,8 +9066,8 @@
           </p:sp>
         </mc:Fallback>
       </mc:AlternateContent>
-      <mc:AlternateContent xmlns:mc="http://schemas.openxmlformats.org/markup-compatibility/2006">
-        <mc:Choice xmlns:a14="http://schemas.microsoft.com/office/drawing/2010/main" Requires="a14">
+      <mc:AlternateContent xmlns:mc="http://schemas.openxmlformats.org/markup-compatibility/2006" xmlns:a14="http://schemas.microsoft.com/office/drawing/2010/main">
+        <mc:Choice Requires="a14">
           <p:sp>
             <p:nvSpPr>
               <p:cNvPr id="22" name="TextBox 21">
@@ -9037,7 +9132,7 @@
             </p:txBody>
           </p:sp>
         </mc:Choice>
-        <mc:Fallback>
+        <mc:Fallback xmlns="">
           <p:sp>
             <p:nvSpPr>
               <p:cNvPr id="22" name="TextBox 21">
@@ -9061,7 +9156,7 @@
                 <a:avLst/>
               </a:prstGeom>
               <a:blipFill>
-                <a:blip r:embed="rId13"/>
+                <a:blip r:embed="rId15"/>
                 <a:stretch>
                   <a:fillRect l="-11927" t="-13542" b="-33333"/>
                 </a:stretch>
@@ -9082,8 +9177,8 @@
           </p:sp>
         </mc:Fallback>
       </mc:AlternateContent>
-      <mc:AlternateContent xmlns:mc="http://schemas.openxmlformats.org/markup-compatibility/2006">
-        <mc:Choice xmlns:a14="http://schemas.microsoft.com/office/drawing/2010/main" Requires="a14">
+      <mc:AlternateContent xmlns:mc="http://schemas.openxmlformats.org/markup-compatibility/2006" xmlns:a14="http://schemas.microsoft.com/office/drawing/2010/main">
+        <mc:Choice Requires="a14">
           <p:sp>
             <p:nvSpPr>
               <p:cNvPr id="46" name="TextBox 45">
@@ -9144,7 +9239,7 @@
             </p:txBody>
           </p:sp>
         </mc:Choice>
-        <mc:Fallback>
+        <mc:Fallback xmlns="">
           <p:sp>
             <p:nvSpPr>
               <p:cNvPr id="46" name="TextBox 45">
@@ -9168,7 +9263,7 @@
                 <a:avLst/>
               </a:prstGeom>
               <a:blipFill>
-                <a:blip r:embed="rId14"/>
+                <a:blip r:embed="rId16"/>
                 <a:stretch>
                   <a:fillRect/>
                 </a:stretch>
@@ -9189,43 +9284,6 @@
           </p:sp>
         </mc:Fallback>
       </mc:AlternateContent>
-      <p:pic>
-        <p:nvPicPr>
-          <p:cNvPr id="23" name="Picture 22">
-            <a:extLst>
-              <a:ext uri="{FF2B5EF4-FFF2-40B4-BE49-F238E27FC236}">
-                <a16:creationId xmlns:a16="http://schemas.microsoft.com/office/drawing/2014/main" id="{C51B0D89-E9B9-4A92-B581-6033ABCCFECE}"/>
-              </a:ext>
-            </a:extLst>
-          </p:cNvPr>
-          <p:cNvPicPr>
-            <a:picLocks noChangeAspect="1"/>
-          </p:cNvPicPr>
-          <p:nvPr/>
-        </p:nvPicPr>
-        <p:blipFill>
-          <a:blip r:embed="rId15"/>
-          <a:stretch>
-            <a:fillRect/>
-          </a:stretch>
-        </p:blipFill>
-        <p:spPr>
-          <a:xfrm>
-            <a:off x="15706046" y="11572859"/>
-            <a:ext cx="6491230" cy="5038741"/>
-          </a:xfrm>
-          <a:prstGeom prst="rect">
-            <a:avLst/>
-          </a:prstGeom>
-          <a:ln w="57150">
-            <a:solidFill>
-              <a:schemeClr val="accent3">
-                <a:lumMod val="75000"/>
-              </a:schemeClr>
-            </a:solidFill>
-          </a:ln>
-        </p:spPr>
-      </p:pic>
       <mc:AlternateContent xmlns:mc="http://schemas.openxmlformats.org/markup-compatibility/2006">
         <mc:Choice xmlns:a14="http://schemas.microsoft.com/office/drawing/2010/main" Requires="a14">
           <p:sp>
@@ -9243,7 +9301,7 @@
             <p:spPr>
               <a:xfrm>
                 <a:off x="15575061" y="5347533"/>
-                <a:ext cx="12974524" cy="6002797"/>
+                <a:ext cx="12974524" cy="5363969"/>
               </a:xfrm>
               <a:prstGeom prst="rect">
                 <a:avLst/>
@@ -9357,6 +9415,12 @@
                   </a:rPr>
                   <a:t>t our solution.</a:t>
                 </a:r>
+                <a:r>
+                  <a:rPr lang="en-US" sz="3800" baseline="30000" dirty="0">
+                    <a:cs typeface="Times New Roman" panose="02020603050405020304" pitchFamily="18" charset="0"/>
+                  </a:rPr>
+                  <a:t>[2]</a:t>
+                </a:r>
                 <a:endParaRPr lang="en-US" sz="3800" b="0" dirty="0">
                   <a:cs typeface="Times New Roman" panose="02020603050405020304" pitchFamily="18" charset="0"/>
                 </a:endParaRPr>
@@ -9373,224 +9437,313 @@
               <a:p>
                 <a:pPr algn="ctr"/>
                 <a14:m>
-                  <m:oMathPara xmlns:m="http://schemas.openxmlformats.org/officeDocument/2006/math">
-                    <m:oMathParaPr>
-                      <m:jc m:val="centerGroup"/>
-                    </m:oMathParaPr>
-                    <m:oMath xmlns:m="http://schemas.openxmlformats.org/officeDocument/2006/math">
-                      <m:nary>
-                        <m:naryPr>
-                          <m:ctrlPr>
-                            <a:rPr lang="en-US" sz="3800" i="1" smtClean="0">
-                              <a:latin typeface="Cambria Math" panose="02040503050406030204" pitchFamily="18" charset="0"/>
-                              <a:cs typeface="Times New Roman" panose="02020603050405020304" pitchFamily="18" charset="0"/>
-                            </a:rPr>
-                          </m:ctrlPr>
-                        </m:naryPr>
-                        <m:sub>
-                          <m:r>
-                            <m:rPr>
-                              <m:brk m:alnAt="23"/>
-                            </m:rPr>
-                            <a:rPr lang="en-US" sz="3800" b="0" i="1" smtClean="0">
-                              <a:latin typeface="Cambria Math" panose="02040503050406030204" pitchFamily="18" charset="0"/>
-                              <a:cs typeface="Times New Roman" panose="02020603050405020304" pitchFamily="18" charset="0"/>
-                            </a:rPr>
-                            <m:t>0</m:t>
-                          </m:r>
-                        </m:sub>
-                        <m:sup>
-                          <m:r>
-                            <a:rPr lang="en-US" sz="3800" b="0" i="1" smtClean="0">
-                              <a:latin typeface="Cambria Math" panose="02040503050406030204" pitchFamily="18" charset="0"/>
-                              <a:cs typeface="Times New Roman" panose="02020603050405020304" pitchFamily="18" charset="0"/>
-                            </a:rPr>
-                            <m:t>2</m:t>
-                          </m:r>
-                          <m:r>
-                            <a:rPr lang="en-US" sz="3800" b="0" i="1" smtClean="0">
-                              <a:latin typeface="Cambria Math" panose="02040503050406030204" pitchFamily="18" charset="0"/>
-                              <a:cs typeface="Times New Roman" panose="02020603050405020304" pitchFamily="18" charset="0"/>
-                            </a:rPr>
-                            <m:t>𝜋</m:t>
-                          </m:r>
-                        </m:sup>
-                        <m:e>
-                          <m:r>
-                            <a:rPr lang="en-US" sz="3800" b="0" i="1" smtClean="0">
-                              <a:latin typeface="Cambria Math" panose="02040503050406030204" pitchFamily="18" charset="0"/>
-                              <a:cs typeface="Times New Roman" panose="02020603050405020304" pitchFamily="18" charset="0"/>
-                            </a:rPr>
-                            <m:t>𝑓</m:t>
-                          </m:r>
-                          <m:d>
-                            <m:dPr>
-                              <m:ctrlPr>
-                                <a:rPr lang="en-US" sz="3800" b="0" i="1" smtClean="0">
-                                  <a:latin typeface="Cambria Math" panose="02040503050406030204" pitchFamily="18" charset="0"/>
-                                  <a:cs typeface="Times New Roman" panose="02020603050405020304" pitchFamily="18" charset="0"/>
-                                </a:rPr>
-                              </m:ctrlPr>
-                            </m:dPr>
-                            <m:e>
-                              <m:r>
-                                <a:rPr lang="en-US" sz="3800" b="0" i="1" smtClean="0">
-                                  <a:latin typeface="Cambria Math" panose="02040503050406030204" pitchFamily="18" charset="0"/>
-                                  <a:cs typeface="Times New Roman" panose="02020603050405020304" pitchFamily="18" charset="0"/>
-                                </a:rPr>
-                                <m:t>𝑡</m:t>
-                              </m:r>
-                            </m:e>
-                          </m:d>
-                          <m:r>
-                            <a:rPr lang="en-US" sz="3800" b="0" i="1" smtClean="0">
-                              <a:latin typeface="Cambria Math" panose="02040503050406030204" pitchFamily="18" charset="0"/>
-                              <a:cs typeface="Times New Roman" panose="02020603050405020304" pitchFamily="18" charset="0"/>
-                            </a:rPr>
-                            <m:t>𝑑𝑡</m:t>
-                          </m:r>
-                          <m:r>
-                            <a:rPr lang="en-US" sz="3800" b="0" i="1" smtClean="0">
-                              <a:latin typeface="Cambria Math" panose="02040503050406030204" pitchFamily="18" charset="0"/>
-                              <a:cs typeface="Times New Roman" panose="02020603050405020304" pitchFamily="18" charset="0"/>
-                            </a:rPr>
-                            <m:t>=</m:t>
-                          </m:r>
-                          <m:r>
-                            <a:rPr lang="en-US" sz="3800" b="0" i="1" smtClean="0">
-                              <a:latin typeface="Cambria Math" panose="02040503050406030204" pitchFamily="18" charset="0"/>
-                              <a:cs typeface="Times New Roman" panose="02020603050405020304" pitchFamily="18" charset="0"/>
-                            </a:rPr>
-                            <m:t> </m:t>
-                          </m:r>
-                          <m:nary>
-                            <m:naryPr>
-                              <m:chr m:val="∑"/>
-                              <m:ctrlPr>
-                                <a:rPr lang="en-US" sz="3800" b="0" i="1" smtClean="0">
-                                  <a:latin typeface="Cambria Math" panose="02040503050406030204" pitchFamily="18" charset="0"/>
-                                  <a:cs typeface="Times New Roman" panose="02020603050405020304" pitchFamily="18" charset="0"/>
-                                </a:rPr>
-                              </m:ctrlPr>
-                            </m:naryPr>
-                            <m:sub>
-                              <m:r>
-                                <m:rPr>
-                                  <m:brk m:alnAt="23"/>
-                                </m:rPr>
-                                <a:rPr lang="en-US" sz="3800" b="0" i="1" smtClean="0">
-                                  <a:latin typeface="Cambria Math" panose="02040503050406030204" pitchFamily="18" charset="0"/>
-                                  <a:cs typeface="Times New Roman" panose="02020603050405020304" pitchFamily="18" charset="0"/>
-                                </a:rPr>
-                                <m:t>𝑖</m:t>
-                              </m:r>
-                              <m:r>
-                                <a:rPr lang="en-US" sz="3800" b="0" i="1" smtClean="0">
-                                  <a:latin typeface="Cambria Math" panose="02040503050406030204" pitchFamily="18" charset="0"/>
-                                  <a:cs typeface="Times New Roman" panose="02020603050405020304" pitchFamily="18" charset="0"/>
-                                </a:rPr>
-                                <m:t>=1</m:t>
-                              </m:r>
-                            </m:sub>
-                            <m:sup>
-                              <m:r>
-                                <a:rPr lang="en-US" sz="3800" b="0" i="1" smtClean="0">
-                                  <a:latin typeface="Cambria Math" panose="02040503050406030204" pitchFamily="18" charset="0"/>
-                                  <a:cs typeface="Times New Roman" panose="02020603050405020304" pitchFamily="18" charset="0"/>
-                                </a:rPr>
-                                <m:t>𝑁</m:t>
-                              </m:r>
-                            </m:sup>
-                            <m:e>
-                              <m:f>
-                                <m:fPr>
-                                  <m:ctrlPr>
-                                    <a:rPr lang="en-US" sz="3800" b="0" i="1" smtClean="0">
-                                      <a:latin typeface="Cambria Math" panose="02040503050406030204" pitchFamily="18" charset="0"/>
-                                      <a:ea typeface="Cambria Math" panose="02040503050406030204" pitchFamily="18" charset="0"/>
-                                      <a:cs typeface="Times New Roman" panose="02020603050405020304" pitchFamily="18" charset="0"/>
-                                    </a:rPr>
-                                  </m:ctrlPr>
-                                </m:fPr>
-                                <m:num>
-                                  <m:r>
-                                    <a:rPr lang="en-US" sz="3800" b="0" i="1" smtClean="0">
-                                      <a:latin typeface="Cambria Math" panose="02040503050406030204" pitchFamily="18" charset="0"/>
-                                      <a:cs typeface="Times New Roman" panose="02020603050405020304" pitchFamily="18" charset="0"/>
-                                    </a:rPr>
-                                    <m:t>𝑓</m:t>
-                                  </m:r>
-                                  <m:d>
-                                    <m:dPr>
-                                      <m:ctrlPr>
-                                        <a:rPr lang="en-US" sz="3800" b="0" i="1" smtClean="0">
-                                          <a:latin typeface="Cambria Math" panose="02040503050406030204" pitchFamily="18" charset="0"/>
-                                          <a:cs typeface="Times New Roman" panose="02020603050405020304" pitchFamily="18" charset="0"/>
-                                        </a:rPr>
-                                      </m:ctrlPr>
-                                    </m:dPr>
-                                    <m:e>
-                                      <m:r>
-                                        <a:rPr lang="en-US" sz="3800" b="0" i="1" smtClean="0">
-                                          <a:latin typeface="Cambria Math" panose="02040503050406030204" pitchFamily="18" charset="0"/>
-                                          <a:ea typeface="Cambria Math" panose="02040503050406030204" pitchFamily="18" charset="0"/>
-                                          <a:cs typeface="Times New Roman" panose="02020603050405020304" pitchFamily="18" charset="0"/>
-                                        </a:rPr>
-                                        <m:t>∆</m:t>
-                                      </m:r>
-                                      <m:sSub>
-                                        <m:sSubPr>
-                                          <m:ctrlPr>
-                                            <a:rPr lang="en-US" sz="3800" b="0" i="1" smtClean="0">
-                                              <a:latin typeface="Cambria Math" panose="02040503050406030204" pitchFamily="18" charset="0"/>
-                                              <a:ea typeface="Cambria Math" panose="02040503050406030204" pitchFamily="18" charset="0"/>
-                                              <a:cs typeface="Times New Roman" panose="02020603050405020304" pitchFamily="18" charset="0"/>
-                                            </a:rPr>
-                                          </m:ctrlPr>
-                                        </m:sSubPr>
-                                        <m:e>
-                                          <m:r>
-                                            <a:rPr lang="en-US" sz="3800" b="0" i="1" smtClean="0">
-                                              <a:latin typeface="Cambria Math" panose="02040503050406030204" pitchFamily="18" charset="0"/>
-                                              <a:ea typeface="Cambria Math" panose="02040503050406030204" pitchFamily="18" charset="0"/>
-                                              <a:cs typeface="Times New Roman" panose="02020603050405020304" pitchFamily="18" charset="0"/>
-                                            </a:rPr>
-                                            <m:t>𝑡</m:t>
-                                          </m:r>
-                                        </m:e>
-                                        <m:sub>
-                                          <m:r>
-                                            <a:rPr lang="en-US" sz="3800" b="0" i="1" smtClean="0">
-                                              <a:latin typeface="Cambria Math" panose="02040503050406030204" pitchFamily="18" charset="0"/>
-                                              <a:ea typeface="Cambria Math" panose="02040503050406030204" pitchFamily="18" charset="0"/>
-                                              <a:cs typeface="Times New Roman" panose="02020603050405020304" pitchFamily="18" charset="0"/>
-                                            </a:rPr>
-                                            <m:t>𝑖</m:t>
-                                          </m:r>
-                                        </m:sub>
-                                      </m:sSub>
-                                    </m:e>
-                                  </m:d>
-                                </m:num>
-                                <m:den>
-                                  <m:r>
-                                    <a:rPr lang="en-US" sz="3800" b="0" i="1" smtClean="0">
-                                      <a:latin typeface="Cambria Math" panose="02040503050406030204" pitchFamily="18" charset="0"/>
-                                      <a:ea typeface="Cambria Math" panose="02040503050406030204" pitchFamily="18" charset="0"/>
-                                      <a:cs typeface="Times New Roman" panose="02020603050405020304" pitchFamily="18" charset="0"/>
-                                    </a:rPr>
-                                    <m:t>𝑁</m:t>
-                                  </m:r>
-                                </m:den>
-                              </m:f>
-                            </m:e>
-                          </m:nary>
-                        </m:e>
-                      </m:nary>
-                    </m:oMath>
-                  </m:oMathPara>
+                  <m:oMath xmlns:m="http://schemas.openxmlformats.org/officeDocument/2006/math">
+                    <m:nary>
+                      <m:naryPr>
+                        <m:ctrlPr>
+                          <a:rPr lang="en-US" sz="4400" i="1" smtClean="0">
+                            <a:latin typeface="Cambria Math" panose="02040503050406030204" pitchFamily="18" charset="0"/>
+                            <a:cs typeface="Times New Roman" panose="02020603050405020304" pitchFamily="18" charset="0"/>
+                          </a:rPr>
+                        </m:ctrlPr>
+                      </m:naryPr>
+                      <m:sub>
+                        <m:r>
+                          <m:rPr>
+                            <m:brk m:alnAt="23"/>
+                          </m:rPr>
+                          <a:rPr lang="en-US" sz="4400" b="0" i="1" smtClean="0">
+                            <a:latin typeface="Cambria Math" panose="02040503050406030204" pitchFamily="18" charset="0"/>
+                            <a:cs typeface="Times New Roman" panose="02020603050405020304" pitchFamily="18" charset="0"/>
+                          </a:rPr>
+                          <m:t>0</m:t>
+                        </m:r>
+                      </m:sub>
+                      <m:sup>
+                        <m:r>
+                          <a:rPr lang="en-US" sz="4400" b="0" i="1" smtClean="0">
+                            <a:latin typeface="Cambria Math" panose="02040503050406030204" pitchFamily="18" charset="0"/>
+                            <a:cs typeface="Times New Roman" panose="02020603050405020304" pitchFamily="18" charset="0"/>
+                          </a:rPr>
+                          <m:t>2</m:t>
+                        </m:r>
+                        <m:r>
+                          <a:rPr lang="en-US" sz="4400" b="0" i="1" smtClean="0">
+                            <a:latin typeface="Cambria Math" panose="02040503050406030204" pitchFamily="18" charset="0"/>
+                            <a:cs typeface="Times New Roman" panose="02020603050405020304" pitchFamily="18" charset="0"/>
+                          </a:rPr>
+                          <m:t>𝜋</m:t>
+                        </m:r>
+                      </m:sup>
+                      <m:e>
+                        <m:r>
+                          <a:rPr lang="en-US" sz="4400" b="0" i="1" smtClean="0">
+                            <a:latin typeface="Cambria Math" panose="02040503050406030204" pitchFamily="18" charset="0"/>
+                            <a:cs typeface="Times New Roman" panose="02020603050405020304" pitchFamily="18" charset="0"/>
+                          </a:rPr>
+                          <m:t>𝑓</m:t>
+                        </m:r>
+                        <m:d>
+                          <m:dPr>
+                            <m:ctrlPr>
+                              <a:rPr lang="en-US" sz="4400" b="0" i="1" smtClean="0">
+                                <a:latin typeface="Cambria Math" panose="02040503050406030204" pitchFamily="18" charset="0"/>
+                                <a:cs typeface="Times New Roman" panose="02020603050405020304" pitchFamily="18" charset="0"/>
+                              </a:rPr>
+                            </m:ctrlPr>
+                          </m:dPr>
+                          <m:e>
+                            <m:r>
+                              <a:rPr lang="en-US" sz="4400" b="0" i="1" smtClean="0">
+                                <a:latin typeface="Cambria Math" panose="02040503050406030204" pitchFamily="18" charset="0"/>
+                                <a:cs typeface="Times New Roman" panose="02020603050405020304" pitchFamily="18" charset="0"/>
+                              </a:rPr>
+                              <m:t>𝑡</m:t>
+                            </m:r>
+                          </m:e>
+                        </m:d>
+                        <m:r>
+                          <a:rPr lang="en-US" sz="4400" b="0" i="1" smtClean="0">
+                            <a:latin typeface="Cambria Math" panose="02040503050406030204" pitchFamily="18" charset="0"/>
+                            <a:cs typeface="Times New Roman" panose="02020603050405020304" pitchFamily="18" charset="0"/>
+                          </a:rPr>
+                          <m:t>𝑑𝑡</m:t>
+                        </m:r>
+                        <m:r>
+                          <a:rPr lang="en-US" sz="4400" b="0" i="1" smtClean="0">
+                            <a:latin typeface="Cambria Math" panose="02040503050406030204" pitchFamily="18" charset="0"/>
+                            <a:cs typeface="Times New Roman" panose="02020603050405020304" pitchFamily="18" charset="0"/>
+                          </a:rPr>
+                          <m:t>=</m:t>
+                        </m:r>
+                        <m:f>
+                          <m:fPr>
+                            <m:ctrlPr>
+                              <a:rPr lang="en-US" sz="4400" b="0" i="1" smtClean="0">
+                                <a:latin typeface="Cambria Math" panose="02040503050406030204" pitchFamily="18" charset="0"/>
+                                <a:cs typeface="Times New Roman" panose="02020603050405020304" pitchFamily="18" charset="0"/>
+                              </a:rPr>
+                            </m:ctrlPr>
+                          </m:fPr>
+                          <m:num>
+                            <m:r>
+                              <a:rPr lang="en-US" sz="4400" b="0" i="1" smtClean="0">
+                                <a:latin typeface="Cambria Math" panose="02040503050406030204" pitchFamily="18" charset="0"/>
+                                <a:cs typeface="Times New Roman" panose="02020603050405020304" pitchFamily="18" charset="0"/>
+                              </a:rPr>
+                              <m:t>2</m:t>
+                            </m:r>
+                            <m:r>
+                              <a:rPr lang="en-US" sz="4400" b="0" i="1" smtClean="0">
+                                <a:latin typeface="Cambria Math" panose="02040503050406030204" pitchFamily="18" charset="0"/>
+                                <a:ea typeface="Cambria Math" panose="02040503050406030204" pitchFamily="18" charset="0"/>
+                                <a:cs typeface="Times New Roman" panose="02020603050405020304" pitchFamily="18" charset="0"/>
+                              </a:rPr>
+                              <m:t>𝜋</m:t>
+                            </m:r>
+                          </m:num>
+                          <m:den>
+                            <m:r>
+                              <a:rPr lang="en-US" sz="4400" b="0" i="1" smtClean="0">
+                                <a:latin typeface="Cambria Math" panose="02040503050406030204" pitchFamily="18" charset="0"/>
+                                <a:cs typeface="Times New Roman" panose="02020603050405020304" pitchFamily="18" charset="0"/>
+                              </a:rPr>
+                              <m:t>𝑁</m:t>
+                            </m:r>
+                          </m:den>
+                        </m:f>
+                        <m:nary>
+                          <m:naryPr>
+                            <m:chr m:val="∑"/>
+                            <m:ctrlPr>
+                              <a:rPr lang="en-US" sz="4400" b="0" i="1" smtClean="0">
+                                <a:latin typeface="Cambria Math" panose="02040503050406030204" pitchFamily="18" charset="0"/>
+                                <a:cs typeface="Times New Roman" panose="02020603050405020304" pitchFamily="18" charset="0"/>
+                              </a:rPr>
+                            </m:ctrlPr>
+                          </m:naryPr>
+                          <m:sub>
+                            <m:r>
+                              <m:rPr>
+                                <m:brk m:alnAt="23"/>
+                              </m:rPr>
+                              <a:rPr lang="en-US" sz="4400" b="0" i="1" smtClean="0">
+                                <a:latin typeface="Cambria Math" panose="02040503050406030204" pitchFamily="18" charset="0"/>
+                                <a:cs typeface="Times New Roman" panose="02020603050405020304" pitchFamily="18" charset="0"/>
+                              </a:rPr>
+                              <m:t>𝑖</m:t>
+                            </m:r>
+                            <m:r>
+                              <a:rPr lang="en-US" sz="4400" b="0" i="1" smtClean="0">
+                                <a:latin typeface="Cambria Math" panose="02040503050406030204" pitchFamily="18" charset="0"/>
+                                <a:cs typeface="Times New Roman" panose="02020603050405020304" pitchFamily="18" charset="0"/>
+                              </a:rPr>
+                              <m:t>=1</m:t>
+                            </m:r>
+                          </m:sub>
+                          <m:sup>
+                            <m:r>
+                              <a:rPr lang="en-US" sz="4400" b="0" i="1" smtClean="0">
+                                <a:latin typeface="Cambria Math" panose="02040503050406030204" pitchFamily="18" charset="0"/>
+                                <a:cs typeface="Times New Roman" panose="02020603050405020304" pitchFamily="18" charset="0"/>
+                              </a:rPr>
+                              <m:t>𝑁</m:t>
+                            </m:r>
+                          </m:sup>
+                          <m:e>
+                            <m:r>
+                              <a:rPr lang="en-US" sz="4400" b="0" i="1" smtClean="0">
+                                <a:latin typeface="Cambria Math" panose="02040503050406030204" pitchFamily="18" charset="0"/>
+                                <a:cs typeface="Times New Roman" panose="02020603050405020304" pitchFamily="18" charset="0"/>
+                              </a:rPr>
+                              <m:t>𝑓</m:t>
+                            </m:r>
+                            <m:d>
+                              <m:dPr>
+                                <m:ctrlPr>
+                                  <a:rPr lang="en-US" sz="4400" b="0" i="1" smtClean="0">
+                                    <a:latin typeface="Cambria Math" panose="02040503050406030204" pitchFamily="18" charset="0"/>
+                                    <a:cs typeface="Times New Roman" panose="02020603050405020304" pitchFamily="18" charset="0"/>
+                                  </a:rPr>
+                                </m:ctrlPr>
+                              </m:dPr>
+                              <m:e>
+                                <m:sSub>
+                                  <m:sSubPr>
+                                    <m:ctrlPr>
+                                      <a:rPr lang="en-US" sz="4400" b="0" i="1" smtClean="0">
+                                        <a:latin typeface="Cambria Math" panose="02040503050406030204" pitchFamily="18" charset="0"/>
+                                        <a:cs typeface="Times New Roman" panose="02020603050405020304" pitchFamily="18" charset="0"/>
+                                      </a:rPr>
+                                    </m:ctrlPr>
+                                  </m:sSubPr>
+                                  <m:e>
+                                    <m:r>
+                                      <a:rPr lang="en-US" sz="4400" b="0" i="1" smtClean="0">
+                                        <a:latin typeface="Cambria Math" panose="02040503050406030204" pitchFamily="18" charset="0"/>
+                                        <a:cs typeface="Times New Roman" panose="02020603050405020304" pitchFamily="18" charset="0"/>
+                                      </a:rPr>
+                                      <m:t>𝑡</m:t>
+                                    </m:r>
+                                  </m:e>
+                                  <m:sub>
+                                    <m:r>
+                                      <a:rPr lang="en-US" sz="4400" b="0" i="1" smtClean="0">
+                                        <a:latin typeface="Cambria Math" panose="02040503050406030204" pitchFamily="18" charset="0"/>
+                                        <a:cs typeface="Times New Roman" panose="02020603050405020304" pitchFamily="18" charset="0"/>
+                                      </a:rPr>
+                                      <m:t>𝑖</m:t>
+                                    </m:r>
+                                  </m:sub>
+                                </m:sSub>
+                              </m:e>
+                            </m:d>
+                          </m:e>
+                        </m:nary>
+                      </m:e>
+                    </m:nary>
+                  </m:oMath>
                 </a14:m>
-                <a:endParaRPr lang="en-US" sz="3800" b="0" dirty="0">
+                <a:r>
+                  <a:rPr lang="en-US" sz="4400" b="0" dirty="0">
+                    <a:cs typeface="Times New Roman" panose="02020603050405020304" pitchFamily="18" charset="0"/>
+                  </a:rPr>
+                  <a:t> for </a:t>
+                </a:r>
+                <a14:m>
+                  <m:oMath xmlns:m="http://schemas.openxmlformats.org/officeDocument/2006/math">
+                    <m:sSub>
+                      <m:sSubPr>
+                        <m:ctrlPr>
+                          <a:rPr lang="en-US" sz="4400" b="0" i="1" smtClean="0">
+                            <a:latin typeface="Cambria Math" panose="02040503050406030204" pitchFamily="18" charset="0"/>
+                            <a:ea typeface="Cambria Math" panose="02040503050406030204" pitchFamily="18" charset="0"/>
+                            <a:cs typeface="Times New Roman" panose="02020603050405020304" pitchFamily="18" charset="0"/>
+                          </a:rPr>
+                        </m:ctrlPr>
+                      </m:sSubPr>
+                      <m:e>
+                        <m:r>
+                          <m:rPr>
+                            <m:sty m:val="p"/>
+                          </m:rPr>
+                          <a:rPr lang="en-US" sz="4400" i="1">
+                            <a:latin typeface="Cambria Math" panose="02040503050406030204" pitchFamily="18" charset="0"/>
+                            <a:ea typeface="Cambria Math" panose="02040503050406030204" pitchFamily="18" charset="0"/>
+                            <a:cs typeface="Times New Roman" panose="02020603050405020304" pitchFamily="18" charset="0"/>
+                          </a:rPr>
+                          <m:t>t</m:t>
+                        </m:r>
+                      </m:e>
+                      <m:sub>
+                        <m:r>
+                          <a:rPr lang="en-US" sz="4400" b="0" i="1" smtClean="0">
+                            <a:latin typeface="Cambria Math" panose="02040503050406030204" pitchFamily="18" charset="0"/>
+                            <a:ea typeface="Cambria Math" panose="02040503050406030204" pitchFamily="18" charset="0"/>
+                            <a:cs typeface="Times New Roman" panose="02020603050405020304" pitchFamily="18" charset="0"/>
+                          </a:rPr>
+                          <m:t>𝑖</m:t>
+                        </m:r>
+                      </m:sub>
+                    </m:sSub>
+                    <m:r>
+                      <a:rPr lang="en-US" sz="4400" b="0" i="1" smtClean="0">
+                        <a:latin typeface="Cambria Math" panose="02040503050406030204" pitchFamily="18" charset="0"/>
+                        <a:ea typeface="Cambria Math" panose="02040503050406030204" pitchFamily="18" charset="0"/>
+                        <a:cs typeface="Times New Roman" panose="02020603050405020304" pitchFamily="18" charset="0"/>
+                      </a:rPr>
+                      <m:t>=</m:t>
+                    </m:r>
+                    <m:f>
+                      <m:fPr>
+                        <m:ctrlPr>
+                          <a:rPr lang="en-US" sz="4400" b="0" i="1" smtClean="0">
+                            <a:latin typeface="Cambria Math" panose="02040503050406030204" pitchFamily="18" charset="0"/>
+                            <a:ea typeface="Cambria Math" panose="02040503050406030204" pitchFamily="18" charset="0"/>
+                            <a:cs typeface="Times New Roman" panose="02020603050405020304" pitchFamily="18" charset="0"/>
+                          </a:rPr>
+                        </m:ctrlPr>
+                      </m:fPr>
+                      <m:num>
+                        <m:r>
+                          <a:rPr lang="en-US" sz="4400" b="0" i="1" smtClean="0">
+                            <a:latin typeface="Cambria Math" panose="02040503050406030204" pitchFamily="18" charset="0"/>
+                            <a:ea typeface="Cambria Math" panose="02040503050406030204" pitchFamily="18" charset="0"/>
+                            <a:cs typeface="Times New Roman" panose="02020603050405020304" pitchFamily="18" charset="0"/>
+                          </a:rPr>
+                          <m:t>2</m:t>
+                        </m:r>
+                        <m:r>
+                          <a:rPr lang="en-US" sz="4400" b="0" i="1" smtClean="0">
+                            <a:latin typeface="Cambria Math" panose="02040503050406030204" pitchFamily="18" charset="0"/>
+                            <a:ea typeface="Cambria Math" panose="02040503050406030204" pitchFamily="18" charset="0"/>
+                            <a:cs typeface="Times New Roman" panose="02020603050405020304" pitchFamily="18" charset="0"/>
+                          </a:rPr>
+                          <m:t>𝜋</m:t>
+                        </m:r>
+                      </m:num>
+                      <m:den>
+                        <m:r>
+                          <a:rPr lang="en-US" sz="4400" b="0" i="1" smtClean="0">
+                            <a:latin typeface="Cambria Math" panose="02040503050406030204" pitchFamily="18" charset="0"/>
+                            <a:ea typeface="Cambria Math" panose="02040503050406030204" pitchFamily="18" charset="0"/>
+                            <a:cs typeface="Times New Roman" panose="02020603050405020304" pitchFamily="18" charset="0"/>
+                          </a:rPr>
+                          <m:t>𝑁</m:t>
+                        </m:r>
+                      </m:den>
+                    </m:f>
+                    <m:r>
+                      <a:rPr lang="en-US" sz="4400" b="0" i="1" smtClean="0">
+                        <a:latin typeface="Cambria Math" panose="02040503050406030204" pitchFamily="18" charset="0"/>
+                        <a:ea typeface="Cambria Math" panose="02040503050406030204" pitchFamily="18" charset="0"/>
+                        <a:cs typeface="Times New Roman" panose="02020603050405020304" pitchFamily="18" charset="0"/>
+                      </a:rPr>
+                      <m:t>𝑖</m:t>
+                    </m:r>
+                  </m:oMath>
+                </a14:m>
+                <a:endParaRPr lang="en-US" sz="4400" b="0" dirty="0">
                   <a:cs typeface="Times New Roman" panose="02020603050405020304" pitchFamily="18" charset="0"/>
                 </a:endParaRPr>
               </a:p>
@@ -9721,15 +9874,15 @@
             <p:spPr>
               <a:xfrm>
                 <a:off x="15575061" y="5347533"/>
-                <a:ext cx="12974524" cy="6002797"/>
+                <a:ext cx="12974524" cy="5363969"/>
               </a:xfrm>
               <a:prstGeom prst="rect">
                 <a:avLst/>
               </a:prstGeom>
               <a:blipFill>
-                <a:blip r:embed="rId16"/>
+                <a:blip r:embed="rId17"/>
                 <a:stretch>
-                  <a:fillRect l="-1551" t="-1726" r="-1551" b="-3249"/>
+                  <a:fillRect l="-1551" t="-1932" r="-1551" b="-2955"/>
                 </a:stretch>
               </a:blipFill>
               <a:ln w="12700">
@@ -9765,8 +9918,8 @@
         </p:nvSpPr>
         <p:spPr>
           <a:xfrm>
-            <a:off x="22479000" y="11530539"/>
-            <a:ext cx="5758543" cy="1815882"/>
+            <a:off x="23582468" y="14456088"/>
+            <a:ext cx="4971128" cy="2246769"/>
           </a:xfrm>
           <a:prstGeom prst="rect">
             <a:avLst/>
@@ -9786,14 +9939,14 @@
             </a:r>
             <a:r>
               <a:rPr lang="en-US" sz="2800" dirty="0"/>
-              <a:t> The PTR is used to fill in a body-fitted grid originating from selected points on the boundary.   The solution is computed in layers.</a:t>
+              <a:t> The PTR is used to fill in a body-fitted grid originating from selected points on the boundary. The solution is computed in layers.</a:t>
             </a:r>
             <a:endParaRPr lang="en-US" sz="2800" b="1" dirty="0"/>
           </a:p>
         </p:txBody>
       </p:sp>
-      <mc:AlternateContent xmlns:mc="http://schemas.openxmlformats.org/markup-compatibility/2006">
-        <mc:Choice xmlns:a14="http://schemas.microsoft.com/office/drawing/2010/main" Requires="a14">
+      <mc:AlternateContent xmlns:mc="http://schemas.openxmlformats.org/markup-compatibility/2006" xmlns:a14="http://schemas.microsoft.com/office/drawing/2010/main">
+        <mc:Choice Requires="a14">
           <p:sp>
             <p:nvSpPr>
               <p:cNvPr id="5" name="TextBox 4">
@@ -10566,7 +10719,7 @@
             </p:txBody>
           </p:sp>
         </mc:Choice>
-        <mc:Fallback>
+        <mc:Fallback xmlns="">
           <p:sp>
             <p:nvSpPr>
               <p:cNvPr id="5" name="TextBox 4">
@@ -10590,7 +10743,7 @@
                 <a:avLst/>
               </a:prstGeom>
               <a:blipFill>
-                <a:blip r:embed="rId17"/>
+                <a:blip r:embed="rId18"/>
                 <a:stretch>
                   <a:fillRect t="-1438"/>
                 </a:stretch>
@@ -10611,8 +10764,8 @@
           </p:sp>
         </mc:Fallback>
       </mc:AlternateContent>
-      <mc:AlternateContent xmlns:mc="http://schemas.openxmlformats.org/markup-compatibility/2006">
-        <mc:Choice xmlns:a14="http://schemas.microsoft.com/office/drawing/2010/main" Requires="a14">
+      <mc:AlternateContent xmlns:mc="http://schemas.openxmlformats.org/markup-compatibility/2006" xmlns:a14="http://schemas.microsoft.com/office/drawing/2010/main">
+        <mc:Choice Requires="a14">
           <p:sp>
             <p:nvSpPr>
               <p:cNvPr id="38" name="TextBox 37">
@@ -10641,7 +10794,6 @@
               </a:bodyPr>
               <a:lstStyle/>
               <a:p>
-                <a:pPr/>
                 <a:r>
                   <a:rPr lang="en-US" sz="2800" dirty="0">
                     <a:solidFill>
@@ -10710,7 +10862,7 @@
             </p:txBody>
           </p:sp>
         </mc:Choice>
-        <mc:Fallback>
+        <mc:Fallback xmlns="">
           <p:sp>
             <p:nvSpPr>
               <p:cNvPr id="38" name="TextBox 37">
@@ -10734,7 +10886,7 @@
                 <a:avLst/>
               </a:prstGeom>
               <a:blipFill>
-                <a:blip r:embed="rId18"/>
+                <a:blip r:embed="rId19"/>
                 <a:stretch>
                   <a:fillRect l="-4595" t="-11628" b="-31395"/>
                 </a:stretch>
@@ -10755,8 +10907,8 @@
           </p:sp>
         </mc:Fallback>
       </mc:AlternateContent>
-      <mc:AlternateContent xmlns:mc="http://schemas.openxmlformats.org/markup-compatibility/2006">
-        <mc:Choice xmlns:a14="http://schemas.microsoft.com/office/drawing/2010/main" Requires="a14">
+      <mc:AlternateContent xmlns:mc="http://schemas.openxmlformats.org/markup-compatibility/2006" xmlns:a14="http://schemas.microsoft.com/office/drawing/2010/main">
+        <mc:Choice Requires="a14">
           <p:sp>
             <p:nvSpPr>
               <p:cNvPr id="47" name="TextBox 46">
@@ -10854,7 +11006,7 @@
             </p:txBody>
           </p:sp>
         </mc:Choice>
-        <mc:Fallback>
+        <mc:Fallback xmlns="">
           <p:sp>
             <p:nvSpPr>
               <p:cNvPr id="47" name="TextBox 46">
@@ -10878,7 +11030,7 @@
                 <a:avLst/>
               </a:prstGeom>
               <a:blipFill>
-                <a:blip r:embed="rId19"/>
+                <a:blip r:embed="rId20"/>
                 <a:stretch>
                   <a:fillRect t="-6369" b="-16561"/>
                 </a:stretch>
@@ -10899,8 +11051,8 @@
           </p:sp>
         </mc:Fallback>
       </mc:AlternateContent>
-      <mc:AlternateContent xmlns:mc="http://schemas.openxmlformats.org/markup-compatibility/2006">
-        <mc:Choice xmlns:a14="http://schemas.microsoft.com/office/drawing/2010/main" Requires="a14">
+      <mc:AlternateContent xmlns:mc="http://schemas.openxmlformats.org/markup-compatibility/2006" xmlns:a14="http://schemas.microsoft.com/office/drawing/2010/main">
+        <mc:Choice Requires="a14">
           <p:sp>
             <p:nvSpPr>
               <p:cNvPr id="52" name="Rectangle 51">
@@ -11369,7 +11521,7 @@
             </p:txBody>
           </p:sp>
         </mc:Choice>
-        <mc:Fallback>
+        <mc:Fallback xmlns="">
           <p:sp>
             <p:nvSpPr>
               <p:cNvPr id="52" name="Rectangle 51">
@@ -11393,7 +11545,7 @@
                 <a:avLst/>
               </a:prstGeom>
               <a:blipFill>
-                <a:blip r:embed="rId20"/>
+                <a:blip r:embed="rId21"/>
                 <a:stretch>
                   <a:fillRect l="-1513" t="-1726" r="-1513" b="-3147"/>
                 </a:stretch>
@@ -11417,6 +11569,219 @@
           </p:sp>
         </mc:Fallback>
       </mc:AlternateContent>
+      <mc:AlternateContent xmlns:mc="http://schemas.openxmlformats.org/markup-compatibility/2006">
+        <mc:Choice xmlns:a14="http://schemas.microsoft.com/office/drawing/2010/main" Requires="a14">
+          <p:sp>
+            <p:nvSpPr>
+              <p:cNvPr id="48" name="TextBox 47">
+                <a:extLst>
+                  <a:ext uri="{FF2B5EF4-FFF2-40B4-BE49-F238E27FC236}">
+                    <a16:creationId xmlns:a16="http://schemas.microsoft.com/office/drawing/2014/main" id="{0448F491-088E-48A1-842C-1891F1BEBD21}"/>
+                  </a:ext>
+                </a:extLst>
+              </p:cNvPr>
+              <p:cNvSpPr txBox="1"/>
+              <p:nvPr/>
+            </p:nvSpPr>
+            <p:spPr>
+              <a:xfrm>
+                <a:off x="17526000" y="13868400"/>
+                <a:ext cx="657488" cy="698781"/>
+              </a:xfrm>
+              <a:prstGeom prst="rect">
+                <a:avLst/>
+              </a:prstGeom>
+              <a:noFill/>
+            </p:spPr>
+            <p:txBody>
+              <a:bodyPr wrap="none" rtlCol="0">
+                <a:spAutoFit/>
+              </a:bodyPr>
+              <a:lstStyle/>
+              <a:p>
+                <a:pPr/>
+                <a14:m>
+                  <m:oMathPara xmlns:m="http://schemas.openxmlformats.org/officeDocument/2006/math">
+                    <m:oMathParaPr>
+                      <m:jc m:val="centerGroup"/>
+                    </m:oMathParaPr>
+                    <m:oMath xmlns:m="http://schemas.openxmlformats.org/officeDocument/2006/math">
+                      <m:sSub>
+                        <m:sSubPr>
+                          <m:ctrlPr>
+                            <a:rPr lang="en-US" sz="3600" b="1" i="1" smtClean="0">
+                              <a:solidFill>
+                                <a:schemeClr val="accent3">
+                                  <a:lumMod val="75000"/>
+                                </a:schemeClr>
+                              </a:solidFill>
+                              <a:latin typeface="Cambria Math" panose="02040503050406030204" pitchFamily="18" charset="0"/>
+                            </a:rPr>
+                          </m:ctrlPr>
+                        </m:sSubPr>
+                        <m:e>
+                          <m:r>
+                            <a:rPr lang="en-US" sz="3600" b="1" i="1" smtClean="0">
+                              <a:solidFill>
+                                <a:schemeClr val="accent3">
+                                  <a:lumMod val="75000"/>
+                                </a:schemeClr>
+                              </a:solidFill>
+                              <a:latin typeface="Cambria Math" panose="02040503050406030204" pitchFamily="18" charset="0"/>
+                            </a:rPr>
+                            <m:t>𝒕</m:t>
+                          </m:r>
+                        </m:e>
+                        <m:sub>
+                          <m:r>
+                            <a:rPr lang="en-US" sz="3600" b="1" i="1" smtClean="0">
+                              <a:solidFill>
+                                <a:schemeClr val="accent3">
+                                  <a:lumMod val="75000"/>
+                                </a:schemeClr>
+                              </a:solidFill>
+                              <a:latin typeface="Cambria Math" panose="02040503050406030204" pitchFamily="18" charset="0"/>
+                            </a:rPr>
+                            <m:t>𝒋</m:t>
+                          </m:r>
+                        </m:sub>
+                      </m:sSub>
+                    </m:oMath>
+                  </m:oMathPara>
+                </a14:m>
+                <a:endParaRPr lang="en-US" sz="3600" b="1" dirty="0">
+                  <a:solidFill>
+                    <a:schemeClr val="accent3">
+                      <a:lumMod val="75000"/>
+                    </a:schemeClr>
+                  </a:solidFill>
+                </a:endParaRPr>
+              </a:p>
+            </p:txBody>
+          </p:sp>
+        </mc:Choice>
+        <mc:Fallback>
+          <p:sp>
+            <p:nvSpPr>
+              <p:cNvPr id="48" name="TextBox 47">
+                <a:extLst>
+                  <a:ext uri="{FF2B5EF4-FFF2-40B4-BE49-F238E27FC236}">
+                    <a16:creationId xmlns:a16="http://schemas.microsoft.com/office/drawing/2014/main" id="{0448F491-088E-48A1-842C-1891F1BEBD21}"/>
+                  </a:ext>
+                </a:extLst>
+              </p:cNvPr>
+              <p:cNvSpPr txBox="1">
+                <a:spLocks noRot="1" noChangeAspect="1" noMove="1" noResize="1" noEditPoints="1" noAdjustHandles="1" noChangeArrowheads="1" noChangeShapeType="1" noTextEdit="1"/>
+              </p:cNvSpPr>
+              <p:nvPr/>
+            </p:nvSpPr>
+            <p:spPr>
+              <a:xfrm>
+                <a:off x="17526000" y="13868400"/>
+                <a:ext cx="657488" cy="698781"/>
+              </a:xfrm>
+              <a:prstGeom prst="rect">
+                <a:avLst/>
+              </a:prstGeom>
+              <a:blipFill>
+                <a:blip r:embed="rId22"/>
+                <a:stretch>
+                  <a:fillRect/>
+                </a:stretch>
+              </a:blipFill>
+            </p:spPr>
+            <p:txBody>
+              <a:bodyPr/>
+              <a:lstStyle/>
+              <a:p>
+                <a:r>
+                  <a:rPr lang="en-US">
+                    <a:noFill/>
+                  </a:rPr>
+                  <a:t> </a:t>
+                </a:r>
+              </a:p>
+            </p:txBody>
+          </p:sp>
+        </mc:Fallback>
+      </mc:AlternateContent>
+      <p:sp>
+        <p:nvSpPr>
+          <p:cNvPr id="49" name="TextBox 48">
+            <a:extLst>
+              <a:ext uri="{FF2B5EF4-FFF2-40B4-BE49-F238E27FC236}">
+                <a16:creationId xmlns:a16="http://schemas.microsoft.com/office/drawing/2014/main" id="{B8A68636-DC3E-45BD-8DBE-625FAED4D825}"/>
+              </a:ext>
+            </a:extLst>
+          </p:cNvPr>
+          <p:cNvSpPr txBox="1"/>
+          <p:nvPr/>
+        </p:nvSpPr>
+        <p:spPr>
+          <a:xfrm>
+            <a:off x="16176239" y="11323857"/>
+            <a:ext cx="3357009" cy="646331"/>
+          </a:xfrm>
+          <a:prstGeom prst="rect">
+            <a:avLst/>
+          </a:prstGeom>
+          <a:noFill/>
+        </p:spPr>
+        <p:txBody>
+          <a:bodyPr wrap="none" rtlCol="0">
+            <a:spAutoFit/>
+          </a:bodyPr>
+          <a:lstStyle/>
+          <a:p>
+            <a:pPr/>
+            <a:r>
+              <a:rPr lang="en-US" sz="3600" dirty="0"/>
+              <a:t>Body-Fitted Grid</a:t>
+            </a:r>
+          </a:p>
+        </p:txBody>
+      </p:sp>
+      <p:sp>
+        <p:nvSpPr>
+          <p:cNvPr id="53" name="TextBox 52">
+            <a:extLst>
+              <a:ext uri="{FF2B5EF4-FFF2-40B4-BE49-F238E27FC236}">
+                <a16:creationId xmlns:a16="http://schemas.microsoft.com/office/drawing/2014/main" id="{47A73E15-959C-46AC-B893-CB8910773FE2}"/>
+              </a:ext>
+            </a:extLst>
+          </p:cNvPr>
+          <p:cNvSpPr txBox="1"/>
+          <p:nvPr/>
+        </p:nvSpPr>
+        <p:spPr>
+          <a:xfrm>
+            <a:off x="20599131" y="14401800"/>
+            <a:ext cx="1843774" cy="584775"/>
+          </a:xfrm>
+          <a:prstGeom prst="rect">
+            <a:avLst/>
+          </a:prstGeom>
+          <a:noFill/>
+        </p:spPr>
+        <p:txBody>
+          <a:bodyPr wrap="none" rtlCol="0">
+            <a:spAutoFit/>
+          </a:bodyPr>
+          <a:lstStyle/>
+          <a:p>
+            <a:r>
+              <a:rPr lang="en-US" sz="3200" dirty="0">
+                <a:solidFill>
+                  <a:schemeClr val="accent6">
+                    <a:lumMod val="75000"/>
+                  </a:schemeClr>
+                </a:solidFill>
+              </a:rPr>
+              <a:t>PTR sums</a:t>
+            </a:r>
+          </a:p>
+        </p:txBody>
+      </p:sp>
     </p:spTree>
     <p:extLst>
       <p:ext uri="{BB962C8B-B14F-4D97-AF65-F5344CB8AC3E}">

</xml_diff>

<commit_message>
Final Update for 7-25 / Need to add more test cases
</commit_message>
<xml_diff>
--- a/UROC Poster Draft.pptx
+++ b/UROC Poster Draft.pptx
@@ -9284,8 +9284,8 @@
           </p:sp>
         </mc:Fallback>
       </mc:AlternateContent>
-      <mc:AlternateContent xmlns:mc="http://schemas.openxmlformats.org/markup-compatibility/2006">
-        <mc:Choice xmlns:a14="http://schemas.microsoft.com/office/drawing/2010/main" Requires="a14">
+      <mc:AlternateContent xmlns:mc="http://schemas.openxmlformats.org/markup-compatibility/2006" xmlns:a14="http://schemas.microsoft.com/office/drawing/2010/main">
+        <mc:Choice Requires="a14">
           <p:sp>
             <p:nvSpPr>
               <p:cNvPr id="50" name="Rectangle 49">
@@ -9856,7 +9856,7 @@
             </p:txBody>
           </p:sp>
         </mc:Choice>
-        <mc:Fallback>
+        <mc:Fallback xmlns="">
           <p:sp>
             <p:nvSpPr>
               <p:cNvPr id="50" name="Rectangle 49">
@@ -11569,8 +11569,8 @@
           </p:sp>
         </mc:Fallback>
       </mc:AlternateContent>
-      <mc:AlternateContent xmlns:mc="http://schemas.openxmlformats.org/markup-compatibility/2006">
-        <mc:Choice xmlns:a14="http://schemas.microsoft.com/office/drawing/2010/main" Requires="a14">
+      <mc:AlternateContent xmlns:mc="http://schemas.openxmlformats.org/markup-compatibility/2006" xmlns:a14="http://schemas.microsoft.com/office/drawing/2010/main">
+        <mc:Choice Requires="a14">
           <p:sp>
             <p:nvSpPr>
               <p:cNvPr id="48" name="TextBox 47">
@@ -11660,7 +11660,7 @@
             </p:txBody>
           </p:sp>
         </mc:Choice>
-        <mc:Fallback>
+        <mc:Fallback xmlns="">
           <p:sp>
             <p:nvSpPr>
               <p:cNvPr id="48" name="TextBox 47">
@@ -11733,7 +11733,6 @@
           </a:bodyPr>
           <a:lstStyle/>
           <a:p>
-            <a:pPr/>
             <a:r>
               <a:rPr lang="en-US" sz="3600" dirty="0"/>
               <a:t>Body-Fitted Grid</a:t>
@@ -11779,6 +11778,276 @@
               </a:rPr>
               <a:t>PTR sums</a:t>
             </a:r>
+          </a:p>
+        </p:txBody>
+      </p:sp>
+      <p:pic>
+        <p:nvPicPr>
+          <p:cNvPr id="18" name="Picture 17">
+            <a:extLst>
+              <a:ext uri="{FF2B5EF4-FFF2-40B4-BE49-F238E27FC236}">
+                <a16:creationId xmlns:a16="http://schemas.microsoft.com/office/drawing/2014/main" id="{83770212-99E1-40B4-A3F4-12BBA47318CB}"/>
+              </a:ext>
+            </a:extLst>
+          </p:cNvPr>
+          <p:cNvPicPr>
+            <a:picLocks noChangeAspect="1"/>
+          </p:cNvPicPr>
+          <p:nvPr/>
+        </p:nvPicPr>
+        <p:blipFill>
+          <a:blip r:embed="rId23"/>
+          <a:stretch>
+            <a:fillRect/>
+          </a:stretch>
+        </p:blipFill>
+        <p:spPr>
+          <a:xfrm>
+            <a:off x="21901465" y="18452325"/>
+            <a:ext cx="5682839" cy="2988377"/>
+          </a:xfrm>
+          <a:prstGeom prst="rect">
+            <a:avLst/>
+          </a:prstGeom>
+        </p:spPr>
+      </p:pic>
+      <p:pic>
+        <p:nvPicPr>
+          <p:cNvPr id="23" name="Picture 22">
+            <a:extLst>
+              <a:ext uri="{FF2B5EF4-FFF2-40B4-BE49-F238E27FC236}">
+                <a16:creationId xmlns:a16="http://schemas.microsoft.com/office/drawing/2014/main" id="{162AE01D-D9D7-43E0-932E-EB747AA2062F}"/>
+              </a:ext>
+            </a:extLst>
+          </p:cNvPr>
+          <p:cNvPicPr>
+            <a:picLocks noChangeAspect="1"/>
+          </p:cNvPicPr>
+          <p:nvPr/>
+        </p:nvPicPr>
+        <p:blipFill rotWithShape="1">
+          <a:blip r:embed="rId24"/>
+          <a:srcRect r="19920"/>
+          <a:stretch/>
+        </p:blipFill>
+        <p:spPr>
+          <a:xfrm>
+            <a:off x="16145305" y="22850326"/>
+            <a:ext cx="4699976" cy="3086319"/>
+          </a:xfrm>
+          <a:prstGeom prst="rect">
+            <a:avLst/>
+          </a:prstGeom>
+        </p:spPr>
+      </p:pic>
+      <p:pic>
+        <p:nvPicPr>
+          <p:cNvPr id="25" name="Picture 24">
+            <a:extLst>
+              <a:ext uri="{FF2B5EF4-FFF2-40B4-BE49-F238E27FC236}">
+                <a16:creationId xmlns:a16="http://schemas.microsoft.com/office/drawing/2014/main" id="{C831D697-C497-4E9F-AFF8-8D3BE9216A9B}"/>
+              </a:ext>
+            </a:extLst>
+          </p:cNvPr>
+          <p:cNvPicPr>
+            <a:picLocks noChangeAspect="1"/>
+          </p:cNvPicPr>
+          <p:nvPr/>
+        </p:nvPicPr>
+        <p:blipFill>
+          <a:blip r:embed="rId24"/>
+          <a:stretch>
+            <a:fillRect/>
+          </a:stretch>
+        </p:blipFill>
+        <p:spPr>
+          <a:xfrm>
+            <a:off x="21717000" y="22823386"/>
+            <a:ext cx="5865850" cy="3084614"/>
+          </a:xfrm>
+          <a:prstGeom prst="rect">
+            <a:avLst/>
+          </a:prstGeom>
+        </p:spPr>
+      </p:pic>
+      <p:sp>
+        <p:nvSpPr>
+          <p:cNvPr id="51" name="TextBox 50">
+            <a:extLst>
+              <a:ext uri="{FF2B5EF4-FFF2-40B4-BE49-F238E27FC236}">
+                <a16:creationId xmlns:a16="http://schemas.microsoft.com/office/drawing/2014/main" id="{BB325162-4559-4EE8-9443-57029E6B8BD9}"/>
+              </a:ext>
+            </a:extLst>
+          </p:cNvPr>
+          <p:cNvSpPr txBox="1"/>
+          <p:nvPr/>
+        </p:nvSpPr>
+        <p:spPr>
+          <a:xfrm>
+            <a:off x="15240000" y="21601093"/>
+            <a:ext cx="13267791" cy="954107"/>
+          </a:xfrm>
+          <a:prstGeom prst="rect">
+            <a:avLst/>
+          </a:prstGeom>
+          <a:noFill/>
+        </p:spPr>
+        <p:txBody>
+          <a:bodyPr wrap="square" rtlCol="0">
+            <a:spAutoFit/>
+          </a:bodyPr>
+          <a:lstStyle/>
+          <a:p>
+            <a:r>
+              <a:rPr lang="en-US" sz="2800" b="1" dirty="0"/>
+              <a:t>Figure 3a.</a:t>
+            </a:r>
+            <a:r>
+              <a:rPr lang="en-US" sz="2800" dirty="0"/>
+              <a:t>  The plot of the real part (left) and the imaginary part (right) of the PTR solution for an ellipse-shaped boundary.</a:t>
+            </a:r>
+            <a:endParaRPr lang="en-US" sz="2800" b="1" dirty="0"/>
+          </a:p>
+        </p:txBody>
+      </p:sp>
+      <p:sp>
+        <p:nvSpPr>
+          <p:cNvPr id="55" name="TextBox 54">
+            <a:extLst>
+              <a:ext uri="{FF2B5EF4-FFF2-40B4-BE49-F238E27FC236}">
+                <a16:creationId xmlns:a16="http://schemas.microsoft.com/office/drawing/2014/main" id="{AB5992AA-DF69-4BD6-881B-9A7B5D64B756}"/>
+              </a:ext>
+            </a:extLst>
+          </p:cNvPr>
+          <p:cNvSpPr txBox="1"/>
+          <p:nvPr/>
+        </p:nvSpPr>
+        <p:spPr>
+          <a:xfrm>
+            <a:off x="15239999" y="26212800"/>
+            <a:ext cx="13267791" cy="954107"/>
+          </a:xfrm>
+          <a:prstGeom prst="rect">
+            <a:avLst/>
+          </a:prstGeom>
+          <a:noFill/>
+        </p:spPr>
+        <p:txBody>
+          <a:bodyPr wrap="square" rtlCol="0">
+            <a:spAutoFit/>
+          </a:bodyPr>
+          <a:lstStyle/>
+          <a:p>
+            <a:r>
+              <a:rPr lang="en-US" sz="2800" b="1" dirty="0"/>
+              <a:t>Figure 3b.</a:t>
+            </a:r>
+            <a:r>
+              <a:rPr lang="en-US" sz="2800" dirty="0"/>
+              <a:t>  The plot of the real part (left) and the imaginary part (right) of the exact solution for a plane wave acting on an ellipse boundary.</a:t>
+            </a:r>
+            <a:endParaRPr lang="en-US" sz="2800" b="1" dirty="0"/>
+          </a:p>
+        </p:txBody>
+      </p:sp>
+      <p:pic>
+        <p:nvPicPr>
+          <p:cNvPr id="27" name="Picture 26">
+            <a:extLst>
+              <a:ext uri="{FF2B5EF4-FFF2-40B4-BE49-F238E27FC236}">
+                <a16:creationId xmlns:a16="http://schemas.microsoft.com/office/drawing/2014/main" id="{2F50F3BC-B411-4D51-B9E9-C00FE4BD4978}"/>
+              </a:ext>
+            </a:extLst>
+          </p:cNvPr>
+          <p:cNvPicPr>
+            <a:picLocks noChangeAspect="1"/>
+          </p:cNvPicPr>
+          <p:nvPr/>
+        </p:nvPicPr>
+        <p:blipFill>
+          <a:blip r:embed="rId25"/>
+          <a:stretch>
+            <a:fillRect/>
+          </a:stretch>
+        </p:blipFill>
+        <p:spPr>
+          <a:xfrm>
+            <a:off x="15849600" y="18288000"/>
+            <a:ext cx="5222656" cy="3313093"/>
+          </a:xfrm>
+          <a:prstGeom prst="rect">
+            <a:avLst/>
+          </a:prstGeom>
+        </p:spPr>
+      </p:pic>
+      <p:pic>
+        <p:nvPicPr>
+          <p:cNvPr id="28" name="Picture 27">
+            <a:extLst>
+              <a:ext uri="{FF2B5EF4-FFF2-40B4-BE49-F238E27FC236}">
+                <a16:creationId xmlns:a16="http://schemas.microsoft.com/office/drawing/2014/main" id="{CA21A3FB-AFA2-4174-8C92-892951FE2B70}"/>
+              </a:ext>
+            </a:extLst>
+          </p:cNvPr>
+          <p:cNvPicPr>
+            <a:picLocks noChangeAspect="1"/>
+          </p:cNvPicPr>
+          <p:nvPr/>
+        </p:nvPicPr>
+        <p:blipFill>
+          <a:blip r:embed="rId26"/>
+          <a:stretch>
+            <a:fillRect/>
+          </a:stretch>
+        </p:blipFill>
+        <p:spPr>
+          <a:xfrm>
+            <a:off x="21072256" y="27570867"/>
+            <a:ext cx="6510594" cy="4282875"/>
+          </a:xfrm>
+          <a:prstGeom prst="rect">
+            <a:avLst/>
+          </a:prstGeom>
+        </p:spPr>
+      </p:pic>
+      <p:sp>
+        <p:nvSpPr>
+          <p:cNvPr id="56" name="TextBox 55">
+            <a:extLst>
+              <a:ext uri="{FF2B5EF4-FFF2-40B4-BE49-F238E27FC236}">
+                <a16:creationId xmlns:a16="http://schemas.microsoft.com/office/drawing/2014/main" id="{877187A0-49C1-40D8-9C84-BAE3D4EA123B}"/>
+              </a:ext>
+            </a:extLst>
+          </p:cNvPr>
+          <p:cNvSpPr txBox="1"/>
+          <p:nvPr/>
+        </p:nvSpPr>
+        <p:spPr>
+          <a:xfrm>
+            <a:off x="15260781" y="28266821"/>
+            <a:ext cx="5621228" cy="3108543"/>
+          </a:xfrm>
+          <a:prstGeom prst="rect">
+            <a:avLst/>
+          </a:prstGeom>
+          <a:noFill/>
+        </p:spPr>
+        <p:txBody>
+          <a:bodyPr wrap="square" rtlCol="0">
+            <a:spAutoFit/>
+          </a:bodyPr>
+          <a:lstStyle/>
+          <a:p>
+            <a:pPr algn="just"/>
+            <a:r>
+              <a:rPr lang="en-US" sz="2800" b="1" dirty="0"/>
+              <a:t>Figure 4.</a:t>
+            </a:r>
+            <a:r>
+              <a:rPr lang="en-US" sz="2800" dirty="0"/>
+              <a:t> The log error plot between the surfaces shown in Figure 3a and 3b.  Because our method is nearly singular as our points approach the boundary, there is a significant increase in error around the defined ellipse.</a:t>
+            </a:r>
+            <a:endParaRPr lang="en-US" sz="2800" b="1" dirty="0"/>
           </a:p>
         </p:txBody>
       </p:sp>

</xml_diff>

<commit_message>
Finished poster final(ish) draft for review
Transmission problem currently has test cases on it.
</commit_message>
<xml_diff>
--- a/UROC Poster Draft.pptx
+++ b/UROC Poster Draft.pptx
@@ -4355,20 +4355,24 @@
           </p:cNvPicPr>
           <p:nvPr/>
         </p:nvPicPr>
-        <p:blipFill>
+        <p:blipFill rotWithShape="1">
           <a:blip r:embed="rId3"/>
-          <a:stretch>
-            <a:fillRect/>
-          </a:stretch>
+          <a:srcRect l="10655" t="1604" r="9206" b="4173"/>
+          <a:stretch/>
         </p:blipFill>
         <p:spPr>
           <a:xfrm>
-            <a:off x="15642507" y="10718307"/>
-            <a:ext cx="7674693" cy="5991355"/>
+            <a:off x="18516600" y="10938052"/>
+            <a:ext cx="6743682" cy="4393309"/>
           </a:xfrm>
           <a:prstGeom prst="rect">
             <a:avLst/>
           </a:prstGeom>
+          <a:ln w="57150">
+            <a:solidFill>
+              <a:schemeClr val="accent1"/>
+            </a:solidFill>
+          </a:ln>
         </p:spPr>
       </p:pic>
       <p:pic>
@@ -5172,7 +5176,7 @@
               <a:rPr lang="en-US" sz="3800" dirty="0">
                 <a:cs typeface="Times New Roman" panose="02020603050405020304" pitchFamily="18" charset="0"/>
               </a:rPr>
-              <a:t>We use boundary integral equation methods to compute the solution in layered boundaries, and we implement in Python an approximation using the periodic trapezoid rule and the Kress Quadrature.</a:t>
+              <a:t>We use boundary integral equation methods to compute the solution in layered boundaries, and we implement in Python an approximation using the periodic trapezoid (PTR) and the Kress Quadrature.</a:t>
             </a:r>
             <a:r>
               <a:rPr lang="en-US" sz="3800" baseline="30000" dirty="0">
@@ -5431,8 +5435,8 @@
           </a:p>
         </p:txBody>
       </p:sp>
-      <mc:AlternateContent xmlns:mc="http://schemas.openxmlformats.org/markup-compatibility/2006" xmlns:a14="http://schemas.microsoft.com/office/drawing/2010/main">
-        <mc:Choice Requires="a14">
+      <mc:AlternateContent xmlns:mc="http://schemas.openxmlformats.org/markup-compatibility/2006">
+        <mc:Choice xmlns:a14="http://schemas.microsoft.com/office/drawing/2010/main" Requires="a14">
           <p:sp>
             <p:nvSpPr>
               <p:cNvPr id="79" name="Rectangle 78">
@@ -5447,8 +5451,8 @@
             </p:nvSpPr>
             <p:spPr>
               <a:xfrm>
-                <a:off x="1175756" y="25919190"/>
-                <a:ext cx="13299848" cy="5456174"/>
+                <a:off x="1175756" y="25204733"/>
+                <a:ext cx="13299848" cy="6885090"/>
               </a:xfrm>
               <a:prstGeom prst="rect">
                 <a:avLst/>
@@ -6874,6 +6878,123 @@
                     <a:spcPts val="600"/>
                   </a:spcAft>
                 </a:pPr>
+                <a:r>
+                  <a:rPr lang="en-US" sz="3600" dirty="0">
+                    <a:cs typeface="Times New Roman" panose="02020603050405020304" pitchFamily="18" charset="0"/>
+                  </a:rPr>
+                  <a:t>We compute </a:t>
+                </a:r>
+                <a14:m>
+                  <m:oMath xmlns:m="http://schemas.openxmlformats.org/officeDocument/2006/math">
+                    <m:sSub>
+                      <m:sSubPr>
+                        <m:ctrlPr>
+                          <a:rPr lang="en-US" sz="3600" b="0" i="1" smtClean="0">
+                            <a:latin typeface="Cambria Math" panose="02040503050406030204" pitchFamily="18" charset="0"/>
+                            <a:cs typeface="Times New Roman" panose="02020603050405020304" pitchFamily="18" charset="0"/>
+                          </a:rPr>
+                        </m:ctrlPr>
+                      </m:sSubPr>
+                      <m:e>
+                        <m:r>
+                          <a:rPr lang="en-US" sz="3600" b="0" i="1" smtClean="0">
+                            <a:latin typeface="Cambria Math" panose="02040503050406030204" pitchFamily="18" charset="0"/>
+                            <a:cs typeface="Times New Roman" panose="02020603050405020304" pitchFamily="18" charset="0"/>
+                          </a:rPr>
+                          <m:t>𝑢</m:t>
+                        </m:r>
+                      </m:e>
+                      <m:sub>
+                        <m:r>
+                          <a:rPr lang="en-US" sz="3600" b="0" i="1" smtClean="0">
+                            <a:latin typeface="Cambria Math" panose="02040503050406030204" pitchFamily="18" charset="0"/>
+                            <a:cs typeface="Times New Roman" panose="02020603050405020304" pitchFamily="18" charset="0"/>
+                          </a:rPr>
+                          <m:t>𝑒</m:t>
+                        </m:r>
+                      </m:sub>
+                    </m:sSub>
+                  </m:oMath>
+                </a14:m>
+                <a:r>
+                  <a:rPr lang="en-US" sz="3600" dirty="0">
+                    <a:cs typeface="Times New Roman" panose="02020603050405020304" pitchFamily="18" charset="0"/>
+                  </a:rPr>
+                  <a:t>and </a:t>
+                </a:r>
+                <a14:m>
+                  <m:oMath xmlns:m="http://schemas.openxmlformats.org/officeDocument/2006/math">
+                    <m:f>
+                      <m:fPr>
+                        <m:ctrlPr>
+                          <a:rPr lang="en-US" sz="3600" b="0" i="1" smtClean="0">
+                            <a:latin typeface="Cambria Math" panose="02040503050406030204" pitchFamily="18" charset="0"/>
+                            <a:cs typeface="Times New Roman" panose="02020603050405020304" pitchFamily="18" charset="0"/>
+                          </a:rPr>
+                        </m:ctrlPr>
+                      </m:fPr>
+                      <m:num>
+                        <m:r>
+                          <a:rPr lang="en-US" sz="3600" b="0" i="1" smtClean="0">
+                            <a:latin typeface="Cambria Math" panose="02040503050406030204" pitchFamily="18" charset="0"/>
+                            <a:cs typeface="Times New Roman" panose="02020603050405020304" pitchFamily="18" charset="0"/>
+                          </a:rPr>
+                          <m:t>𝜕</m:t>
+                        </m:r>
+                        <m:sSub>
+                          <m:sSubPr>
+                            <m:ctrlPr>
+                              <a:rPr lang="en-US" sz="3600" b="0" i="1" smtClean="0">
+                                <a:latin typeface="Cambria Math" panose="02040503050406030204" pitchFamily="18" charset="0"/>
+                                <a:cs typeface="Times New Roman" panose="02020603050405020304" pitchFamily="18" charset="0"/>
+                              </a:rPr>
+                            </m:ctrlPr>
+                          </m:sSubPr>
+                          <m:e>
+                            <m:r>
+                              <a:rPr lang="en-US" sz="3600" b="0" i="1" smtClean="0">
+                                <a:latin typeface="Cambria Math" panose="02040503050406030204" pitchFamily="18" charset="0"/>
+                                <a:cs typeface="Times New Roman" panose="02020603050405020304" pitchFamily="18" charset="0"/>
+                              </a:rPr>
+                              <m:t>𝑢</m:t>
+                            </m:r>
+                          </m:e>
+                          <m:sub>
+                            <m:r>
+                              <a:rPr lang="en-US" sz="3600" b="0" i="1" smtClean="0">
+                                <a:latin typeface="Cambria Math" panose="02040503050406030204" pitchFamily="18" charset="0"/>
+                                <a:cs typeface="Times New Roman" panose="02020603050405020304" pitchFamily="18" charset="0"/>
+                              </a:rPr>
+                              <m:t>𝑒</m:t>
+                            </m:r>
+                          </m:sub>
+                        </m:sSub>
+                      </m:num>
+                      <m:den>
+                        <m:r>
+                          <a:rPr lang="en-US" sz="3600" b="0" i="1" smtClean="0">
+                            <a:latin typeface="Cambria Math" panose="02040503050406030204" pitchFamily="18" charset="0"/>
+                            <a:cs typeface="Times New Roman" panose="02020603050405020304" pitchFamily="18" charset="0"/>
+                          </a:rPr>
+                          <m:t>𝜕𝜈</m:t>
+                        </m:r>
+                      </m:den>
+                    </m:f>
+                  </m:oMath>
+                </a14:m>
+                <a:r>
+                  <a:rPr lang="en-US" sz="3600" dirty="0">
+                    <a:cs typeface="Times New Roman" panose="02020603050405020304" pitchFamily="18" charset="0"/>
+                  </a:rPr>
+                  <a:t> on the boundary using a boundary integral system.</a:t>
+                </a:r>
+              </a:p>
+              <a:p>
+                <a:pPr algn="ctr">
+                  <a:spcAft>
+                    <a:spcPts val="600"/>
+                  </a:spcAft>
+                </a:pPr>
                 <a:endParaRPr lang="en-US" sz="3200" dirty="0">
                   <a:cs typeface="Times New Roman" panose="02020603050405020304" pitchFamily="18" charset="0"/>
                 </a:endParaRPr>
@@ -6881,7 +7002,7 @@
             </p:txBody>
           </p:sp>
         </mc:Choice>
-        <mc:Fallback xmlns="">
+        <mc:Fallback>
           <p:sp>
             <p:nvSpPr>
               <p:cNvPr id="79" name="Rectangle 78">
@@ -6898,8 +7019,8 @@
             </p:nvSpPr>
             <p:spPr>
               <a:xfrm>
-                <a:off x="1175756" y="25919190"/>
-                <a:ext cx="13299848" cy="5456174"/>
+                <a:off x="1175756" y="25204733"/>
+                <a:ext cx="13299848" cy="6885090"/>
               </a:xfrm>
               <a:prstGeom prst="rect">
                 <a:avLst/>
@@ -6907,7 +7028,7 @@
               <a:blipFill>
                 <a:blip r:embed="rId5"/>
                 <a:stretch>
-                  <a:fillRect l="-275" t="-1006" r="-183"/>
+                  <a:fillRect l="-275" t="-797" r="-183"/>
                 </a:stretch>
               </a:blipFill>
               <a:ln w="12700">
@@ -7904,7 +8025,7 @@
                 <a:latin typeface="+mj-lt"/>
                 <a:cs typeface="Times New Roman" panose="02020603050405020304" pitchFamily="18" charset="0"/>
               </a:rPr>
-              <a:t>Validation</a:t>
+              <a:t>Preliminary Results</a:t>
             </a:r>
           </a:p>
         </p:txBody>
@@ -8119,7 +8240,7 @@
         </p:nvSpPr>
         <p:spPr>
           <a:xfrm>
-            <a:off x="29337000" y="24768514"/>
+            <a:off x="29337000" y="24613972"/>
             <a:ext cx="13299848" cy="7085228"/>
           </a:xfrm>
           <a:prstGeom prst="roundRect">
@@ -9292,8 +9413,8 @@
           </p:sp>
         </mc:Fallback>
       </mc:AlternateContent>
-      <mc:AlternateContent xmlns:mc="http://schemas.openxmlformats.org/markup-compatibility/2006" xmlns:a14="http://schemas.microsoft.com/office/drawing/2010/main">
-        <mc:Choice Requires="a14">
+      <mc:AlternateContent xmlns:mc="http://schemas.openxmlformats.org/markup-compatibility/2006">
+        <mc:Choice xmlns:a14="http://schemas.microsoft.com/office/drawing/2010/main" Requires="a14">
           <p:sp>
             <p:nvSpPr>
               <p:cNvPr id="50" name="Rectangle 49">
@@ -9309,7 +9430,7 @@
             <p:spPr>
               <a:xfrm>
                 <a:off x="15575061" y="5347533"/>
-                <a:ext cx="12974524" cy="5363969"/>
+                <a:ext cx="12974524" cy="5479192"/>
               </a:xfrm>
               <a:prstGeom prst="rect">
                 <a:avLst/>
@@ -9443,7 +9564,11 @@
                 </a:r>
               </a:p>
               <a:p>
-                <a:pPr algn="ctr"/>
+                <a:pPr algn="ctr">
+                  <a:spcAft>
+                    <a:spcPts val="1200"/>
+                  </a:spcAft>
+                </a:pPr>
                 <a14:m>
                   <m:oMath xmlns:m="http://schemas.openxmlformats.org/officeDocument/2006/math">
                     <m:nary>
@@ -9751,12 +9876,6 @@
                     </m:r>
                   </m:oMath>
                 </a14:m>
-                <a:endParaRPr lang="en-US" sz="4400" b="0" dirty="0">
-                  <a:cs typeface="Times New Roman" panose="02020603050405020304" pitchFamily="18" charset="0"/>
-                </a:endParaRPr>
-              </a:p>
-              <a:p>
-                <a:pPr algn="ctr"/>
                 <a:endParaRPr lang="en-US" sz="3800" dirty="0">
                   <a:cs typeface="Times New Roman" panose="02020603050405020304" pitchFamily="18" charset="0"/>
                 </a:endParaRPr>
@@ -9767,7 +9886,7 @@
                   <a:rPr lang="en-US" sz="3800" dirty="0">
                     <a:cs typeface="Times New Roman" panose="02020603050405020304" pitchFamily="18" charset="0"/>
                   </a:rPr>
-                  <a:t>However, to solve the boundary integral equation system, we must use the Kress quadrature (</a:t>
+                  <a:t>However, to solve the system on the boundary, we must use the Kress quadrature because </a:t>
                 </a:r>
                 <a14:m>
                   <m:oMath xmlns:m="http://schemas.openxmlformats.org/officeDocument/2006/math">
@@ -9849,7 +9968,7 @@
                   <a:rPr lang="en-US" sz="3800" dirty="0">
                     <a:cs typeface="Times New Roman" panose="02020603050405020304" pitchFamily="18" charset="0"/>
                   </a:rPr>
-                  <a:t> are singular).</a:t>
+                  <a:t> are singular on the boundary.</a:t>
                 </a:r>
                 <a:r>
                   <a:rPr lang="en-US" sz="3800" baseline="30000" dirty="0">
@@ -9864,7 +9983,7 @@
             </p:txBody>
           </p:sp>
         </mc:Choice>
-        <mc:Fallback xmlns="">
+        <mc:Fallback>
           <p:sp>
             <p:nvSpPr>
               <p:cNvPr id="50" name="Rectangle 49">
@@ -9882,7 +10001,7 @@
             <p:spPr>
               <a:xfrm>
                 <a:off x="15575061" y="5347533"/>
-                <a:ext cx="12974524" cy="5363969"/>
+                <a:ext cx="12974524" cy="5479192"/>
               </a:xfrm>
               <a:prstGeom prst="rect">
                 <a:avLst/>
@@ -9890,7 +10009,7 @@
               <a:blipFill>
                 <a:blip r:embed="rId17"/>
                 <a:stretch>
-                  <a:fillRect l="-1551" t="-1932" r="-1551" b="-2955"/>
+                  <a:fillRect l="-1551" t="-1891" r="-1551" b="-3560"/>
                 </a:stretch>
               </a:blipFill>
               <a:ln w="12700">
@@ -9926,8 +10045,8 @@
         </p:nvSpPr>
         <p:spPr>
           <a:xfrm>
-            <a:off x="23582468" y="14456088"/>
-            <a:ext cx="4971128" cy="2246769"/>
+            <a:off x="15437606" y="15657493"/>
+            <a:ext cx="12974524" cy="954107"/>
           </a:xfrm>
           <a:prstGeom prst="rect">
             <a:avLst/>
@@ -9947,14 +10066,14 @@
             </a:r>
             <a:r>
               <a:rPr lang="en-US" sz="2800" dirty="0"/>
-              <a:t> The PTR is used to fill in a body-fitted grid originating from selected points on the boundary. The solution is computed in layers.</a:t>
+              <a:t> We compute the solution on the body-fitted  grid using the PTR. The solution is computed in layers.</a:t>
             </a:r>
             <a:endParaRPr lang="en-US" sz="2800" b="1" dirty="0"/>
           </a:p>
         </p:txBody>
       </p:sp>
-      <mc:AlternateContent xmlns:mc="http://schemas.openxmlformats.org/markup-compatibility/2006">
-        <mc:Choice xmlns:a14="http://schemas.microsoft.com/office/drawing/2010/main" Requires="a14">
+      <mc:AlternateContent xmlns:mc="http://schemas.openxmlformats.org/markup-compatibility/2006" xmlns:a14="http://schemas.microsoft.com/office/drawing/2010/main">
+        <mc:Choice Requires="a14">
           <p:sp>
             <p:nvSpPr>
               <p:cNvPr id="5" name="TextBox 4">
@@ -10773,7 +10892,7 @@
             </p:txBody>
           </p:sp>
         </mc:Choice>
-        <mc:Fallback>
+        <mc:Fallback xmlns="">
           <p:sp>
             <p:nvSpPr>
               <p:cNvPr id="5" name="TextBox 4">
@@ -11105,81 +11224,159 @@
           </p:sp>
         </mc:Fallback>
       </mc:AlternateContent>
-      <p:sp>
-        <p:nvSpPr>
-          <p:cNvPr id="52" name="Rectangle 51">
-            <a:extLst>
-              <a:ext uri="{FF2B5EF4-FFF2-40B4-BE49-F238E27FC236}">
-                <a16:creationId xmlns:a16="http://schemas.microsoft.com/office/drawing/2014/main" id="{B6D6603E-AEAA-4593-9502-0647B30D3383}"/>
-              </a:ext>
-            </a:extLst>
-          </p:cNvPr>
-          <p:cNvSpPr/>
-          <p:nvPr/>
-        </p:nvSpPr>
-        <p:spPr>
-          <a:xfrm>
-            <a:off x="29337000" y="18288000"/>
-            <a:ext cx="13299848" cy="4493538"/>
-          </a:xfrm>
-          <a:prstGeom prst="rect">
-            <a:avLst/>
-          </a:prstGeom>
-          <a:ln w="12700">
-            <a:noFill/>
-          </a:ln>
-        </p:spPr>
-        <p:txBody>
-          <a:bodyPr wrap="square">
-            <a:spAutoFit/>
-          </a:bodyPr>
-          <a:lstStyle/>
-          <a:p>
-            <a:pPr marL="571500" indent="-571500" algn="just">
-              <a:spcAft>
-                <a:spcPts val="1200"/>
-              </a:spcAft>
-              <a:buFont typeface="Arial" panose="020B0604020202020204" pitchFamily="34" charset="0"/>
-              <a:buChar char="•"/>
-            </a:pPr>
-            <a:r>
-              <a:rPr lang="en-US" sz="3800" dirty="0">
-                <a:cs typeface="Times New Roman" panose="02020603050405020304" pitchFamily="18" charset="0"/>
-              </a:rPr>
-              <a:t>By applying PTR and the Kress Quadrature to the transmission problem, we were able to plot the effect of a source of a boundary with marginal error.</a:t>
-            </a:r>
-          </a:p>
-          <a:p>
-            <a:pPr marL="571500" indent="-571500" algn="just">
-              <a:spcAft>
-                <a:spcPts val="1200"/>
-              </a:spcAft>
-              <a:buFont typeface="Arial" panose="020B0604020202020204" pitchFamily="34" charset="0"/>
-              <a:buChar char="•"/>
-            </a:pPr>
-            <a:r>
-              <a:rPr lang="en-US" sz="3800" dirty="0">
-                <a:cs typeface="Times New Roman" panose="02020603050405020304" pitchFamily="18" charset="0"/>
-              </a:rPr>
-              <a:t>Because our method is nearly singular close to the boundary, an alternative means of approximating our solution for this interval of error.</a:t>
-            </a:r>
-          </a:p>
-          <a:p>
-            <a:pPr marL="571500" indent="-571500" algn="just">
-              <a:spcAft>
-                <a:spcPts val="1200"/>
-              </a:spcAft>
-              <a:buFont typeface="Arial" panose="020B0604020202020204" pitchFamily="34" charset="0"/>
-              <a:buChar char="•"/>
-            </a:pPr>
-            <a:endParaRPr lang="en-US" sz="3800" dirty="0">
-              <a:cs typeface="Times New Roman" panose="02020603050405020304" pitchFamily="18" charset="0"/>
-            </a:endParaRPr>
-          </a:p>
-        </p:txBody>
-      </p:sp>
-      <mc:AlternateContent xmlns:mc="http://schemas.openxmlformats.org/markup-compatibility/2006" xmlns:a14="http://schemas.microsoft.com/office/drawing/2010/main">
-        <mc:Choice Requires="a14">
+      <mc:AlternateContent xmlns:mc="http://schemas.openxmlformats.org/markup-compatibility/2006">
+        <mc:Choice xmlns:a14="http://schemas.microsoft.com/office/drawing/2010/main" Requires="a14">
+          <p:sp>
+            <p:nvSpPr>
+              <p:cNvPr id="52" name="Rectangle 51">
+                <a:extLst>
+                  <a:ext uri="{FF2B5EF4-FFF2-40B4-BE49-F238E27FC236}">
+                    <a16:creationId xmlns:a16="http://schemas.microsoft.com/office/drawing/2014/main" id="{B6D6603E-AEAA-4593-9502-0647B30D3383}"/>
+                  </a:ext>
+                </a:extLst>
+              </p:cNvPr>
+              <p:cNvSpPr/>
+              <p:nvPr/>
+            </p:nvSpPr>
+            <p:spPr>
+              <a:xfrm>
+                <a:off x="29435106" y="18453288"/>
+                <a:ext cx="13299848" cy="5663089"/>
+              </a:xfrm>
+              <a:prstGeom prst="rect">
+                <a:avLst/>
+              </a:prstGeom>
+              <a:ln w="12700">
+                <a:noFill/>
+              </a:ln>
+            </p:spPr>
+            <p:txBody>
+              <a:bodyPr wrap="square">
+                <a:spAutoFit/>
+              </a:bodyPr>
+              <a:lstStyle/>
+              <a:p>
+                <a:pPr marL="571500" indent="-571500" algn="just">
+                  <a:spcAft>
+                    <a:spcPts val="1200"/>
+                  </a:spcAft>
+                  <a:buFont typeface="Arial" panose="020B0604020202020204" pitchFamily="34" charset="0"/>
+                  <a:buChar char="•"/>
+                </a:pPr>
+                <a:r>
+                  <a:rPr lang="en-US" sz="3800" dirty="0">
+                    <a:cs typeface="Times New Roman" panose="02020603050405020304" pitchFamily="18" charset="0"/>
+                  </a:rPr>
+                  <a:t>By applying PTR and the Kress Quadrature to the transmission problem, we were able to plot the effect of a source on two sides of a boundary.</a:t>
+                </a:r>
+              </a:p>
+              <a:p>
+                <a:pPr marL="571500" indent="-571500" algn="just">
+                  <a:spcAft>
+                    <a:spcPts val="1200"/>
+                  </a:spcAft>
+                  <a:buFont typeface="Arial" panose="020B0604020202020204" pitchFamily="34" charset="0"/>
+                  <a:buChar char="•"/>
+                </a:pPr>
+                <a:r>
+                  <a:rPr lang="en-US" sz="3800" dirty="0">
+                    <a:cs typeface="Times New Roman" panose="02020603050405020304" pitchFamily="18" charset="0"/>
+                  </a:rPr>
+                  <a:t>Because the integrals are nearly singular close to the boundary, we will seek an alternative method to reduce this error.</a:t>
+                </a:r>
+              </a:p>
+              <a:p>
+                <a:pPr marL="571500" indent="-571500" algn="just">
+                  <a:spcAft>
+                    <a:spcPts val="1200"/>
+                  </a:spcAft>
+                  <a:buFont typeface="Arial" panose="020B0604020202020204" pitchFamily="34" charset="0"/>
+                  <a:buChar char="•"/>
+                </a:pPr>
+                <a:r>
+                  <a:rPr lang="en-US" sz="3800" dirty="0">
+                    <a:cs typeface="Times New Roman" panose="02020603050405020304" pitchFamily="18" charset="0"/>
+                  </a:rPr>
+                  <a:t>We can simulate cloaking by extending this method to multi-layered boundaries with different values of </a:t>
+                </a:r>
+                <a14:m>
+                  <m:oMath xmlns:m="http://schemas.openxmlformats.org/officeDocument/2006/math">
+                    <m:r>
+                      <a:rPr lang="en-US" sz="3800" b="0" i="1" smtClean="0">
+                        <a:latin typeface="Cambria Math" panose="02040503050406030204" pitchFamily="18" charset="0"/>
+                        <a:cs typeface="Times New Roman" panose="02020603050405020304" pitchFamily="18" charset="0"/>
+                      </a:rPr>
+                      <m:t>𝑘</m:t>
+                    </m:r>
+                    <m:r>
+                      <a:rPr lang="en-US" sz="3800" b="0" i="0" smtClean="0">
+                        <a:latin typeface="Cambria Math" panose="02040503050406030204" pitchFamily="18" charset="0"/>
+                        <a:cs typeface="Times New Roman" panose="02020603050405020304" pitchFamily="18" charset="0"/>
+                      </a:rPr>
+                      <m:t>.</m:t>
+                    </m:r>
+                  </m:oMath>
+                </a14:m>
+                <a:r>
+                  <a:rPr lang="en-US" sz="3800" dirty="0">
+                    <a:cs typeface="Times New Roman" panose="02020603050405020304" pitchFamily="18" charset="0"/>
+                  </a:rPr>
+                  <a:t>  In the future, we also intend to apply this method to other boundaries of different shapes.</a:t>
+                </a:r>
+              </a:p>
+            </p:txBody>
+          </p:sp>
+        </mc:Choice>
+        <mc:Fallback>
+          <p:sp>
+            <p:nvSpPr>
+              <p:cNvPr id="52" name="Rectangle 51">
+                <a:extLst>
+                  <a:ext uri="{FF2B5EF4-FFF2-40B4-BE49-F238E27FC236}">
+                    <a16:creationId xmlns:a16="http://schemas.microsoft.com/office/drawing/2014/main" id="{B6D6603E-AEAA-4593-9502-0647B30D3383}"/>
+                  </a:ext>
+                </a:extLst>
+              </p:cNvPr>
+              <p:cNvSpPr>
+                <a:spLocks noRot="1" noChangeAspect="1" noMove="1" noResize="1" noEditPoints="1" noAdjustHandles="1" noChangeArrowheads="1" noChangeShapeType="1" noTextEdit="1"/>
+              </p:cNvSpPr>
+              <p:nvPr/>
+            </p:nvSpPr>
+            <p:spPr>
+              <a:xfrm>
+                <a:off x="29435106" y="18453288"/>
+                <a:ext cx="13299848" cy="5663089"/>
+              </a:xfrm>
+              <a:prstGeom prst="rect">
+                <a:avLst/>
+              </a:prstGeom>
+              <a:blipFill>
+                <a:blip r:embed="rId21"/>
+                <a:stretch>
+                  <a:fillRect l="-1376" t="-1830" r="-1559" b="-3445"/>
+                </a:stretch>
+              </a:blipFill>
+              <a:ln w="12700">
+                <a:noFill/>
+              </a:ln>
+            </p:spPr>
+            <p:txBody>
+              <a:bodyPr/>
+              <a:lstStyle/>
+              <a:p>
+                <a:r>
+                  <a:rPr lang="en-US">
+                    <a:noFill/>
+                  </a:rPr>
+                  <a:t> </a:t>
+                </a:r>
+              </a:p>
+            </p:txBody>
+          </p:sp>
+        </mc:Fallback>
+      </mc:AlternateContent>
+      <mc:AlternateContent xmlns:mc="http://schemas.openxmlformats.org/markup-compatibility/2006">
+        <mc:Choice xmlns:a14="http://schemas.microsoft.com/office/drawing/2010/main" Requires="a14">
           <p:sp>
             <p:nvSpPr>
               <p:cNvPr id="48" name="TextBox 47">
@@ -11194,7 +11391,7 @@
             </p:nvSpPr>
             <p:spPr>
               <a:xfrm>
-                <a:off x="17526000" y="13868400"/>
+                <a:off x="19735800" y="13169039"/>
                 <a:ext cx="657488" cy="698781"/>
               </a:xfrm>
               <a:prstGeom prst="rect">
@@ -11203,7 +11400,7 @@
               <a:noFill/>
             </p:spPr>
             <p:txBody>
-              <a:bodyPr wrap="none" rtlCol="0">
+              <a:bodyPr wrap="square" rtlCol="0">
                 <a:spAutoFit/>
               </a:bodyPr>
               <a:lstStyle/>
@@ -11269,7 +11466,7 @@
             </p:txBody>
           </p:sp>
         </mc:Choice>
-        <mc:Fallback xmlns="">
+        <mc:Fallback>
           <p:sp>
             <p:nvSpPr>
               <p:cNvPr id="48" name="TextBox 47">
@@ -11286,7 +11483,7 @@
             </p:nvSpPr>
             <p:spPr>
               <a:xfrm>
-                <a:off x="17526000" y="13868400"/>
+                <a:off x="19735800" y="13169039"/>
                 <a:ext cx="657488" cy="698781"/>
               </a:xfrm>
               <a:prstGeom prst="rect">
@@ -11328,7 +11525,7 @@
         </p:nvSpPr>
         <p:spPr>
           <a:xfrm>
-            <a:off x="16176239" y="11323857"/>
+            <a:off x="18867183" y="11479594"/>
             <a:ext cx="3357009" cy="646331"/>
           </a:xfrm>
           <a:prstGeom prst="rect">
@@ -11337,7 +11534,7 @@
           <a:noFill/>
         </p:spPr>
         <p:txBody>
-          <a:bodyPr wrap="none" rtlCol="0">
+          <a:bodyPr wrap="square" rtlCol="0">
             <a:spAutoFit/>
           </a:bodyPr>
           <a:lstStyle/>
@@ -11363,8 +11560,8 @@
         </p:nvSpPr>
         <p:spPr>
           <a:xfrm>
-            <a:off x="20599131" y="14401800"/>
-            <a:ext cx="1843774" cy="584775"/>
+            <a:off x="23678401" y="12998828"/>
+            <a:ext cx="1354573" cy="1077218"/>
           </a:xfrm>
           <a:prstGeom prst="rect">
             <a:avLst/>
@@ -11372,11 +11569,12 @@
           <a:noFill/>
         </p:spPr>
         <p:txBody>
-          <a:bodyPr wrap="none" rtlCol="0">
+          <a:bodyPr wrap="square" rtlCol="0">
             <a:spAutoFit/>
           </a:bodyPr>
           <a:lstStyle/>
           <a:p>
+            <a:pPr algn="ctr"/>
             <a:r>
               <a:rPr lang="en-US" sz="3200" dirty="0">
                 <a:solidFill>
@@ -11412,8 +11610,8 @@
         </p:blipFill>
         <p:spPr>
           <a:xfrm>
-            <a:off x="21901465" y="18452325"/>
-            <a:ext cx="5682839" cy="2988377"/>
+            <a:off x="21945600" y="20455939"/>
+            <a:ext cx="5721080" cy="2508763"/>
           </a:xfrm>
           <a:prstGeom prst="rect">
             <a:avLst/>
@@ -11441,38 +11639,8 @@
         </p:blipFill>
         <p:spPr>
           <a:xfrm>
-            <a:off x="16145305" y="22850326"/>
-            <a:ext cx="4699976" cy="3086319"/>
-          </a:xfrm>
-          <a:prstGeom prst="rect">
-            <a:avLst/>
-          </a:prstGeom>
-        </p:spPr>
-      </p:pic>
-      <p:pic>
-        <p:nvPicPr>
-          <p:cNvPr id="25" name="Picture 24">
-            <a:extLst>
-              <a:ext uri="{FF2B5EF4-FFF2-40B4-BE49-F238E27FC236}">
-                <a16:creationId xmlns:a16="http://schemas.microsoft.com/office/drawing/2014/main" id="{C831D697-C497-4E9F-AFF8-8D3BE9216A9B}"/>
-              </a:ext>
-            </a:extLst>
-          </p:cNvPr>
-          <p:cNvPicPr>
-            <a:picLocks noChangeAspect="1"/>
-          </p:cNvPicPr>
-          <p:nvPr/>
-        </p:nvPicPr>
-        <p:blipFill>
-          <a:blip r:embed="rId24"/>
-          <a:stretch>
-            <a:fillRect/>
-          </a:stretch>
-        </p:blipFill>
-        <p:spPr>
-          <a:xfrm>
-            <a:off x="21717000" y="22823386"/>
-            <a:ext cx="5865850" cy="3084614"/>
+            <a:off x="15985217" y="24258814"/>
+            <a:ext cx="4731603" cy="2590987"/>
           </a:xfrm>
           <a:prstGeom prst="rect">
             <a:avLst/>
@@ -11493,7 +11661,7 @@
         </p:nvSpPr>
         <p:spPr>
           <a:xfrm>
-            <a:off x="15240000" y="21601093"/>
+            <a:off x="15346877" y="23079593"/>
             <a:ext cx="13267791" cy="954107"/>
           </a:xfrm>
           <a:prstGeom prst="rect">
@@ -11537,7 +11705,7 @@
         </p:nvSpPr>
         <p:spPr>
           <a:xfrm>
-            <a:off x="15239999" y="26212800"/>
+            <a:off x="15239999" y="27125956"/>
             <a:ext cx="13267791" cy="954107"/>
           </a:xfrm>
           <a:prstGeom prst="rect">
@@ -11589,8 +11757,8 @@
         </p:blipFill>
         <p:spPr>
           <a:xfrm>
-            <a:off x="15849600" y="18288000"/>
-            <a:ext cx="5222656" cy="3313093"/>
+            <a:off x="15773400" y="20343728"/>
+            <a:ext cx="5257800" cy="2781365"/>
           </a:xfrm>
           <a:prstGeom prst="rect">
             <a:avLst/>
@@ -11619,8 +11787,8 @@
         </p:blipFill>
         <p:spPr>
           <a:xfrm>
-            <a:off x="21072256" y="27570867"/>
-            <a:ext cx="6510594" cy="4282875"/>
+            <a:off x="21794751" y="28472523"/>
+            <a:ext cx="5865849" cy="3381219"/>
           </a:xfrm>
           <a:prstGeom prst="rect">
             <a:avLst/>
@@ -11641,7 +11809,7 @@
         </p:nvSpPr>
         <p:spPr>
           <a:xfrm>
-            <a:off x="15260781" y="28266821"/>
+            <a:off x="15245824" y="28590657"/>
             <a:ext cx="5621228" cy="3108543"/>
           </a:xfrm>
           <a:prstGeom prst="rect">
@@ -11662,9 +11830,1154 @@
             </a:r>
             <a:r>
               <a:rPr lang="en-US" sz="2800" dirty="0"/>
-              <a:t> The log error plot between the surfaces shown in Figure 3a and 3b.  Because our method is nearly singular as our points approach the boundary, there is a significant increase in error around the defined ellipse.</a:t>
+              <a:t> The log plot of the error between the PTR solution and the exact solution shown.  There is a  significant increase in error around the define boundary.  The reason is because we compute nearly singular intervals.</a:t>
             </a:r>
             <a:endParaRPr lang="en-US" sz="2800" b="1" dirty="0"/>
+          </a:p>
+        </p:txBody>
+      </p:sp>
+      <p:sp>
+        <p:nvSpPr>
+          <p:cNvPr id="8" name="TextBox 7">
+            <a:extLst>
+              <a:ext uri="{FF2B5EF4-FFF2-40B4-BE49-F238E27FC236}">
+                <a16:creationId xmlns:a16="http://schemas.microsoft.com/office/drawing/2014/main" id="{49DBBD17-D34C-4F9D-A229-F5AAA791B5E0}"/>
+              </a:ext>
+            </a:extLst>
+          </p:cNvPr>
+          <p:cNvSpPr txBox="1"/>
+          <p:nvPr/>
+        </p:nvSpPr>
+        <p:spPr>
+          <a:xfrm>
+            <a:off x="21488400" y="16002000"/>
+            <a:ext cx="65" cy="276999"/>
+          </a:xfrm>
+          <a:prstGeom prst="rect">
+            <a:avLst/>
+          </a:prstGeom>
+          <a:noFill/>
+        </p:spPr>
+        <p:txBody>
+          <a:bodyPr wrap="none" lIns="0" tIns="0" rIns="0" bIns="0" rtlCol="0">
+            <a:spAutoFit/>
+          </a:bodyPr>
+          <a:lstStyle/>
+          <a:p>
+            <a:endParaRPr lang="en-US" dirty="0"/>
+          </a:p>
+        </p:txBody>
+      </p:sp>
+      <mc:AlternateContent xmlns:mc="http://schemas.openxmlformats.org/markup-compatibility/2006">
+        <mc:Choice xmlns:a14="http://schemas.microsoft.com/office/drawing/2010/main" Requires="a14">
+          <p:sp>
+            <p:nvSpPr>
+              <p:cNvPr id="14" name="TextBox 13">
+                <a:extLst>
+                  <a:ext uri="{FF2B5EF4-FFF2-40B4-BE49-F238E27FC236}">
+                    <a16:creationId xmlns:a16="http://schemas.microsoft.com/office/drawing/2014/main" id="{BE9C3D36-DBBE-4697-BEE9-B22D27D0BDF8}"/>
+                  </a:ext>
+                </a:extLst>
+              </p:cNvPr>
+              <p:cNvSpPr txBox="1"/>
+              <p:nvPr/>
+            </p:nvSpPr>
+            <p:spPr>
+              <a:xfrm>
+                <a:off x="15263018" y="18364200"/>
+                <a:ext cx="12319831" cy="1618520"/>
+              </a:xfrm>
+              <a:prstGeom prst="rect">
+                <a:avLst/>
+              </a:prstGeom>
+              <a:noFill/>
+            </p:spPr>
+            <p:txBody>
+              <a:bodyPr wrap="square" rtlCol="0">
+                <a:spAutoFit/>
+              </a:bodyPr>
+              <a:lstStyle/>
+              <a:p>
+                <a:pPr algn="ctr">
+                  <a:spcAft>
+                    <a:spcPts val="600"/>
+                  </a:spcAft>
+                </a:pPr>
+                <a:r>
+                  <a:rPr lang="en-US" sz="2800" b="0" dirty="0"/>
+                  <a:t>In order to validate our method, we computed the solution which is known for:</a:t>
+                </a:r>
+              </a:p>
+              <a:p>
+                <a:pPr algn="ctr"/>
+                <a14:m>
+                  <m:oMathPara xmlns:m="http://schemas.openxmlformats.org/officeDocument/2006/math">
+                    <m:oMathParaPr>
+                      <m:jc m:val="centerGroup"/>
+                    </m:oMathParaPr>
+                    <m:oMath xmlns:m="http://schemas.openxmlformats.org/officeDocument/2006/math">
+                      <m:r>
+                        <a:rPr lang="en-US" sz="3200" b="0" i="1" smtClean="0">
+                          <a:latin typeface="Cambria Math" panose="02040503050406030204" pitchFamily="18" charset="0"/>
+                        </a:rPr>
+                        <m:t>𝑓</m:t>
+                      </m:r>
+                      <m:d>
+                        <m:dPr>
+                          <m:ctrlPr>
+                            <a:rPr lang="en-US" sz="3200" b="0" i="1" smtClean="0">
+                              <a:latin typeface="Cambria Math" panose="02040503050406030204" pitchFamily="18" charset="0"/>
+                            </a:rPr>
+                          </m:ctrlPr>
+                        </m:dPr>
+                        <m:e>
+                          <m:r>
+                            <a:rPr lang="en-US" sz="3200" b="0" i="1" smtClean="0">
+                              <a:latin typeface="Cambria Math" panose="02040503050406030204" pitchFamily="18" charset="0"/>
+                            </a:rPr>
+                            <m:t>𝑥</m:t>
+                          </m:r>
+                        </m:e>
+                      </m:d>
+                      <m:r>
+                        <a:rPr lang="en-US" sz="3200" b="0" i="1" smtClean="0">
+                          <a:latin typeface="Cambria Math" panose="02040503050406030204" pitchFamily="18" charset="0"/>
+                        </a:rPr>
+                        <m:t>=</m:t>
+                      </m:r>
+                      <m:sSup>
+                        <m:sSupPr>
+                          <m:ctrlPr>
+                            <a:rPr lang="en-US" sz="3200" b="0" i="1" smtClean="0">
+                              <a:latin typeface="Cambria Math" panose="02040503050406030204" pitchFamily="18" charset="0"/>
+                            </a:rPr>
+                          </m:ctrlPr>
+                        </m:sSupPr>
+                        <m:e>
+                          <m:r>
+                            <a:rPr lang="en-US" sz="3200" b="0" i="1" smtClean="0">
+                              <a:latin typeface="Cambria Math" panose="02040503050406030204" pitchFamily="18" charset="0"/>
+                            </a:rPr>
+                            <m:t>𝑒</m:t>
+                          </m:r>
+                        </m:e>
+                        <m:sup>
+                          <m:r>
+                            <a:rPr lang="en-US" sz="3200" b="0" i="1" smtClean="0">
+                              <a:latin typeface="Cambria Math" panose="02040503050406030204" pitchFamily="18" charset="0"/>
+                            </a:rPr>
+                            <m:t>𝑖</m:t>
+                          </m:r>
+                          <m:sSub>
+                            <m:sSubPr>
+                              <m:ctrlPr>
+                                <a:rPr lang="en-US" sz="3200" b="0" i="1" smtClean="0">
+                                  <a:latin typeface="Cambria Math" panose="02040503050406030204" pitchFamily="18" charset="0"/>
+                                </a:rPr>
+                              </m:ctrlPr>
+                            </m:sSubPr>
+                            <m:e>
+                              <m:r>
+                                <a:rPr lang="en-US" sz="3200" b="0" i="1" smtClean="0">
+                                  <a:latin typeface="Cambria Math" panose="02040503050406030204" pitchFamily="18" charset="0"/>
+                                </a:rPr>
+                                <m:t>𝑘</m:t>
+                              </m:r>
+                            </m:e>
+                            <m:sub>
+                              <m:r>
+                                <a:rPr lang="en-US" sz="3200" b="0" i="1" smtClean="0">
+                                  <a:latin typeface="Cambria Math" panose="02040503050406030204" pitchFamily="18" charset="0"/>
+                                </a:rPr>
+                                <m:t>𝑒</m:t>
+                              </m:r>
+                            </m:sub>
+                          </m:sSub>
+                          <m:d>
+                            <m:dPr>
+                              <m:ctrlPr>
+                                <a:rPr lang="en-US" sz="3200" b="0" i="1" smtClean="0">
+                                  <a:latin typeface="Cambria Math" panose="02040503050406030204" pitchFamily="18" charset="0"/>
+                                </a:rPr>
+                              </m:ctrlPr>
+                            </m:dPr>
+                            <m:e>
+                              <m:func>
+                                <m:funcPr>
+                                  <m:ctrlPr>
+                                    <a:rPr lang="en-US" sz="3200" b="0" i="1" smtClean="0">
+                                      <a:latin typeface="Cambria Math" panose="02040503050406030204" pitchFamily="18" charset="0"/>
+                                    </a:rPr>
+                                  </m:ctrlPr>
+                                </m:funcPr>
+                                <m:fName>
+                                  <m:r>
+                                    <m:rPr>
+                                      <m:sty m:val="p"/>
+                                    </m:rPr>
+                                    <a:rPr lang="en-US" sz="3200" b="0" i="0" smtClean="0">
+                                      <a:latin typeface="Cambria Math" panose="02040503050406030204" pitchFamily="18" charset="0"/>
+                                    </a:rPr>
+                                    <m:t>cos</m:t>
+                                  </m:r>
+                                </m:fName>
+                                <m:e>
+                                  <m:d>
+                                    <m:dPr>
+                                      <m:ctrlPr>
+                                        <a:rPr lang="en-US" sz="3200" b="0" i="1" smtClean="0">
+                                          <a:latin typeface="Cambria Math" panose="02040503050406030204" pitchFamily="18" charset="0"/>
+                                        </a:rPr>
+                                      </m:ctrlPr>
+                                    </m:dPr>
+                                    <m:e>
+                                      <m:r>
+                                        <a:rPr lang="en-US" sz="3200" b="0" i="1" smtClean="0">
+                                          <a:latin typeface="Cambria Math" panose="02040503050406030204" pitchFamily="18" charset="0"/>
+                                        </a:rPr>
+                                        <m:t>𝑎</m:t>
+                                      </m:r>
+                                    </m:e>
+                                  </m:d>
+                                </m:e>
+                              </m:func>
+                              <m:r>
+                                <a:rPr lang="en-US" sz="3200" b="0" i="1" smtClean="0">
+                                  <a:latin typeface="Cambria Math" panose="02040503050406030204" pitchFamily="18" charset="0"/>
+                                </a:rPr>
+                                <m:t>𝑥</m:t>
+                              </m:r>
+                              <m:r>
+                                <a:rPr lang="en-US" sz="3200" b="0" i="1" smtClean="0">
+                                  <a:latin typeface="Cambria Math" panose="02040503050406030204" pitchFamily="18" charset="0"/>
+                                </a:rPr>
+                                <m:t>+</m:t>
+                              </m:r>
+                              <m:func>
+                                <m:funcPr>
+                                  <m:ctrlPr>
+                                    <a:rPr lang="en-US" sz="3200" b="0" i="1" smtClean="0">
+                                      <a:latin typeface="Cambria Math" panose="02040503050406030204" pitchFamily="18" charset="0"/>
+                                    </a:rPr>
+                                  </m:ctrlPr>
+                                </m:funcPr>
+                                <m:fName>
+                                  <m:r>
+                                    <m:rPr>
+                                      <m:sty m:val="p"/>
+                                    </m:rPr>
+                                    <a:rPr lang="en-US" sz="3200" b="0" i="0" smtClean="0">
+                                      <a:latin typeface="Cambria Math" panose="02040503050406030204" pitchFamily="18" charset="0"/>
+                                    </a:rPr>
+                                    <m:t>sin</m:t>
+                                  </m:r>
+                                </m:fName>
+                                <m:e>
+                                  <m:d>
+                                    <m:dPr>
+                                      <m:ctrlPr>
+                                        <a:rPr lang="en-US" sz="3200" b="0" i="1" smtClean="0">
+                                          <a:latin typeface="Cambria Math" panose="02040503050406030204" pitchFamily="18" charset="0"/>
+                                        </a:rPr>
+                                      </m:ctrlPr>
+                                    </m:dPr>
+                                    <m:e>
+                                      <m:r>
+                                        <a:rPr lang="en-US" sz="3200" b="0" i="1" smtClean="0">
+                                          <a:latin typeface="Cambria Math" panose="02040503050406030204" pitchFamily="18" charset="0"/>
+                                        </a:rPr>
+                                        <m:t>𝑎</m:t>
+                                      </m:r>
+                                    </m:e>
+                                  </m:d>
+                                </m:e>
+                              </m:func>
+                              <m:r>
+                                <a:rPr lang="en-US" sz="3200" b="0" i="1" smtClean="0">
+                                  <a:latin typeface="Cambria Math" panose="02040503050406030204" pitchFamily="18" charset="0"/>
+                                </a:rPr>
+                                <m:t>𝑦</m:t>
+                              </m:r>
+                            </m:e>
+                          </m:d>
+                        </m:sup>
+                      </m:sSup>
+                    </m:oMath>
+                  </m:oMathPara>
+                </a14:m>
+                <a:endParaRPr lang="en-US" sz="3200" b="0" dirty="0"/>
+              </a:p>
+              <a:p>
+                <a:pPr algn="ctr"/>
+                <a14:m>
+                  <m:oMathPara xmlns:m="http://schemas.openxmlformats.org/officeDocument/2006/math">
+                    <m:oMathParaPr>
+                      <m:jc m:val="centerGroup"/>
+                    </m:oMathParaPr>
+                    <m:oMath xmlns:m="http://schemas.openxmlformats.org/officeDocument/2006/math">
+                      <m:sSub>
+                        <m:sSubPr>
+                          <m:ctrlPr>
+                            <a:rPr lang="en-US" sz="3200" i="1">
+                              <a:latin typeface="Cambria Math" panose="02040503050406030204" pitchFamily="18" charset="0"/>
+                            </a:rPr>
+                          </m:ctrlPr>
+                        </m:sSubPr>
+                        <m:e>
+                          <m:r>
+                            <a:rPr lang="en-US" sz="3200" i="1">
+                              <a:latin typeface="Cambria Math" panose="02040503050406030204" pitchFamily="18" charset="0"/>
+                            </a:rPr>
+                            <m:t>𝑘</m:t>
+                          </m:r>
+                        </m:e>
+                        <m:sub>
+                          <m:r>
+                            <a:rPr lang="en-US" sz="3200" i="1">
+                              <a:latin typeface="Cambria Math" panose="02040503050406030204" pitchFamily="18" charset="0"/>
+                            </a:rPr>
+                            <m:t>𝑒</m:t>
+                          </m:r>
+                        </m:sub>
+                      </m:sSub>
+                      <m:r>
+                        <a:rPr lang="en-US" sz="3200" i="1">
+                          <a:latin typeface="Cambria Math" panose="02040503050406030204" pitchFamily="18" charset="0"/>
+                        </a:rPr>
+                        <m:t>=</m:t>
+                      </m:r>
+                      <m:sSub>
+                        <m:sSubPr>
+                          <m:ctrlPr>
+                            <a:rPr lang="en-US" sz="3200" i="1">
+                              <a:latin typeface="Cambria Math" panose="02040503050406030204" pitchFamily="18" charset="0"/>
+                            </a:rPr>
+                          </m:ctrlPr>
+                        </m:sSubPr>
+                        <m:e>
+                          <m:r>
+                            <a:rPr lang="en-US" sz="3200" i="1">
+                              <a:latin typeface="Cambria Math" panose="02040503050406030204" pitchFamily="18" charset="0"/>
+                            </a:rPr>
+                            <m:t>𝑘</m:t>
+                          </m:r>
+                        </m:e>
+                        <m:sub>
+                          <m:r>
+                            <a:rPr lang="en-US" sz="3200" i="1">
+                              <a:latin typeface="Cambria Math" panose="02040503050406030204" pitchFamily="18" charset="0"/>
+                            </a:rPr>
+                            <m:t>𝑖</m:t>
+                          </m:r>
+                          <m:r>
+                            <a:rPr lang="en-US" sz="3200" i="1">
+                              <a:latin typeface="Cambria Math" panose="02040503050406030204" pitchFamily="18" charset="0"/>
+                            </a:rPr>
+                            <m:t> </m:t>
+                          </m:r>
+                        </m:sub>
+                      </m:sSub>
+                    </m:oMath>
+                  </m:oMathPara>
+                </a14:m>
+                <a:endParaRPr lang="en-US" sz="3200" dirty="0"/>
+              </a:p>
+            </p:txBody>
+          </p:sp>
+        </mc:Choice>
+        <mc:Fallback>
+          <p:sp>
+            <p:nvSpPr>
+              <p:cNvPr id="14" name="TextBox 13">
+                <a:extLst>
+                  <a:ext uri="{FF2B5EF4-FFF2-40B4-BE49-F238E27FC236}">
+                    <a16:creationId xmlns:a16="http://schemas.microsoft.com/office/drawing/2014/main" id="{BE9C3D36-DBBE-4697-BEE9-B22D27D0BDF8}"/>
+                  </a:ext>
+                </a:extLst>
+              </p:cNvPr>
+              <p:cNvSpPr txBox="1">
+                <a:spLocks noRot="1" noChangeAspect="1" noMove="1" noResize="1" noEditPoints="1" noAdjustHandles="1" noChangeArrowheads="1" noChangeShapeType="1" noTextEdit="1"/>
+              </p:cNvSpPr>
+              <p:nvPr/>
+            </p:nvSpPr>
+            <p:spPr>
+              <a:xfrm>
+                <a:off x="15263018" y="18364200"/>
+                <a:ext cx="12319831" cy="1618520"/>
+              </a:xfrm>
+              <a:prstGeom prst="rect">
+                <a:avLst/>
+              </a:prstGeom>
+              <a:blipFill>
+                <a:blip r:embed="rId27"/>
+                <a:stretch>
+                  <a:fillRect t="-4151"/>
+                </a:stretch>
+              </a:blipFill>
+            </p:spPr>
+            <p:txBody>
+              <a:bodyPr/>
+              <a:lstStyle/>
+              <a:p>
+                <a:r>
+                  <a:rPr lang="en-US">
+                    <a:noFill/>
+                  </a:rPr>
+                  <a:t> </a:t>
+                </a:r>
+              </a:p>
+            </p:txBody>
+          </p:sp>
+        </mc:Fallback>
+      </mc:AlternateContent>
+      <p:cxnSp>
+        <p:nvCxnSpPr>
+          <p:cNvPr id="59" name="Straight Connector 58">
+            <a:extLst>
+              <a:ext uri="{FF2B5EF4-FFF2-40B4-BE49-F238E27FC236}">
+                <a16:creationId xmlns:a16="http://schemas.microsoft.com/office/drawing/2014/main" id="{C7A3F30B-B4B9-4ECE-BF7A-7DC12A6AA12C}"/>
+              </a:ext>
+            </a:extLst>
+          </p:cNvPr>
+          <p:cNvCxnSpPr>
+            <a:cxnSpLocks/>
+          </p:cNvCxnSpPr>
+          <p:nvPr/>
+        </p:nvCxnSpPr>
+        <p:spPr>
+          <a:xfrm flipV="1">
+            <a:off x="15346877" y="28214732"/>
+            <a:ext cx="12548014" cy="17565"/>
+          </a:xfrm>
+          <a:prstGeom prst="line">
+            <a:avLst/>
+          </a:prstGeom>
+          <a:ln w="38100">
+            <a:prstDash val="dash"/>
+          </a:ln>
+        </p:spPr>
+        <p:style>
+          <a:lnRef idx="1">
+            <a:schemeClr val="accent1"/>
+          </a:lnRef>
+          <a:fillRef idx="0">
+            <a:schemeClr val="accent1"/>
+          </a:fillRef>
+          <a:effectRef idx="0">
+            <a:schemeClr val="accent1"/>
+          </a:effectRef>
+          <a:fontRef idx="minor">
+            <a:schemeClr val="tx1"/>
+          </a:fontRef>
+        </p:style>
+      </p:cxnSp>
+      <p:pic>
+        <p:nvPicPr>
+          <p:cNvPr id="54" name="Picture 53">
+            <a:extLst>
+              <a:ext uri="{FF2B5EF4-FFF2-40B4-BE49-F238E27FC236}">
+                <a16:creationId xmlns:a16="http://schemas.microsoft.com/office/drawing/2014/main" id="{AE1B4C3F-4EA2-4FEA-9F7A-4E755B0D480A}"/>
+              </a:ext>
+            </a:extLst>
+          </p:cNvPr>
+          <p:cNvPicPr>
+            <a:picLocks noChangeAspect="1"/>
+          </p:cNvPicPr>
+          <p:nvPr/>
+        </p:nvPicPr>
+        <p:blipFill rotWithShape="1">
+          <a:blip r:embed="rId28"/>
+          <a:srcRect r="202"/>
+          <a:stretch/>
+        </p:blipFill>
+        <p:spPr>
+          <a:xfrm>
+            <a:off x="30245881" y="7478603"/>
+            <a:ext cx="5376794" cy="2745035"/>
+          </a:xfrm>
+          <a:prstGeom prst="rect">
+            <a:avLst/>
+          </a:prstGeom>
+        </p:spPr>
+      </p:pic>
+      <p:pic>
+        <p:nvPicPr>
+          <p:cNvPr id="57" name="Picture 56">
+            <a:extLst>
+              <a:ext uri="{FF2B5EF4-FFF2-40B4-BE49-F238E27FC236}">
+                <a16:creationId xmlns:a16="http://schemas.microsoft.com/office/drawing/2014/main" id="{D57E579D-5ACB-4F02-AC7C-BDCD73C990F6}"/>
+              </a:ext>
+            </a:extLst>
+          </p:cNvPr>
+          <p:cNvPicPr>
+            <a:picLocks noChangeAspect="1"/>
+          </p:cNvPicPr>
+          <p:nvPr/>
+        </p:nvPicPr>
+        <p:blipFill>
+          <a:blip r:embed="rId29"/>
+          <a:stretch>
+            <a:fillRect/>
+          </a:stretch>
+        </p:blipFill>
+        <p:spPr>
+          <a:xfrm>
+            <a:off x="36141320" y="7478603"/>
+            <a:ext cx="5387680" cy="2745035"/>
+          </a:xfrm>
+          <a:prstGeom prst="rect">
+            <a:avLst/>
+          </a:prstGeom>
+        </p:spPr>
+      </p:pic>
+      <p:pic>
+        <p:nvPicPr>
+          <p:cNvPr id="68" name="Picture 67">
+            <a:extLst>
+              <a:ext uri="{FF2B5EF4-FFF2-40B4-BE49-F238E27FC236}">
+                <a16:creationId xmlns:a16="http://schemas.microsoft.com/office/drawing/2014/main" id="{21B1D5F1-FF00-4308-9E1C-5B2342EEDD04}"/>
+              </a:ext>
+            </a:extLst>
+          </p:cNvPr>
+          <p:cNvPicPr>
+            <a:picLocks noChangeAspect="1"/>
+          </p:cNvPicPr>
+          <p:nvPr/>
+        </p:nvPicPr>
+        <p:blipFill>
+          <a:blip r:embed="rId23"/>
+          <a:stretch>
+            <a:fillRect/>
+          </a:stretch>
+        </p:blipFill>
+        <p:spPr>
+          <a:xfrm>
+            <a:off x="21945600" y="24245178"/>
+            <a:ext cx="5721080" cy="2590987"/>
+          </a:xfrm>
+          <a:prstGeom prst="rect">
+            <a:avLst/>
+          </a:prstGeom>
+        </p:spPr>
+      </p:pic>
+      <p:sp>
+        <p:nvSpPr>
+          <p:cNvPr id="63" name="TextBox 62">
+            <a:extLst>
+              <a:ext uri="{FF2B5EF4-FFF2-40B4-BE49-F238E27FC236}">
+                <a16:creationId xmlns:a16="http://schemas.microsoft.com/office/drawing/2014/main" id="{F2C9D65E-9F40-44FF-98C1-3330CA53763A}"/>
+              </a:ext>
+            </a:extLst>
+          </p:cNvPr>
+          <p:cNvSpPr txBox="1"/>
+          <p:nvPr/>
+        </p:nvSpPr>
+        <p:spPr>
+          <a:xfrm>
+            <a:off x="31176683" y="10211744"/>
+            <a:ext cx="2613985" cy="523220"/>
+          </a:xfrm>
+          <a:prstGeom prst="rect">
+            <a:avLst/>
+          </a:prstGeom>
+          <a:noFill/>
+        </p:spPr>
+        <p:txBody>
+          <a:bodyPr wrap="none" rtlCol="0">
+            <a:spAutoFit/>
+          </a:bodyPr>
+          <a:lstStyle/>
+          <a:p>
+            <a:r>
+              <a:rPr lang="en-US" sz="2800" u="sng" dirty="0"/>
+              <a:t>Real Part of PTR</a:t>
+            </a:r>
+          </a:p>
+        </p:txBody>
+      </p:sp>
+      <p:sp>
+        <p:nvSpPr>
+          <p:cNvPr id="73" name="TextBox 72">
+            <a:extLst>
+              <a:ext uri="{FF2B5EF4-FFF2-40B4-BE49-F238E27FC236}">
+                <a16:creationId xmlns:a16="http://schemas.microsoft.com/office/drawing/2014/main" id="{BB3B037F-F7B7-4D25-8F7F-9E79BDA40FBD}"/>
+              </a:ext>
+            </a:extLst>
+          </p:cNvPr>
+          <p:cNvSpPr txBox="1"/>
+          <p:nvPr/>
+        </p:nvSpPr>
+        <p:spPr>
+          <a:xfrm>
+            <a:off x="36919175" y="10210800"/>
+            <a:ext cx="3390928" cy="523220"/>
+          </a:xfrm>
+          <a:prstGeom prst="rect">
+            <a:avLst/>
+          </a:prstGeom>
+          <a:noFill/>
+        </p:spPr>
+        <p:txBody>
+          <a:bodyPr wrap="none" rtlCol="0">
+            <a:spAutoFit/>
+          </a:bodyPr>
+          <a:lstStyle/>
+          <a:p>
+            <a:r>
+              <a:rPr lang="en-US" sz="2800" u="sng" dirty="0"/>
+              <a:t>Imaginary Part of PTR</a:t>
+            </a:r>
+          </a:p>
+        </p:txBody>
+      </p:sp>
+      <mc:AlternateContent xmlns:mc="http://schemas.openxmlformats.org/markup-compatibility/2006">
+        <mc:Choice xmlns:a14="http://schemas.microsoft.com/office/drawing/2010/main" Requires="a14">
+          <p:sp>
+            <p:nvSpPr>
+              <p:cNvPr id="76" name="TextBox 75">
+                <a:extLst>
+                  <a:ext uri="{FF2B5EF4-FFF2-40B4-BE49-F238E27FC236}">
+                    <a16:creationId xmlns:a16="http://schemas.microsoft.com/office/drawing/2014/main" id="{5DFE3997-915D-41D6-BE70-42F55C432814}"/>
+                  </a:ext>
+                </a:extLst>
+              </p:cNvPr>
+              <p:cNvSpPr txBox="1"/>
+              <p:nvPr/>
+            </p:nvSpPr>
+            <p:spPr>
+              <a:xfrm>
+                <a:off x="34647489" y="10972800"/>
+                <a:ext cx="2875082" cy="677108"/>
+              </a:xfrm>
+              <a:prstGeom prst="rect">
+                <a:avLst/>
+              </a:prstGeom>
+              <a:noFill/>
+              <a:ln>
+                <a:solidFill>
+                  <a:schemeClr val="accent1"/>
+                </a:solidFill>
+              </a:ln>
+            </p:spPr>
+            <p:txBody>
+              <a:bodyPr wrap="none" rtlCol="0">
+                <a:spAutoFit/>
+              </a:bodyPr>
+              <a:lstStyle/>
+              <a:p>
+                <a14:m>
+                  <m:oMathPara xmlns:m="http://schemas.openxmlformats.org/officeDocument/2006/math">
+                    <m:oMathParaPr>
+                      <m:jc m:val="centerGroup"/>
+                    </m:oMathParaPr>
+                    <m:oMath xmlns:m="http://schemas.openxmlformats.org/officeDocument/2006/math">
+                      <m:sSub>
+                        <m:sSubPr>
+                          <m:ctrlPr>
+                            <a:rPr lang="en-US" sz="3800" b="0" i="1" smtClean="0">
+                              <a:latin typeface="Cambria Math" panose="02040503050406030204" pitchFamily="18" charset="0"/>
+                            </a:rPr>
+                          </m:ctrlPr>
+                        </m:sSubPr>
+                        <m:e>
+                          <m:r>
+                            <a:rPr lang="en-US" sz="3800" b="0" i="1" smtClean="0">
+                              <a:latin typeface="Cambria Math" panose="02040503050406030204" pitchFamily="18" charset="0"/>
+                            </a:rPr>
+                            <m:t>𝑘</m:t>
+                          </m:r>
+                        </m:e>
+                        <m:sub>
+                          <m:r>
+                            <a:rPr lang="en-US" sz="3800" b="0" i="1" smtClean="0">
+                              <a:latin typeface="Cambria Math" panose="02040503050406030204" pitchFamily="18" charset="0"/>
+                            </a:rPr>
+                            <m:t>𝑒</m:t>
+                          </m:r>
+                        </m:sub>
+                      </m:sSub>
+                      <m:r>
+                        <a:rPr lang="en-US" sz="3800" b="0" i="1" smtClean="0">
+                          <a:latin typeface="Cambria Math" panose="02040503050406030204" pitchFamily="18" charset="0"/>
+                        </a:rPr>
+                        <m:t>=−0.5</m:t>
+                      </m:r>
+                      <m:sSub>
+                        <m:sSubPr>
+                          <m:ctrlPr>
+                            <a:rPr lang="en-US" sz="3800" b="0" i="1" smtClean="0">
+                              <a:latin typeface="Cambria Math" panose="02040503050406030204" pitchFamily="18" charset="0"/>
+                            </a:rPr>
+                          </m:ctrlPr>
+                        </m:sSubPr>
+                        <m:e>
+                          <m:r>
+                            <a:rPr lang="en-US" sz="3800" b="0" i="1" smtClean="0">
+                              <a:latin typeface="Cambria Math" panose="02040503050406030204" pitchFamily="18" charset="0"/>
+                            </a:rPr>
+                            <m:t>𝑘</m:t>
+                          </m:r>
+                        </m:e>
+                        <m:sub>
+                          <m:r>
+                            <a:rPr lang="en-US" sz="3800" b="0" i="1" smtClean="0">
+                              <a:latin typeface="Cambria Math" panose="02040503050406030204" pitchFamily="18" charset="0"/>
+                            </a:rPr>
+                            <m:t>𝑖</m:t>
+                          </m:r>
+                        </m:sub>
+                      </m:sSub>
+                    </m:oMath>
+                  </m:oMathPara>
+                </a14:m>
+                <a:endParaRPr lang="en-US" sz="3800" dirty="0"/>
+              </a:p>
+            </p:txBody>
+          </p:sp>
+        </mc:Choice>
+        <mc:Fallback>
+          <p:sp>
+            <p:nvSpPr>
+              <p:cNvPr id="76" name="TextBox 75">
+                <a:extLst>
+                  <a:ext uri="{FF2B5EF4-FFF2-40B4-BE49-F238E27FC236}">
+                    <a16:creationId xmlns:a16="http://schemas.microsoft.com/office/drawing/2014/main" id="{5DFE3997-915D-41D6-BE70-42F55C432814}"/>
+                  </a:ext>
+                </a:extLst>
+              </p:cNvPr>
+              <p:cNvSpPr txBox="1">
+                <a:spLocks noRot="1" noChangeAspect="1" noMove="1" noResize="1" noEditPoints="1" noAdjustHandles="1" noChangeArrowheads="1" noChangeShapeType="1" noTextEdit="1"/>
+              </p:cNvSpPr>
+              <p:nvPr/>
+            </p:nvSpPr>
+            <p:spPr>
+              <a:xfrm>
+                <a:off x="34647489" y="10972800"/>
+                <a:ext cx="2875082" cy="677108"/>
+              </a:xfrm>
+              <a:prstGeom prst="rect">
+                <a:avLst/>
+              </a:prstGeom>
+              <a:blipFill>
+                <a:blip r:embed="rId30"/>
+                <a:stretch>
+                  <a:fillRect/>
+                </a:stretch>
+              </a:blipFill>
+              <a:ln>
+                <a:solidFill>
+                  <a:schemeClr val="accent1"/>
+                </a:solidFill>
+              </a:ln>
+            </p:spPr>
+            <p:txBody>
+              <a:bodyPr/>
+              <a:lstStyle/>
+              <a:p>
+                <a:r>
+                  <a:rPr lang="en-US">
+                    <a:noFill/>
+                  </a:rPr>
+                  <a:t> </a:t>
+                </a:r>
+              </a:p>
+            </p:txBody>
+          </p:sp>
+        </mc:Fallback>
+      </mc:AlternateContent>
+      <p:cxnSp>
+        <p:nvCxnSpPr>
+          <p:cNvPr id="81" name="Straight Connector 80">
+            <a:extLst>
+              <a:ext uri="{FF2B5EF4-FFF2-40B4-BE49-F238E27FC236}">
+                <a16:creationId xmlns:a16="http://schemas.microsoft.com/office/drawing/2014/main" id="{83D6AD5A-97E9-4B28-AD64-36CB30CC4908}"/>
+              </a:ext>
+            </a:extLst>
+          </p:cNvPr>
+          <p:cNvCxnSpPr>
+            <a:cxnSpLocks/>
+          </p:cNvCxnSpPr>
+          <p:nvPr/>
+        </p:nvCxnSpPr>
+        <p:spPr>
+          <a:xfrm flipV="1">
+            <a:off x="15263018" y="20099235"/>
+            <a:ext cx="12548014" cy="17565"/>
+          </a:xfrm>
+          <a:prstGeom prst="line">
+            <a:avLst/>
+          </a:prstGeom>
+          <a:ln w="38100">
+            <a:prstDash val="dash"/>
+          </a:ln>
+        </p:spPr>
+        <p:style>
+          <a:lnRef idx="1">
+            <a:schemeClr val="accent1"/>
+          </a:lnRef>
+          <a:fillRef idx="0">
+            <a:schemeClr val="accent1"/>
+          </a:fillRef>
+          <a:effectRef idx="0">
+            <a:schemeClr val="accent1"/>
+          </a:effectRef>
+          <a:fontRef idx="minor">
+            <a:schemeClr val="tx1"/>
+          </a:fontRef>
+        </p:style>
+      </p:cxnSp>
+      <p:sp>
+        <p:nvSpPr>
+          <p:cNvPr id="67" name="TextBox 66">
+            <a:extLst>
+              <a:ext uri="{FF2B5EF4-FFF2-40B4-BE49-F238E27FC236}">
+                <a16:creationId xmlns:a16="http://schemas.microsoft.com/office/drawing/2014/main" id="{E0CFD5A9-0751-42BE-88F3-0B9E4615D2AA}"/>
+              </a:ext>
+            </a:extLst>
+          </p:cNvPr>
+          <p:cNvSpPr txBox="1"/>
+          <p:nvPr/>
+        </p:nvSpPr>
+        <p:spPr>
+          <a:xfrm>
+            <a:off x="29418046" y="5396029"/>
+            <a:ext cx="13218802" cy="1261884"/>
+          </a:xfrm>
+          <a:prstGeom prst="rect">
+            <a:avLst/>
+          </a:prstGeom>
+          <a:noFill/>
+        </p:spPr>
+        <p:txBody>
+          <a:bodyPr wrap="square" rtlCol="0">
+            <a:spAutoFit/>
+          </a:bodyPr>
+          <a:lstStyle/>
+          <a:p>
+            <a:r>
+              <a:rPr lang="en-US" sz="3800" dirty="0"/>
+              <a:t>Our method can be extended to the transmission of a source on boundaries with different properties.</a:t>
+            </a:r>
+          </a:p>
+        </p:txBody>
+      </p:sp>
+      <p:pic>
+        <p:nvPicPr>
+          <p:cNvPr id="82" name="Picture 81">
+            <a:extLst>
+              <a:ext uri="{FF2B5EF4-FFF2-40B4-BE49-F238E27FC236}">
+                <a16:creationId xmlns:a16="http://schemas.microsoft.com/office/drawing/2014/main" id="{80BC73A8-5822-465F-A4B2-32B1321531A3}"/>
+              </a:ext>
+            </a:extLst>
+          </p:cNvPr>
+          <p:cNvPicPr>
+            <a:picLocks noChangeAspect="1"/>
+          </p:cNvPicPr>
+          <p:nvPr/>
+        </p:nvPicPr>
+        <p:blipFill>
+          <a:blip r:embed="rId31"/>
+          <a:stretch>
+            <a:fillRect/>
+          </a:stretch>
+        </p:blipFill>
+        <p:spPr>
+          <a:xfrm>
+            <a:off x="30193239" y="11865380"/>
+            <a:ext cx="5436703" cy="2765964"/>
+          </a:xfrm>
+          <a:prstGeom prst="rect">
+            <a:avLst/>
+          </a:prstGeom>
+        </p:spPr>
+      </p:pic>
+      <p:pic>
+        <p:nvPicPr>
+          <p:cNvPr id="84" name="Picture 83">
+            <a:extLst>
+              <a:ext uri="{FF2B5EF4-FFF2-40B4-BE49-F238E27FC236}">
+                <a16:creationId xmlns:a16="http://schemas.microsoft.com/office/drawing/2014/main" id="{6668CD66-3800-4292-A9D9-C6DA8CD7261A}"/>
+              </a:ext>
+            </a:extLst>
+          </p:cNvPr>
+          <p:cNvPicPr>
+            <a:picLocks noChangeAspect="1"/>
+          </p:cNvPicPr>
+          <p:nvPr/>
+        </p:nvPicPr>
+        <p:blipFill>
+          <a:blip r:embed="rId32"/>
+          <a:stretch>
+            <a:fillRect/>
+          </a:stretch>
+        </p:blipFill>
+        <p:spPr>
+          <a:xfrm>
+            <a:off x="36168497" y="11865380"/>
+            <a:ext cx="5436703" cy="2791969"/>
+          </a:xfrm>
+          <a:prstGeom prst="rect">
+            <a:avLst/>
+          </a:prstGeom>
+        </p:spPr>
+      </p:pic>
+      <p:sp>
+        <p:nvSpPr>
+          <p:cNvPr id="86" name="TextBox 85">
+            <a:extLst>
+              <a:ext uri="{FF2B5EF4-FFF2-40B4-BE49-F238E27FC236}">
+                <a16:creationId xmlns:a16="http://schemas.microsoft.com/office/drawing/2014/main" id="{FE700FA6-E77E-40DC-B7A2-EBB573B5ECF5}"/>
+              </a:ext>
+            </a:extLst>
+          </p:cNvPr>
+          <p:cNvSpPr txBox="1"/>
+          <p:nvPr/>
+        </p:nvSpPr>
+        <p:spPr>
+          <a:xfrm>
+            <a:off x="31422925" y="14706600"/>
+            <a:ext cx="2613985" cy="523220"/>
+          </a:xfrm>
+          <a:prstGeom prst="rect">
+            <a:avLst/>
+          </a:prstGeom>
+          <a:noFill/>
+        </p:spPr>
+        <p:txBody>
+          <a:bodyPr wrap="none" rtlCol="0">
+            <a:spAutoFit/>
+          </a:bodyPr>
+          <a:lstStyle/>
+          <a:p>
+            <a:r>
+              <a:rPr lang="en-US" sz="2800" u="sng" dirty="0"/>
+              <a:t>Real Part of PTR</a:t>
+            </a:r>
+          </a:p>
+        </p:txBody>
+      </p:sp>
+      <p:sp>
+        <p:nvSpPr>
+          <p:cNvPr id="87" name="TextBox 86">
+            <a:extLst>
+              <a:ext uri="{FF2B5EF4-FFF2-40B4-BE49-F238E27FC236}">
+                <a16:creationId xmlns:a16="http://schemas.microsoft.com/office/drawing/2014/main" id="{66776CF4-7AE7-45A4-B44A-6BCB7BE70212}"/>
+              </a:ext>
+            </a:extLst>
+          </p:cNvPr>
+          <p:cNvSpPr txBox="1"/>
+          <p:nvPr/>
+        </p:nvSpPr>
+        <p:spPr>
+          <a:xfrm>
+            <a:off x="36964239" y="14733811"/>
+            <a:ext cx="3390928" cy="523220"/>
+          </a:xfrm>
+          <a:prstGeom prst="rect">
+            <a:avLst/>
+          </a:prstGeom>
+          <a:noFill/>
+        </p:spPr>
+        <p:txBody>
+          <a:bodyPr wrap="none" rtlCol="0">
+            <a:spAutoFit/>
+          </a:bodyPr>
+          <a:lstStyle/>
+          <a:p>
+            <a:r>
+              <a:rPr lang="en-US" sz="2800" u="sng" dirty="0"/>
+              <a:t>Imaginary Part of PTR</a:t>
+            </a:r>
+          </a:p>
+        </p:txBody>
+      </p:sp>
+      <mc:AlternateContent xmlns:mc="http://schemas.openxmlformats.org/markup-compatibility/2006">
+        <mc:Choice xmlns:a14="http://schemas.microsoft.com/office/drawing/2010/main" Requires="a14">
+          <p:sp>
+            <p:nvSpPr>
+              <p:cNvPr id="88" name="TextBox 87">
+                <a:extLst>
+                  <a:ext uri="{FF2B5EF4-FFF2-40B4-BE49-F238E27FC236}">
+                    <a16:creationId xmlns:a16="http://schemas.microsoft.com/office/drawing/2014/main" id="{1EDD62BF-5619-4F7D-AF0B-F8E6ED64C30A}"/>
+                  </a:ext>
+                </a:extLst>
+              </p:cNvPr>
+              <p:cNvSpPr txBox="1"/>
+              <p:nvPr/>
+            </p:nvSpPr>
+            <p:spPr>
+              <a:xfrm>
+                <a:off x="34771847" y="6790492"/>
+                <a:ext cx="2511200" cy="677108"/>
+              </a:xfrm>
+              <a:prstGeom prst="rect">
+                <a:avLst/>
+              </a:prstGeom>
+              <a:noFill/>
+              <a:ln>
+                <a:solidFill>
+                  <a:schemeClr val="accent1"/>
+                </a:solidFill>
+              </a:ln>
+            </p:spPr>
+            <p:txBody>
+              <a:bodyPr wrap="none" rtlCol="0">
+                <a:spAutoFit/>
+              </a:bodyPr>
+              <a:lstStyle/>
+              <a:p>
+                <a14:m>
+                  <m:oMathPara xmlns:m="http://schemas.openxmlformats.org/officeDocument/2006/math">
+                    <m:oMathParaPr>
+                      <m:jc m:val="centerGroup"/>
+                    </m:oMathParaPr>
+                    <m:oMath xmlns:m="http://schemas.openxmlformats.org/officeDocument/2006/math">
+                      <m:sSub>
+                        <m:sSubPr>
+                          <m:ctrlPr>
+                            <a:rPr lang="en-US" sz="3800" b="0" i="1" smtClean="0">
+                              <a:latin typeface="Cambria Math" panose="02040503050406030204" pitchFamily="18" charset="0"/>
+                            </a:rPr>
+                          </m:ctrlPr>
+                        </m:sSubPr>
+                        <m:e>
+                          <m:r>
+                            <a:rPr lang="en-US" sz="3800" b="0" i="1" smtClean="0">
+                              <a:latin typeface="Cambria Math" panose="02040503050406030204" pitchFamily="18" charset="0"/>
+                            </a:rPr>
+                            <m:t>𝑘</m:t>
+                          </m:r>
+                        </m:e>
+                        <m:sub>
+                          <m:r>
+                            <a:rPr lang="en-US" sz="3800" b="0" i="1" smtClean="0">
+                              <a:latin typeface="Cambria Math" panose="02040503050406030204" pitchFamily="18" charset="0"/>
+                            </a:rPr>
+                            <m:t>𝑒</m:t>
+                          </m:r>
+                        </m:sub>
+                      </m:sSub>
+                      <m:r>
+                        <a:rPr lang="en-US" sz="3800" b="0" i="1" smtClean="0">
+                          <a:latin typeface="Cambria Math" panose="02040503050406030204" pitchFamily="18" charset="0"/>
+                        </a:rPr>
+                        <m:t>=0.5</m:t>
+                      </m:r>
+                      <m:sSub>
+                        <m:sSubPr>
+                          <m:ctrlPr>
+                            <a:rPr lang="en-US" sz="3800" b="0" i="1" smtClean="0">
+                              <a:latin typeface="Cambria Math" panose="02040503050406030204" pitchFamily="18" charset="0"/>
+                            </a:rPr>
+                          </m:ctrlPr>
+                        </m:sSubPr>
+                        <m:e>
+                          <m:r>
+                            <a:rPr lang="en-US" sz="3800" b="0" i="1" smtClean="0">
+                              <a:latin typeface="Cambria Math" panose="02040503050406030204" pitchFamily="18" charset="0"/>
+                            </a:rPr>
+                            <m:t>𝑘</m:t>
+                          </m:r>
+                        </m:e>
+                        <m:sub>
+                          <m:r>
+                            <a:rPr lang="en-US" sz="3800" b="0" i="1" smtClean="0">
+                              <a:latin typeface="Cambria Math" panose="02040503050406030204" pitchFamily="18" charset="0"/>
+                            </a:rPr>
+                            <m:t>𝑖</m:t>
+                          </m:r>
+                        </m:sub>
+                      </m:sSub>
+                    </m:oMath>
+                  </m:oMathPara>
+                </a14:m>
+                <a:endParaRPr lang="en-US" sz="3800" dirty="0"/>
+              </a:p>
+            </p:txBody>
+          </p:sp>
+        </mc:Choice>
+        <mc:Fallback>
+          <p:sp>
+            <p:nvSpPr>
+              <p:cNvPr id="88" name="TextBox 87">
+                <a:extLst>
+                  <a:ext uri="{FF2B5EF4-FFF2-40B4-BE49-F238E27FC236}">
+                    <a16:creationId xmlns:a16="http://schemas.microsoft.com/office/drawing/2014/main" id="{1EDD62BF-5619-4F7D-AF0B-F8E6ED64C30A}"/>
+                  </a:ext>
+                </a:extLst>
+              </p:cNvPr>
+              <p:cNvSpPr txBox="1">
+                <a:spLocks noRot="1" noChangeAspect="1" noMove="1" noResize="1" noEditPoints="1" noAdjustHandles="1" noChangeArrowheads="1" noChangeShapeType="1" noTextEdit="1"/>
+              </p:cNvSpPr>
+              <p:nvPr/>
+            </p:nvSpPr>
+            <p:spPr>
+              <a:xfrm>
+                <a:off x="34771847" y="6790492"/>
+                <a:ext cx="2511200" cy="677108"/>
+              </a:xfrm>
+              <a:prstGeom prst="rect">
+                <a:avLst/>
+              </a:prstGeom>
+              <a:blipFill>
+                <a:blip r:embed="rId33"/>
+                <a:stretch>
+                  <a:fillRect/>
+                </a:stretch>
+              </a:blipFill>
+              <a:ln>
+                <a:solidFill>
+                  <a:schemeClr val="accent1"/>
+                </a:solidFill>
+              </a:ln>
+            </p:spPr>
+            <p:txBody>
+              <a:bodyPr/>
+              <a:lstStyle/>
+              <a:p>
+                <a:r>
+                  <a:rPr lang="en-US">
+                    <a:noFill/>
+                  </a:rPr>
+                  <a:t> </a:t>
+                </a:r>
+              </a:p>
+            </p:txBody>
+          </p:sp>
+        </mc:Fallback>
+      </mc:AlternateContent>
+      <p:sp>
+        <p:nvSpPr>
+          <p:cNvPr id="89" name="TextBox 88">
+            <a:extLst>
+              <a:ext uri="{FF2B5EF4-FFF2-40B4-BE49-F238E27FC236}">
+                <a16:creationId xmlns:a16="http://schemas.microsoft.com/office/drawing/2014/main" id="{EBA431C9-82C3-445B-930A-3F1F570F2482}"/>
+              </a:ext>
+            </a:extLst>
+          </p:cNvPr>
+          <p:cNvSpPr txBox="1"/>
+          <p:nvPr/>
+        </p:nvSpPr>
+        <p:spPr>
+          <a:xfrm>
+            <a:off x="29265646" y="15435618"/>
+            <a:ext cx="13218802" cy="1261884"/>
+          </a:xfrm>
+          <a:prstGeom prst="rect">
+            <a:avLst/>
+          </a:prstGeom>
+          <a:noFill/>
+        </p:spPr>
+        <p:txBody>
+          <a:bodyPr wrap="square" rtlCol="0">
+            <a:spAutoFit/>
+          </a:bodyPr>
+          <a:lstStyle/>
+          <a:p>
+            <a:r>
+              <a:rPr lang="en-US" sz="3800" dirty="0"/>
+              <a:t>The transmission appears mostly continuous across the boundary, excluding the expected error.  </a:t>
+            </a:r>
           </a:p>
         </p:txBody>
       </p:sp>

</xml_diff>

<commit_message>
Final Poster Draft (sent in for submission)
</commit_message>
<xml_diff>
--- a/UROC Poster Draft.pptx
+++ b/UROC Poster Draft.pptx
@@ -4419,8 +4419,8 @@
         </p:nvSpPr>
         <p:spPr>
           <a:xfrm flipH="1">
-            <a:off x="10591800" y="23726083"/>
-            <a:ext cx="1272654" cy="2707469"/>
+            <a:off x="10614546" y="23622000"/>
+            <a:ext cx="1272654" cy="2057400"/>
           </a:xfrm>
           <a:prstGeom prst="curvedRightArrow">
             <a:avLst>
@@ -5435,8 +5435,8 @@
           </a:p>
         </p:txBody>
       </p:sp>
-      <mc:AlternateContent xmlns:mc="http://schemas.openxmlformats.org/markup-compatibility/2006">
-        <mc:Choice xmlns:a14="http://schemas.microsoft.com/office/drawing/2010/main" Requires="a14">
+      <mc:AlternateContent xmlns:mc="http://schemas.openxmlformats.org/markup-compatibility/2006" xmlns:a14="http://schemas.microsoft.com/office/drawing/2010/main">
+        <mc:Choice Requires="a14">
           <p:sp>
             <p:nvSpPr>
               <p:cNvPr id="79" name="Rectangle 78">
@@ -7002,7 +7002,7 @@
             </p:txBody>
           </p:sp>
         </mc:Choice>
-        <mc:Fallback>
+        <mc:Fallback xmlns="">
           <p:sp>
             <p:nvSpPr>
               <p:cNvPr id="79" name="Rectangle 78">
@@ -9413,8 +9413,8 @@
           </p:sp>
         </mc:Fallback>
       </mc:AlternateContent>
-      <mc:AlternateContent xmlns:mc="http://schemas.openxmlformats.org/markup-compatibility/2006">
-        <mc:Choice xmlns:a14="http://schemas.microsoft.com/office/drawing/2010/main" Requires="a14">
+      <mc:AlternateContent xmlns:mc="http://schemas.openxmlformats.org/markup-compatibility/2006" xmlns:a14="http://schemas.microsoft.com/office/drawing/2010/main">
+        <mc:Choice Requires="a14">
           <p:sp>
             <p:nvSpPr>
               <p:cNvPr id="50" name="Rectangle 49">
@@ -9983,7 +9983,7 @@
             </p:txBody>
           </p:sp>
         </mc:Choice>
-        <mc:Fallback>
+        <mc:Fallback xmlns="">
           <p:sp>
             <p:nvSpPr>
               <p:cNvPr id="50" name="Rectangle 49">
@@ -11241,7 +11241,7 @@
             <p:spPr>
               <a:xfrm>
                 <a:off x="29435106" y="18453288"/>
-                <a:ext cx="13299848" cy="5663089"/>
+                <a:ext cx="13299848" cy="5078313"/>
               </a:xfrm>
               <a:prstGeom prst="rect">
                 <a:avLst/>
@@ -11267,7 +11267,7 @@
                   <a:rPr lang="en-US" sz="3800" dirty="0">
                     <a:cs typeface="Times New Roman" panose="02020603050405020304" pitchFamily="18" charset="0"/>
                   </a:rPr>
-                  <a:t>By applying PTR and the Kress Quadrature to the transmission problem, we were able to plot the effect of a source on two sides of a boundary.</a:t>
+                  <a:t>By applying PTR and the Kress Quadrature to the transmission problem, we were able to compute the effect of a source in layered media.</a:t>
                 </a:r>
               </a:p>
               <a:p>
@@ -11297,7 +11297,7 @@
                   <a:rPr lang="en-US" sz="3800" dirty="0">
                     <a:cs typeface="Times New Roman" panose="02020603050405020304" pitchFamily="18" charset="0"/>
                   </a:rPr>
-                  <a:t>We can simulate cloaking by extending this method to multi-layered boundaries with different values of </a:t>
+                  <a:t>We can simulate cloaking by extending this method to multi-layered domains with different values of </a:t>
                 </a:r>
                 <a14:m>
                   <m:oMath xmlns:m="http://schemas.openxmlformats.org/officeDocument/2006/math">
@@ -11321,7 +11321,7 @@
                   <a:rPr lang="en-US" sz="3800" dirty="0">
                     <a:cs typeface="Times New Roman" panose="02020603050405020304" pitchFamily="18" charset="0"/>
                   </a:rPr>
-                  <a:t>  In the future, we also intend to apply this method to other boundaries of different shapes.</a:t>
+                  <a:t>  In the future, we also intend to apply this method different boundary shapes.</a:t>
                 </a:r>
               </a:p>
             </p:txBody>
@@ -11345,7 +11345,7 @@
             <p:spPr>
               <a:xfrm>
                 <a:off x="29435106" y="18453288"/>
-                <a:ext cx="13299848" cy="5663089"/>
+                <a:ext cx="13299848" cy="5078313"/>
               </a:xfrm>
               <a:prstGeom prst="rect">
                 <a:avLst/>
@@ -11353,7 +11353,7 @@
               <a:blipFill>
                 <a:blip r:embed="rId21"/>
                 <a:stretch>
-                  <a:fillRect l="-1376" t="-1830" r="-1559" b="-3445"/>
+                  <a:fillRect l="-1376" t="-2041" r="-1559" b="-3962"/>
                 </a:stretch>
               </a:blipFill>
               <a:ln w="12700">
@@ -11375,8 +11375,8 @@
           </p:sp>
         </mc:Fallback>
       </mc:AlternateContent>
-      <mc:AlternateContent xmlns:mc="http://schemas.openxmlformats.org/markup-compatibility/2006">
-        <mc:Choice xmlns:a14="http://schemas.microsoft.com/office/drawing/2010/main" Requires="a14">
+      <mc:AlternateContent xmlns:mc="http://schemas.openxmlformats.org/markup-compatibility/2006" xmlns:a14="http://schemas.microsoft.com/office/drawing/2010/main">
+        <mc:Choice Requires="a14">
           <p:sp>
             <p:nvSpPr>
               <p:cNvPr id="48" name="TextBox 47">
@@ -11466,7 +11466,7 @@
             </p:txBody>
           </p:sp>
         </mc:Choice>
-        <mc:Fallback>
+        <mc:Fallback xmlns="">
           <p:sp>
             <p:nvSpPr>
               <p:cNvPr id="48" name="TextBox 47">
@@ -11681,7 +11681,7 @@
             </a:r>
             <a:r>
               <a:rPr lang="en-US" sz="2800" dirty="0"/>
-              <a:t>  The plot of the real part (left) and the imaginary part (right) of the PTR solution for an ellipse-shaped boundary.</a:t>
+              <a:t>  Top-down plot of the real part (left) and the imaginary part (right) of the PTR solution for an ellipse-shaped boundary with N = 300 points on the boundary.</a:t>
             </a:r>
             <a:r>
               <a:rPr lang="en-US" sz="2800" baseline="30000" dirty="0"/>
@@ -11725,7 +11725,7 @@
             </a:r>
             <a:r>
               <a:rPr lang="en-US" sz="2800" dirty="0"/>
-              <a:t>  The plot of the real part (left) and the imaginary part (right) of the exact solution for a plane wave acting on an ellipse boundary.</a:t>
+              <a:t>  Top-down plot of the real part (left) and the imaginary part (right) of the exact solution for a plane wave acting on an ellipse boundary.</a:t>
             </a:r>
             <a:r>
               <a:rPr lang="en-US" sz="2800" baseline="30000" dirty="0"/>
@@ -11830,7 +11830,7 @@
             </a:r>
             <a:r>
               <a:rPr lang="en-US" sz="2800" dirty="0"/>
-              <a:t> The log plot of the error between the PTR solution and the exact solution shown.  There is a  significant increase in error around the define boundary.  The reason is because we compute nearly singular intervals.</a:t>
+              <a:t> The log plot of the error between the PTR solution and the exact solution shown. There is a  significant increase in error around the defined boundary.  The reason is because we compute nearly singular intervals.</a:t>
             </a:r>
             <a:endParaRPr lang="en-US" sz="2800" b="1" dirty="0"/>
           </a:p>
@@ -12035,7 +12035,13 @@
                                         <a:rPr lang="en-US" sz="3200" b="0" i="1" smtClean="0">
                                           <a:latin typeface="Cambria Math" panose="02040503050406030204" pitchFamily="18" charset="0"/>
                                         </a:rPr>
-                                        <m:t>𝑎</m:t>
+                                        <m:t>𝜋</m:t>
+                                      </m:r>
+                                      <m:r>
+                                        <a:rPr lang="en-US" sz="3200" b="0" i="1" smtClean="0">
+                                          <a:latin typeface="Cambria Math" panose="02040503050406030204" pitchFamily="18" charset="0"/>
+                                        </a:rPr>
+                                        <m:t>/4</m:t>
                                       </m:r>
                                     </m:e>
                                   </m:d>
@@ -12086,7 +12092,13 @@
                                         <a:rPr lang="en-US" sz="3200" b="0" i="1" smtClean="0">
                                           <a:latin typeface="Cambria Math" panose="02040503050406030204" pitchFamily="18" charset="0"/>
                                         </a:rPr>
-                                        <m:t>𝑎</m:t>
+                                        <m:t>𝜋</m:t>
+                                      </m:r>
+                                      <m:r>
+                                        <a:rPr lang="en-US" sz="3200" b="0" i="1" smtClean="0">
+                                          <a:latin typeface="Cambria Math" panose="02040503050406030204" pitchFamily="18" charset="0"/>
+                                        </a:rPr>
+                                        <m:t>/4</m:t>
                                       </m:r>
                                     </m:e>
                                   </m:d>
@@ -12177,6 +12189,12 @@
                           </m:r>
                         </m:sub>
                       </m:sSub>
+                      <m:r>
+                        <a:rPr lang="en-US" sz="3200" b="0" i="1" smtClean="0">
+                          <a:latin typeface="Cambria Math" panose="02040503050406030204" pitchFamily="18" charset="0"/>
+                        </a:rPr>
+                        <m:t>=3</m:t>
+                      </m:r>
                     </m:oMath>
                   </m:oMathPara>
                 </a14:m>
@@ -12273,65 +12291,6 @@
       </p:cxnSp>
       <p:pic>
         <p:nvPicPr>
-          <p:cNvPr id="54" name="Picture 53">
-            <a:extLst>
-              <a:ext uri="{FF2B5EF4-FFF2-40B4-BE49-F238E27FC236}">
-                <a16:creationId xmlns:a16="http://schemas.microsoft.com/office/drawing/2014/main" id="{AE1B4C3F-4EA2-4FEA-9F7A-4E755B0D480A}"/>
-              </a:ext>
-            </a:extLst>
-          </p:cNvPr>
-          <p:cNvPicPr>
-            <a:picLocks noChangeAspect="1"/>
-          </p:cNvPicPr>
-          <p:nvPr/>
-        </p:nvPicPr>
-        <p:blipFill rotWithShape="1">
-          <a:blip r:embed="rId28"/>
-          <a:srcRect r="202"/>
-          <a:stretch/>
-        </p:blipFill>
-        <p:spPr>
-          <a:xfrm>
-            <a:off x="30245881" y="7478603"/>
-            <a:ext cx="5376794" cy="2745035"/>
-          </a:xfrm>
-          <a:prstGeom prst="rect">
-            <a:avLst/>
-          </a:prstGeom>
-        </p:spPr>
-      </p:pic>
-      <p:pic>
-        <p:nvPicPr>
-          <p:cNvPr id="57" name="Picture 56">
-            <a:extLst>
-              <a:ext uri="{FF2B5EF4-FFF2-40B4-BE49-F238E27FC236}">
-                <a16:creationId xmlns:a16="http://schemas.microsoft.com/office/drawing/2014/main" id="{D57E579D-5ACB-4F02-AC7C-BDCD73C990F6}"/>
-              </a:ext>
-            </a:extLst>
-          </p:cNvPr>
-          <p:cNvPicPr>
-            <a:picLocks noChangeAspect="1"/>
-          </p:cNvPicPr>
-          <p:nvPr/>
-        </p:nvPicPr>
-        <p:blipFill>
-          <a:blip r:embed="rId29"/>
-          <a:stretch>
-            <a:fillRect/>
-          </a:stretch>
-        </p:blipFill>
-        <p:spPr>
-          <a:xfrm>
-            <a:off x="36141320" y="7478603"/>
-            <a:ext cx="5387680" cy="2745035"/>
-          </a:xfrm>
-          <a:prstGeom prst="rect">
-            <a:avLst/>
-          </a:prstGeom>
-        </p:spPr>
-      </p:pic>
-      <p:pic>
-        <p:nvPicPr>
           <p:cNvPr id="68" name="Picture 67">
             <a:extLst>
               <a:ext uri="{FF2B5EF4-FFF2-40B4-BE49-F238E27FC236}">
@@ -12374,7 +12333,7 @@
         </p:nvSpPr>
         <p:spPr>
           <a:xfrm>
-            <a:off x="31176683" y="10211744"/>
+            <a:off x="30753499" y="10209322"/>
             <a:ext cx="2613985" cy="523220"/>
           </a:xfrm>
           <a:prstGeom prst="rect">
@@ -12409,7 +12368,7 @@
         </p:nvSpPr>
         <p:spPr>
           <a:xfrm>
-            <a:off x="36919175" y="10210800"/>
+            <a:off x="37682565" y="10309691"/>
             <a:ext cx="3390928" cy="523220"/>
           </a:xfrm>
           <a:prstGeom prst="rect">
@@ -12430,161 +12389,6 @@
           </a:p>
         </p:txBody>
       </p:sp>
-      <mc:AlternateContent xmlns:mc="http://schemas.openxmlformats.org/markup-compatibility/2006">
-        <mc:Choice xmlns:a14="http://schemas.microsoft.com/office/drawing/2010/main" Requires="a14">
-          <p:sp>
-            <p:nvSpPr>
-              <p:cNvPr id="76" name="TextBox 75">
-                <a:extLst>
-                  <a:ext uri="{FF2B5EF4-FFF2-40B4-BE49-F238E27FC236}">
-                    <a16:creationId xmlns:a16="http://schemas.microsoft.com/office/drawing/2014/main" id="{5DFE3997-915D-41D6-BE70-42F55C432814}"/>
-                  </a:ext>
-                </a:extLst>
-              </p:cNvPr>
-              <p:cNvSpPr txBox="1"/>
-              <p:nvPr/>
-            </p:nvSpPr>
-            <p:spPr>
-              <a:xfrm>
-                <a:off x="34647489" y="10972800"/>
-                <a:ext cx="2875082" cy="677108"/>
-              </a:xfrm>
-              <a:prstGeom prst="rect">
-                <a:avLst/>
-              </a:prstGeom>
-              <a:noFill/>
-              <a:ln>
-                <a:solidFill>
-                  <a:schemeClr val="accent1"/>
-                </a:solidFill>
-              </a:ln>
-            </p:spPr>
-            <p:txBody>
-              <a:bodyPr wrap="none" rtlCol="0">
-                <a:spAutoFit/>
-              </a:bodyPr>
-              <a:lstStyle/>
-              <a:p>
-                <a14:m>
-                  <m:oMathPara xmlns:m="http://schemas.openxmlformats.org/officeDocument/2006/math">
-                    <m:oMathParaPr>
-                      <m:jc m:val="centerGroup"/>
-                    </m:oMathParaPr>
-                    <m:oMath xmlns:m="http://schemas.openxmlformats.org/officeDocument/2006/math">
-                      <m:sSub>
-                        <m:sSubPr>
-                          <m:ctrlPr>
-                            <a:rPr lang="en-US" sz="3800" b="0" i="1" smtClean="0">
-                              <a:latin typeface="Cambria Math" panose="02040503050406030204" pitchFamily="18" charset="0"/>
-                            </a:rPr>
-                          </m:ctrlPr>
-                        </m:sSubPr>
-                        <m:e>
-                          <m:r>
-                            <a:rPr lang="en-US" sz="3800" b="0" i="1" smtClean="0">
-                              <a:latin typeface="Cambria Math" panose="02040503050406030204" pitchFamily="18" charset="0"/>
-                            </a:rPr>
-                            <m:t>𝑘</m:t>
-                          </m:r>
-                        </m:e>
-                        <m:sub>
-                          <m:r>
-                            <a:rPr lang="en-US" sz="3800" b="0" i="1" smtClean="0">
-                              <a:latin typeface="Cambria Math" panose="02040503050406030204" pitchFamily="18" charset="0"/>
-                            </a:rPr>
-                            <m:t>𝑒</m:t>
-                          </m:r>
-                        </m:sub>
-                      </m:sSub>
-                      <m:r>
-                        <a:rPr lang="en-US" sz="3800" b="0" i="1" smtClean="0">
-                          <a:latin typeface="Cambria Math" panose="02040503050406030204" pitchFamily="18" charset="0"/>
-                        </a:rPr>
-                        <m:t>=−0.5</m:t>
-                      </m:r>
-                      <m:sSub>
-                        <m:sSubPr>
-                          <m:ctrlPr>
-                            <a:rPr lang="en-US" sz="3800" b="0" i="1" smtClean="0">
-                              <a:latin typeface="Cambria Math" panose="02040503050406030204" pitchFamily="18" charset="0"/>
-                            </a:rPr>
-                          </m:ctrlPr>
-                        </m:sSubPr>
-                        <m:e>
-                          <m:r>
-                            <a:rPr lang="en-US" sz="3800" b="0" i="1" smtClean="0">
-                              <a:latin typeface="Cambria Math" panose="02040503050406030204" pitchFamily="18" charset="0"/>
-                            </a:rPr>
-                            <m:t>𝑘</m:t>
-                          </m:r>
-                        </m:e>
-                        <m:sub>
-                          <m:r>
-                            <a:rPr lang="en-US" sz="3800" b="0" i="1" smtClean="0">
-                              <a:latin typeface="Cambria Math" panose="02040503050406030204" pitchFamily="18" charset="0"/>
-                            </a:rPr>
-                            <m:t>𝑖</m:t>
-                          </m:r>
-                        </m:sub>
-                      </m:sSub>
-                    </m:oMath>
-                  </m:oMathPara>
-                </a14:m>
-                <a:endParaRPr lang="en-US" sz="3800" dirty="0"/>
-              </a:p>
-            </p:txBody>
-          </p:sp>
-        </mc:Choice>
-        <mc:Fallback>
-          <p:sp>
-            <p:nvSpPr>
-              <p:cNvPr id="76" name="TextBox 75">
-                <a:extLst>
-                  <a:ext uri="{FF2B5EF4-FFF2-40B4-BE49-F238E27FC236}">
-                    <a16:creationId xmlns:a16="http://schemas.microsoft.com/office/drawing/2014/main" id="{5DFE3997-915D-41D6-BE70-42F55C432814}"/>
-                  </a:ext>
-                </a:extLst>
-              </p:cNvPr>
-              <p:cNvSpPr txBox="1">
-                <a:spLocks noRot="1" noChangeAspect="1" noMove="1" noResize="1" noEditPoints="1" noAdjustHandles="1" noChangeArrowheads="1" noChangeShapeType="1" noTextEdit="1"/>
-              </p:cNvSpPr>
-              <p:nvPr/>
-            </p:nvSpPr>
-            <p:spPr>
-              <a:xfrm>
-                <a:off x="34647489" y="10972800"/>
-                <a:ext cx="2875082" cy="677108"/>
-              </a:xfrm>
-              <a:prstGeom prst="rect">
-                <a:avLst/>
-              </a:prstGeom>
-              <a:blipFill>
-                <a:blip r:embed="rId30"/>
-                <a:stretch>
-                  <a:fillRect/>
-                </a:stretch>
-              </a:blipFill>
-              <a:ln>
-                <a:solidFill>
-                  <a:schemeClr val="accent1"/>
-                </a:solidFill>
-              </a:ln>
-            </p:spPr>
-            <p:txBody>
-              <a:bodyPr/>
-              <a:lstStyle/>
-              <a:p>
-                <a:r>
-                  <a:rPr lang="en-US">
-                    <a:noFill/>
-                  </a:rPr>
-                  <a:t> </a:t>
-                </a:r>
-              </a:p>
-            </p:txBody>
-          </p:sp>
-        </mc:Fallback>
-      </mc:AlternateContent>
       <p:cxnSp>
         <p:nvCxnSpPr>
           <p:cNvPr id="81" name="Straight Connector 80">
@@ -12656,71 +12460,11 @@
           <a:p>
             <a:r>
               <a:rPr lang="en-US" sz="3800" dirty="0"/>
-              <a:t>Our method can be extended to the transmission of a source on boundaries with different properties.</a:t>
+              <a:t>Our method can be extended to the transmission of a source in domains with different properties.</a:t>
             </a:r>
           </a:p>
         </p:txBody>
       </p:sp>
-      <p:pic>
-        <p:nvPicPr>
-          <p:cNvPr id="82" name="Picture 81">
-            <a:extLst>
-              <a:ext uri="{FF2B5EF4-FFF2-40B4-BE49-F238E27FC236}">
-                <a16:creationId xmlns:a16="http://schemas.microsoft.com/office/drawing/2014/main" id="{80BC73A8-5822-465F-A4B2-32B1321531A3}"/>
-              </a:ext>
-            </a:extLst>
-          </p:cNvPr>
-          <p:cNvPicPr>
-            <a:picLocks noChangeAspect="1"/>
-          </p:cNvPicPr>
-          <p:nvPr/>
-        </p:nvPicPr>
-        <p:blipFill>
-          <a:blip r:embed="rId31"/>
-          <a:stretch>
-            <a:fillRect/>
-          </a:stretch>
-        </p:blipFill>
-        <p:spPr>
-          <a:xfrm>
-            <a:off x="30193239" y="11865380"/>
-            <a:ext cx="5436703" cy="2765964"/>
-          </a:xfrm>
-          <a:prstGeom prst="rect">
-            <a:avLst/>
-          </a:prstGeom>
-        </p:spPr>
-      </p:pic>
-      <p:pic>
-        <p:nvPicPr>
-          <p:cNvPr id="84" name="Picture 83">
-            <a:extLst>
-              <a:ext uri="{FF2B5EF4-FFF2-40B4-BE49-F238E27FC236}">
-                <a16:creationId xmlns:a16="http://schemas.microsoft.com/office/drawing/2014/main" id="{6668CD66-3800-4292-A9D9-C6DA8CD7261A}"/>
-              </a:ext>
-            </a:extLst>
-          </p:cNvPr>
-          <p:cNvPicPr>
-            <a:picLocks noChangeAspect="1"/>
-          </p:cNvPicPr>
-          <p:nvPr/>
-        </p:nvPicPr>
-        <p:blipFill>
-          <a:blip r:embed="rId32"/>
-          <a:stretch>
-            <a:fillRect/>
-          </a:stretch>
-        </p:blipFill>
-        <p:spPr>
-          <a:xfrm>
-            <a:off x="36168497" y="11865380"/>
-            <a:ext cx="5436703" cy="2791969"/>
-          </a:xfrm>
-          <a:prstGeom prst="rect">
-            <a:avLst/>
-          </a:prstGeom>
-        </p:spPr>
-      </p:pic>
       <p:sp>
         <p:nvSpPr>
           <p:cNvPr id="86" name="TextBox 85">
@@ -12735,7 +12479,7 @@
         </p:nvSpPr>
         <p:spPr>
           <a:xfrm>
-            <a:off x="31422925" y="14706600"/>
+            <a:off x="31013400" y="14782800"/>
             <a:ext cx="2613985" cy="523220"/>
           </a:xfrm>
           <a:prstGeom prst="rect">
@@ -12770,7 +12514,7 @@
         </p:nvSpPr>
         <p:spPr>
           <a:xfrm>
-            <a:off x="36964239" y="14733811"/>
+            <a:off x="37682565" y="14782800"/>
             <a:ext cx="3390928" cy="523220"/>
           </a:xfrm>
           <a:prstGeom prst="rect">
@@ -12791,6 +12535,131 @@
           </a:p>
         </p:txBody>
       </p:sp>
+      <p:sp>
+        <p:nvSpPr>
+          <p:cNvPr id="89" name="TextBox 88">
+            <a:extLst>
+              <a:ext uri="{FF2B5EF4-FFF2-40B4-BE49-F238E27FC236}">
+                <a16:creationId xmlns:a16="http://schemas.microsoft.com/office/drawing/2014/main" id="{EBA431C9-82C3-445B-930A-3F1F570F2482}"/>
+              </a:ext>
+            </a:extLst>
+          </p:cNvPr>
+          <p:cNvSpPr txBox="1"/>
+          <p:nvPr/>
+        </p:nvSpPr>
+        <p:spPr>
+          <a:xfrm>
+            <a:off x="29516152" y="15688615"/>
+            <a:ext cx="13218802" cy="677108"/>
+          </a:xfrm>
+          <a:prstGeom prst="rect">
+            <a:avLst/>
+          </a:prstGeom>
+          <a:noFill/>
+        </p:spPr>
+        <p:txBody>
+          <a:bodyPr wrap="square" rtlCol="0">
+            <a:spAutoFit/>
+          </a:bodyPr>
+          <a:lstStyle/>
+          <a:p>
+            <a:r>
+              <a:rPr lang="en-US" sz="3800" dirty="0"/>
+              <a:t>Different behaviors appear for different k values.</a:t>
+            </a:r>
+          </a:p>
+        </p:txBody>
+      </p:sp>
+      <p:pic>
+        <p:nvPicPr>
+          <p:cNvPr id="15" name="Picture 14">
+            <a:extLst>
+              <a:ext uri="{FF2B5EF4-FFF2-40B4-BE49-F238E27FC236}">
+                <a16:creationId xmlns:a16="http://schemas.microsoft.com/office/drawing/2014/main" id="{F53C87D0-12CC-4CD9-A93B-016190822231}"/>
+              </a:ext>
+            </a:extLst>
+          </p:cNvPr>
+          <p:cNvPicPr>
+            <a:picLocks noChangeAspect="1"/>
+          </p:cNvPicPr>
+          <p:nvPr/>
+        </p:nvPicPr>
+        <p:blipFill>
+          <a:blip r:embed="rId28"/>
+          <a:stretch>
+            <a:fillRect/>
+          </a:stretch>
+        </p:blipFill>
+        <p:spPr>
+          <a:xfrm>
+            <a:off x="29846157" y="7475172"/>
+            <a:ext cx="5776445" cy="2745035"/>
+          </a:xfrm>
+          <a:prstGeom prst="rect">
+            <a:avLst/>
+          </a:prstGeom>
+        </p:spPr>
+      </p:pic>
+      <p:pic>
+        <p:nvPicPr>
+          <p:cNvPr id="29" name="Picture 28">
+            <a:extLst>
+              <a:ext uri="{FF2B5EF4-FFF2-40B4-BE49-F238E27FC236}">
+                <a16:creationId xmlns:a16="http://schemas.microsoft.com/office/drawing/2014/main" id="{3668C0A5-D21B-4A64-91C7-91E3F4866415}"/>
+              </a:ext>
+            </a:extLst>
+          </p:cNvPr>
+          <p:cNvPicPr>
+            <a:picLocks noChangeAspect="1"/>
+          </p:cNvPicPr>
+          <p:nvPr/>
+        </p:nvPicPr>
+        <p:blipFill>
+          <a:blip r:embed="rId29"/>
+          <a:stretch>
+            <a:fillRect/>
+          </a:stretch>
+        </p:blipFill>
+        <p:spPr>
+          <a:xfrm>
+            <a:off x="29988803" y="11479595"/>
+            <a:ext cx="5633799" cy="2893808"/>
+          </a:xfrm>
+          <a:prstGeom prst="rect">
+            <a:avLst/>
+          </a:prstGeom>
+        </p:spPr>
+      </p:pic>
+      <p:pic>
+        <p:nvPicPr>
+          <p:cNvPr id="32" name="Picture 31">
+            <a:extLst>
+              <a:ext uri="{FF2B5EF4-FFF2-40B4-BE49-F238E27FC236}">
+                <a16:creationId xmlns:a16="http://schemas.microsoft.com/office/drawing/2014/main" id="{5E6877EE-8900-4166-BE0A-42570FC7191A}"/>
+              </a:ext>
+            </a:extLst>
+          </p:cNvPr>
+          <p:cNvPicPr>
+            <a:picLocks noChangeAspect="1"/>
+          </p:cNvPicPr>
+          <p:nvPr/>
+        </p:nvPicPr>
+        <p:blipFill>
+          <a:blip r:embed="rId30"/>
+          <a:stretch>
+            <a:fillRect/>
+          </a:stretch>
+        </p:blipFill>
+        <p:spPr>
+          <a:xfrm>
+            <a:off x="36446094" y="7158981"/>
+            <a:ext cx="5776445" cy="2823219"/>
+          </a:xfrm>
+          <a:prstGeom prst="rect">
+            <a:avLst/>
+          </a:prstGeom>
+        </p:spPr>
+      </p:pic>
       <mc:AlternateContent xmlns:mc="http://schemas.openxmlformats.org/markup-compatibility/2006">
         <mc:Choice xmlns:a14="http://schemas.microsoft.com/office/drawing/2010/main" Requires="a14">
           <p:sp>
@@ -12807,8 +12676,8 @@
             </p:nvSpPr>
             <p:spPr>
               <a:xfrm>
-                <a:off x="34771847" y="6790492"/>
-                <a:ext cx="2511200" cy="677108"/>
+                <a:off x="34319896" y="6789258"/>
+                <a:ext cx="3415102" cy="677108"/>
               </a:xfrm>
               <a:prstGeom prst="rect">
                 <a:avLst/>
@@ -12826,6 +12695,7 @@
               </a:bodyPr>
               <a:lstStyle/>
               <a:p>
+                <a:pPr/>
                 <a14:m>
                   <m:oMathPara xmlns:m="http://schemas.openxmlformats.org/officeDocument/2006/math">
                     <m:oMathParaPr>
@@ -12888,6 +12758,12 @@
                           </m:r>
                         </m:sub>
                       </m:sSub>
+                      <m:r>
+                        <a:rPr lang="en-US" sz="3800" b="0" i="1" smtClean="0">
+                          <a:latin typeface="Cambria Math" panose="02040503050406030204" pitchFamily="18" charset="0"/>
+                        </a:rPr>
+                        <m:t>=2</m:t>
+                      </m:r>
                     </m:oMath>
                   </m:oMathPara>
                 </a14:m>
@@ -12913,8 +12789,200 @@
             </p:nvSpPr>
             <p:spPr>
               <a:xfrm>
-                <a:off x="34771847" y="6790492"/>
-                <a:ext cx="2511200" cy="677108"/>
+                <a:off x="34319896" y="6789258"/>
+                <a:ext cx="3415102" cy="677108"/>
+              </a:xfrm>
+              <a:prstGeom prst="rect">
+                <a:avLst/>
+              </a:prstGeom>
+              <a:blipFill>
+                <a:blip r:embed="rId31"/>
+                <a:stretch>
+                  <a:fillRect/>
+                </a:stretch>
+              </a:blipFill>
+              <a:ln>
+                <a:solidFill>
+                  <a:schemeClr val="accent1"/>
+                </a:solidFill>
+              </a:ln>
+            </p:spPr>
+            <p:txBody>
+              <a:bodyPr/>
+              <a:lstStyle/>
+              <a:p>
+                <a:r>
+                  <a:rPr lang="en-US">
+                    <a:noFill/>
+                  </a:rPr>
+                  <a:t> </a:t>
+                </a:r>
+              </a:p>
+            </p:txBody>
+          </p:sp>
+        </mc:Fallback>
+      </mc:AlternateContent>
+      <p:pic>
+        <p:nvPicPr>
+          <p:cNvPr id="33" name="Picture 32">
+            <a:extLst>
+              <a:ext uri="{FF2B5EF4-FFF2-40B4-BE49-F238E27FC236}">
+                <a16:creationId xmlns:a16="http://schemas.microsoft.com/office/drawing/2014/main" id="{202879CC-9700-4EB8-8732-EED38A1B4791}"/>
+              </a:ext>
+            </a:extLst>
+          </p:cNvPr>
+          <p:cNvPicPr>
+            <a:picLocks noChangeAspect="1"/>
+          </p:cNvPicPr>
+          <p:nvPr/>
+        </p:nvPicPr>
+        <p:blipFill>
+          <a:blip r:embed="rId32"/>
+          <a:stretch>
+            <a:fillRect/>
+          </a:stretch>
+        </p:blipFill>
+        <p:spPr>
+          <a:xfrm>
+            <a:off x="36717514" y="11416255"/>
+            <a:ext cx="5485975" cy="2983950"/>
+          </a:xfrm>
+          <a:prstGeom prst="rect">
+            <a:avLst/>
+          </a:prstGeom>
+        </p:spPr>
+      </p:pic>
+      <mc:AlternateContent xmlns:mc="http://schemas.openxmlformats.org/markup-compatibility/2006">
+        <mc:Choice xmlns:a14="http://schemas.microsoft.com/office/drawing/2010/main" Requires="a14">
+          <p:sp>
+            <p:nvSpPr>
+              <p:cNvPr id="76" name="TextBox 75">
+                <a:extLst>
+                  <a:ext uri="{FF2B5EF4-FFF2-40B4-BE49-F238E27FC236}">
+                    <a16:creationId xmlns:a16="http://schemas.microsoft.com/office/drawing/2014/main" id="{5DFE3997-915D-41D6-BE70-42F55C432814}"/>
+                  </a:ext>
+                </a:extLst>
+              </p:cNvPr>
+              <p:cNvSpPr txBox="1"/>
+              <p:nvPr/>
+            </p:nvSpPr>
+            <p:spPr>
+              <a:xfrm>
+                <a:off x="34013597" y="11057692"/>
+                <a:ext cx="4142865" cy="677108"/>
+              </a:xfrm>
+              <a:prstGeom prst="rect">
+                <a:avLst/>
+              </a:prstGeom>
+              <a:noFill/>
+              <a:ln>
+                <a:solidFill>
+                  <a:schemeClr val="accent1"/>
+                </a:solidFill>
+              </a:ln>
+            </p:spPr>
+            <p:txBody>
+              <a:bodyPr wrap="none" rtlCol="0">
+                <a:spAutoFit/>
+              </a:bodyPr>
+              <a:lstStyle/>
+              <a:p>
+                <a:pPr/>
+                <a14:m>
+                  <m:oMathPara xmlns:m="http://schemas.openxmlformats.org/officeDocument/2006/math">
+                    <m:oMathParaPr>
+                      <m:jc m:val="centerGroup"/>
+                    </m:oMathParaPr>
+                    <m:oMath xmlns:m="http://schemas.openxmlformats.org/officeDocument/2006/math">
+                      <m:sSub>
+                        <m:sSubPr>
+                          <m:ctrlPr>
+                            <a:rPr lang="en-US" sz="3800" b="0" i="1" smtClean="0">
+                              <a:latin typeface="Cambria Math" panose="02040503050406030204" pitchFamily="18" charset="0"/>
+                            </a:rPr>
+                          </m:ctrlPr>
+                        </m:sSubPr>
+                        <m:e>
+                          <m:r>
+                            <a:rPr lang="en-US" sz="3800" b="0" i="1" smtClean="0">
+                              <a:latin typeface="Cambria Math" panose="02040503050406030204" pitchFamily="18" charset="0"/>
+                            </a:rPr>
+                            <m:t>𝑘</m:t>
+                          </m:r>
+                        </m:e>
+                        <m:sub>
+                          <m:r>
+                            <a:rPr lang="en-US" sz="3800" b="0" i="1" smtClean="0">
+                              <a:latin typeface="Cambria Math" panose="02040503050406030204" pitchFamily="18" charset="0"/>
+                            </a:rPr>
+                            <m:t>𝑒</m:t>
+                          </m:r>
+                        </m:sub>
+                      </m:sSub>
+                      <m:r>
+                        <a:rPr lang="en-US" sz="3800" b="0" i="1" smtClean="0">
+                          <a:latin typeface="Cambria Math" panose="02040503050406030204" pitchFamily="18" charset="0"/>
+                        </a:rPr>
+                        <m:t>=−0.5</m:t>
+                      </m:r>
+                      <m:sSub>
+                        <m:sSubPr>
+                          <m:ctrlPr>
+                            <a:rPr lang="en-US" sz="3800" b="0" i="1" smtClean="0">
+                              <a:latin typeface="Cambria Math" panose="02040503050406030204" pitchFamily="18" charset="0"/>
+                            </a:rPr>
+                          </m:ctrlPr>
+                        </m:sSubPr>
+                        <m:e>
+                          <m:r>
+                            <a:rPr lang="en-US" sz="3800" b="0" i="1" smtClean="0">
+                              <a:latin typeface="Cambria Math" panose="02040503050406030204" pitchFamily="18" charset="0"/>
+                            </a:rPr>
+                            <m:t>𝑘</m:t>
+                          </m:r>
+                        </m:e>
+                        <m:sub>
+                          <m:r>
+                            <a:rPr lang="en-US" sz="3800" b="0" i="1" smtClean="0">
+                              <a:latin typeface="Cambria Math" panose="02040503050406030204" pitchFamily="18" charset="0"/>
+                            </a:rPr>
+                            <m:t>𝑖</m:t>
+                          </m:r>
+                        </m:sub>
+                      </m:sSub>
+                      <m:r>
+                        <a:rPr lang="en-US" sz="3800" b="0" i="1" smtClean="0">
+                          <a:latin typeface="Cambria Math" panose="02040503050406030204" pitchFamily="18" charset="0"/>
+                        </a:rPr>
+                        <m:t>=−2</m:t>
+                      </m:r>
+                    </m:oMath>
+                  </m:oMathPara>
+                </a14:m>
+                <a:endParaRPr lang="en-US" sz="3800" dirty="0"/>
+              </a:p>
+            </p:txBody>
+          </p:sp>
+        </mc:Choice>
+        <mc:Fallback>
+          <p:sp>
+            <p:nvSpPr>
+              <p:cNvPr id="76" name="TextBox 75">
+                <a:extLst>
+                  <a:ext uri="{FF2B5EF4-FFF2-40B4-BE49-F238E27FC236}">
+                    <a16:creationId xmlns:a16="http://schemas.microsoft.com/office/drawing/2014/main" id="{5DFE3997-915D-41D6-BE70-42F55C432814}"/>
+                  </a:ext>
+                </a:extLst>
+              </p:cNvPr>
+              <p:cNvSpPr txBox="1">
+                <a:spLocks noRot="1" noChangeAspect="1" noMove="1" noResize="1" noEditPoints="1" noAdjustHandles="1" noChangeArrowheads="1" noChangeShapeType="1" noTextEdit="1"/>
+              </p:cNvSpPr>
+              <p:nvPr/>
+            </p:nvSpPr>
+            <p:spPr>
+              <a:xfrm>
+                <a:off x="34013597" y="11057692"/>
+                <a:ext cx="4142865" cy="677108"/>
               </a:xfrm>
               <a:prstGeom prst="rect">
                 <a:avLst/>
@@ -12946,41 +13014,6 @@
           </p:sp>
         </mc:Fallback>
       </mc:AlternateContent>
-      <p:sp>
-        <p:nvSpPr>
-          <p:cNvPr id="89" name="TextBox 88">
-            <a:extLst>
-              <a:ext uri="{FF2B5EF4-FFF2-40B4-BE49-F238E27FC236}">
-                <a16:creationId xmlns:a16="http://schemas.microsoft.com/office/drawing/2014/main" id="{EBA431C9-82C3-445B-930A-3F1F570F2482}"/>
-              </a:ext>
-            </a:extLst>
-          </p:cNvPr>
-          <p:cNvSpPr txBox="1"/>
-          <p:nvPr/>
-        </p:nvSpPr>
-        <p:spPr>
-          <a:xfrm>
-            <a:off x="29265646" y="15435618"/>
-            <a:ext cx="13218802" cy="1261884"/>
-          </a:xfrm>
-          <a:prstGeom prst="rect">
-            <a:avLst/>
-          </a:prstGeom>
-          <a:noFill/>
-        </p:spPr>
-        <p:txBody>
-          <a:bodyPr wrap="square" rtlCol="0">
-            <a:spAutoFit/>
-          </a:bodyPr>
-          <a:lstStyle/>
-          <a:p>
-            <a:r>
-              <a:rPr lang="en-US" sz="3800" dirty="0"/>
-              <a:t>The transmission appears mostly continuous across the boundary, excluding the expected error.  </a:t>
-            </a:r>
-          </a:p>
-        </p:txBody>
-      </p:sp>
     </p:spTree>
     <p:extLst>
       <p:ext uri="{BB962C8B-B14F-4D97-AF65-F5344CB8AC3E}">

</xml_diff>